<commit_message>
Graphs Intro + Representation
</commit_message>
<xml_diff>
--- a/Day 31/Class - 31.pptx
+++ b/Day 31/Class - 31.pptx
@@ -246,7 +246,7 @@
           <a:p>
             <a:fld id="{8CCFA85B-F0D0-46B4-B4F4-F331F321C77C}" type="datetimeFigureOut">
               <a:rPr lang="en-IN" smtClean="0"/>
-              <a:t>08-06-2022</a:t>
+              <a:t>09-06-2022</a:t>
             </a:fld>
             <a:endParaRPr lang="en-IN"/>
           </a:p>
@@ -1452,15 +1452,15 @@
   <inkml:trace contextRef="#ctx0" brushRef="#br1" timeOffset="99196">5591 2024 327 0,'0'0'158'0,"0"0"-29"16,0 0-13-16,0 0-19 16,0 0-31-16,0 0-6 0,52-52-41 15,-39 50 5-15,11-4-13 16,-3 3-3-16,24 0-8 16,6 3 0-16,18 0-34 15,-11 0-83-15,1 0-160 16,-14 0-307-16</inkml:trace>
   <inkml:trace contextRef="#ctx0" brushRef="#br1" timeOffset="100418">7489 1769 99 0,'0'0'322'0,"0"0"-197"16,0 0-49-16,0 0-16 15,0 0 39-15,0 0-46 16,-83-15-12-16,83 15 1 16,0 0-38-16,0 0 17 15,0 0-21-15,0 0 3 16,7-2-6-16,24 2 10 16,7-3 2-16,-4 3-9 0,-3 0 10 15,7 0-8 1,-10 0-2-16,3 0 0 0,-11 0-10 15,-9 0 13-15,-5 0-3 16,-6 0 0-16,0 0-11 16,0 0 5-16,0 9 6 15,-37 6 0-15,-8 1 5 16,0 2 3-16,1-4-8 16,16-5 0-16,11-4 8 15,10-2-12-15,7-3 4 16,0 0 0-16,0 0-7 15,0 0 12-15,0 0-5 16,0 0 0-16,24 0 2 16,4 0-4-16,9 0 2 15,-6 0 0-15,4 3-4 0,-4 2 9 16,6 7-5-16,-23-4 0 16,17 10 2-16,-17-5-12 15,-7 5 10-15,0 2 0 16,-7-2-8-16,0 5 14 15,-21-7-6-15,-17-2 0 16,-13-4 7-16,-8-8-7 16,8-2 0-16,-1 0-86 15,-3 0-70-15,28 0-172 16</inkml:trace>
   <inkml:trace contextRef="#ctx0" brushRef="#br1" timeOffset="101711">5116 3022 360 0,'0'0'121'0,"0"0"-12"16,0 0 25-16,0 0-30 15,0 0-39-15,0 0 21 16,-6-37-41-16,6 31 9 15,0 3 7-15,0-6-37 16,0 3 22-16,0 4-22 16,0-1-21-16,0 0 3 15,13 1-4-15,18 2-2 16,14 0 0-16,-18 0-4 16,4 0-5-16,-10 5 6 15,-4 18-1-15,-17 12-11 16,0 4 18-16,-24 9-3 0,-27 1 0 15,-15-3 8-15,4-9-9 16,18-17 1-16,16-5 0 16,14-10-2-16,4 1 6 15,10-3-4-15,0-3 0 16,0 0 6-16,0 0-12 16,62 0 6-16,34-6 0 15,21-14 11-15,17-3-11 16,-31 12-77-16,-44 5-156 15,-42 6-213-15</inkml:trace>
-  <inkml:trace contextRef="#ctx0" brushRef="#br0" timeOffset="287099">7881 380 170 0,'0'0'548'0,"0"0"-429"16,0 0-10-16,0 0 58 16,0 0-40-16,0 0-12 15,0 0-37-15,0-63-38 16,0 57 12-16,0 4-23 16,0-1-18-16,0 3 5 15,0 0-16-15,0 0-3 16,0 0 3-16,0 0-30 0,21 19 30 15,9 10 0 1,8 3 6-16,7 3-5 0,-7 1 3 16,-11 2-4-16,11-1 0 15,-7-3 10 1,-17-8-12-16,-7-7 2 0,-7-5 0 16,0-4-9-16,0-4 0 15,-21-6-2-15,-24 0 8 16,1 0-32-16,13-18 32 15,10-8-2-15,4-1 5 16,17-9-7-16,0 2 1 16,0-3-6-16,38 2-22 15,13 5 25-15,1 0 3 16,10 4 6-16,3 4 0 0,0-2-9 16,11 8 16-16,-31 4-7 15,-7 6 0-15,-25 6 5 16,1 0-13-16,-7 0 8 15,-7 0 0-15,10 15-9 16,-10 8 13-16,0 8-4 16,0 1 6-16,0 0 5 15,0 1-10-15,0 2-1 16,0-1 0-16,0-5-3 16,7-3 5-16,21-6-2 15,10-15 0-15,-1-5 13 16,8 0-9-16,7 0-4 15,-1-19 3-15,-6-10 11 0,-14-3-12 16,-11 1 13-16,-13-3 11 16,-7 5-22-16,0 0 35 15,-27 6-34-15,-18 3-3 16,-10 4-4-16,-3 7 0 16,6 6 2-16,7 3 0 15,18 0-20-15,3 0-23 16,17 12-58-16,7 8-69 15,0 5-75-15,52-5-96 16,23 0-277-16</inkml:trace>
-  <inkml:trace contextRef="#ctx0" brushRef="#br0" timeOffset="287466">9163 386 372 0,'0'0'203'0,"0"0"-52"16,0 0-5-16,0 0-10 15,0 0-55-15,0 0-9 16,-82-80-16-16,61 80-25 16,14 0-6-16,-10 0-25 15,17 19-2-15,0 10-6 16,0 5 10-16,0 6-2 16,17 1 0-16,18-7 10 15,9-11-10-15,8-9 3 16,10-8 1-16,-10-6 14 15,-8 0-14-15,-9-3 18 16,-11-20 22-16,-11-2-16 0,-13-4 25 16,0 0-26-16,0 4-22 15,-20-1 19-15,-32 3-23 16,-10 5-1-16,-3 13 0 16,7 2 0-16,13 3-9 15,14 0 9-15,17 0-88 16,14 12-66-16,0-1-109 15,31-11-103-15</inkml:trace>
-  <inkml:trace contextRef="#ctx0" brushRef="#br0" timeOffset="287954">9710 57 645 0,'0'0'188'0,"0"0"-11"15,0 0 6-15,0 0-55 16,0 0-37-16,0 0-38 16,0-57-32-16,0 57-11 15,0 6-9-15,0 22-1 16,0 16 13-16,0 6-10 16,0 11 18-16,10 4-21 15,4-2 0-15,-7-3 0 16,0-11 7-16,10-6-7 15,-10-12 0-15,7-8 10 0,-7-14-14 16,0-7 4 0,-7-2 0-16,6 0-11 0,5-5 14 15,-4-27-6-15,-7 1 3 16,0-3-28-16,0 5 24 16,-18 6-13-16,-16 3 10 15,3 5-4-15,0 5 9 16,10 6 2-16,8 2 0 15,-4 2-4-15,10 0-3 16,7 0 7-16,0 0-21 16,24 0 18-16,41 0-4 15,38 0 7-15,24 0 5 0,-10 0 3 16,-20-14-7-16,-8-1-1 16,-20 6 0-16,-25 4 1 15,-37 5-1-15,-7 0-15 16,-17 0-177-16,-86 14-173 15</inkml:trace>
-  <inkml:trace contextRef="#ctx0" brushRef="#br0" timeOffset="288236">8235 969 662 0,'0'0'198'0,"0"0"-36"16,0 0 3-16,0 0-52 0,0 0-82 16,378-74 62-16,-168 51-28 15,3-6-57-15,-13 6 24 16,-15 0-32-16,-20-3 1 16,-31 10-3-16,-30 4 2 15,-53 7-21-15,-30 5-27 16,-14 0-65-16,-7 0-39 15,-14 13-85-15,-82 22 37 16,-59 5-84-16,-31 6-86 16</inkml:trace>
-  <inkml:trace contextRef="#ctx0" brushRef="#br0" timeOffset="288445">8414 1083 122 0,'0'0'215'0,"0"0"-32"0,0 0-13 15,0 0-13-15,0 0-24 16,0 0-20-16,-179 18-56 15,286-18-5-15,40-24 51 16,46 4-13-16,27-7-32 16,-3 0-24-16,-25 4-21 15,-30 3 24-15,-21 3-32 16,-45 5-2-16,-34 7 2 16,-41 5 0-16,-21 0-10 15,0 0-24-15,-38 9-241 16,-28 8-36-16</inkml:trace>
-  <inkml:trace contextRef="#ctx0" brushRef="#br2" timeOffset="1.54085E6">6258 617 623 0,'0'0'141'0,"0"0"-4"0,0 0 27 16,0 0-59-16,0 0-15 15,0 0-8-15,21-3-17 16,-21 3 11-16,0 0-36 15,0 0 2-15,0 0 4 16,0 0-32-16,0 0 11 16,-7 0-4-16,-31 0-20 15,-21 0 18-15,-13 0-19 16,-3 7 0-16,-1 3-1 16,4 5 10-16,-11-2-9 15,25 0 0-15,6-5 3 0,21-3-8 16,24-2 5-1,1-3 0-15,6 0-4 0,0 0 0 16,0 0 2-16,0 0-6 16,0 0-12-16,0 0 19 15,0-8-29-15,0-13 20 16,0-1 4-16,6-4-5 16,18 1 10-16,-17-1 1 15,14 0 0-15,-7 4-6 16,3 5 6-16,-10 5 0 15,0 4-3-15,0 4 7 16,-7 2-4-16,6-1 0 0,-6 3 6 16,0 0-11-1,0 0 5-15,0 0 0 0,0 0-2 16,0 0 11-16,0 0-9 16,0 0 0-16,-34 23 3 15,-28 8 8-15,-3 3-8 16,-1-2 0-16,5 3 7 15,9-4-2-15,7-5-8 16,18 2 0-16,-4 1 2 16,17-8-5-16,14 9 3 15,0-4 0-15,21 0-4 16,30 2 13-16,25-8-7 16,6-5-2-16,15-7 4 15,-1-2 1-15,-31 0-5 16,-34-4-20-16,-31 6-72 15,-44 1-227-15,-60 6-502 16</inkml:trace>
-  <inkml:trace contextRef="#ctx0" brushRef="#br2" timeOffset="1.54598E6">4553 700 646 0,'0'0'200'16,"0"0"-82"-16,0 0 54 16,0 0-51-16,0 0-45 15,0 0 14-15,0 0-40 16,0-17-6-16,6 14 1 15,-6 3-33-15,0 0 17 16,0 0-9-16,0 0-19 16,0 0 21-16,0 0-22 15,0 0 0-15,0 0 0 16,0 0-3-16,0 20-1 0,0 11 4 16,0 15 0-1,-13-3 1-15,13 0-1 0,0 0 0 16,0-6 0-1,0-3 5-15,0-8-7 0,20-6 2 16,4-6-5-16,14-4-6 16,-3-9 11-16,2-1 0 15,1 0 0-15,7 0 13 16,-7-11-13-16,-11-8 0 16,11-7 2-16,-7-6 0 15,-3-2 2-15,-4-6-4 16,-11 0 10-16,-6-4-1 15,-7 3 0-15,0 0-9 16,0 9 6-16,-7 3-3 16,-24 11-1-16,4 0-2 15,-11 6 0-15,0 10-1 16,0 2-3-16,4 0 4 0,-11 0-3 16,8 5-10-16,-1 16 1 15,10-2-29-15,11 1 0 16,-4 4-47-16,21 7-23 15,0 6-110-15,0-1-134 16</inkml:trace>
-  <inkml:trace contextRef="#ctx0" brushRef="#br2" timeOffset="1.55948E6">5251 1909 264 0,'0'0'138'0,"0"0"-64"0,0 0 72 16,0 0-21-16,0 0-8 15,0 0-11-15,58 0 2 16,-58 0 9-16,0 0-45 15,0 0-19-15,0 0-11 0,0 0-31 16,-14 4 11 0,-24-2-4-16,-6 4-14 0,-1-4 21 15,-7 2-18-15,8-2 0 16,-1 2-1-16,-7-2 0 16,15 1-4-16,16-3-2 15,4 0 2-15,17 0-5 16,0 0 5-16,0 0-2 15,0 0 0-15,0 0-8 16,0 0-4-16,0 0-18 16,0-3-6-16,10-9 17 15,-3 4-6-15,7 2 22 16,-7 1-2-16,0-4-10 16,10 4 12-16,-10-4 3 15,-1 0 0-15,8 1-4 0,-7 0 4 16,10 2 0-16,-10 2 0 15,-7 4 4-15,0 0-13 16,0 0 9 0,0 0-3-16,0 0-5 0,0 0 7 15,0 0 1-15,0 0 0 16,0 0 9-16,0 0-14 16,0 0 8-16,-14 10-3 15,-23 9 14-15,-1 1-12 16,-14 4 1-16,8-8 5 15,13 2-3-15,10-10-1 16,14 1-4-16,0-1 2 0,7-2-9 16,0 2 9-16,0 1-2 15,0 0 2-15,14-1 6 16,13 0-4-16,11 1-4 16,0-3 1-16,-7 0-7 15,3-3-40-15,-10 1-46 16,-10-4-54-16,-14 0-97 15,-27 0-426-15</inkml:trace>
-  <inkml:trace contextRef="#ctx0" brushRef="#br2" timeOffset="1.56014E6">4116 1901 347 0,'0'0'239'15,"0"0"-137"-15,0 0 22 16,0 0-26-16,0 0-5 15,0 0-39-15,14-4-22 0,-7 4 24 16,10-5-30 0,3 0 3-16,11-7 13 0,-3 1-16 15,3-2 18-15,-18 3-17 16,5 2-3-16,-18 1 18 16,7 2-29-16,-1 5 5 15,-6 0 0-15,0 0-15 16,0 0 2-16,0 0-5 15,0 0-7-15,0 0 6 16,0 9-12-16,0 17 13 16,0 5 3-16,0 3 3 15,0 0-3-15,0 1-3 16,0-4 0-16,0 2-6 16,0-12 11-16,0-1-5 15,0-5 0-15,0-10 6 0,0-2-10 16,0-3 4-1,0 0 0-15,0 0-2 0,-31 0 8 16,4 3-6 0,-4-3 0-16,17 0 10 0,7 0-11 15,7 0 1-15,0 0 0 16,0 0-5-16,0 0 0 16,0 0 5-16,28 0-1 15,23 0 5-15,18 0-11 16,-3 0-6-16,9 0-64 15,-16 0-39-15,-15 0-109 16,8 0-64-16,0-11-214 16</inkml:trace>
+  <inkml:trace contextRef="#ctx0" brushRef="#br0" timeOffset="-142397.73">7881 380 170 0,'0'0'548'0,"0"0"-429"16,0 0-10-16,0 0 58 16,0 0-40-16,0 0-12 15,0 0-37-15,0-63-38 16,0 57 12-16,0 4-23 16,0-1-18-16,0 3 5 15,0 0-16-15,0 0-3 16,0 0 3-16,0 0-30 0,21 19 30 15,9 10 0 1,8 3 6-16,7 3-5 0,-7 1 3 16,-11 2-4-16,11-1 0 15,-7-3 10 1,-17-8-12-16,-7-7 2 0,-7-5 0 16,0-4-9-16,0-4 0 15,-21-6-2-15,-24 0 8 16,1 0-32-16,13-18 32 15,10-8-2-15,4-1 5 16,17-9-7-16,0 2 1 16,0-3-6-16,38 2-22 15,13 5 25-15,1 0 3 16,10 4 6-16,3 4 0 0,0-2-9 16,11 8 16-16,-31 4-7 15,-7 6 0-15,-25 6 5 16,1 0-13-16,-7 0 8 15,-7 0 0-15,10 15-9 16,-10 8 13-16,0 8-4 16,0 1 6-16,0 0 5 15,0 1-10-15,0 2-1 16,0-1 0-16,0-5-3 16,7-3 5-16,21-6-2 15,10-15 0-15,-1-5 13 16,8 0-9-16,7 0-4 15,-1-19 3-15,-6-10 11 0,-14-3-12 16,-11 1 13-16,-13-3 11 16,-7 5-22-16,0 0 35 15,-27 6-34-15,-18 3-3 16,-10 4-4-16,-3 7 0 16,6 6 2-16,7 3 0 15,18 0-20-15,3 0-23 16,17 12-58-16,7 8-69 15,0 5-75-15,52-5-96 16,23 0-277-16</inkml:trace>
+  <inkml:trace contextRef="#ctx0" brushRef="#br0" timeOffset="-142030.73">9163 386 372 0,'0'0'203'0,"0"0"-52"16,0 0-5-16,0 0-10 15,0 0-55-15,0 0-9 16,-82-80-16-16,61 80-25 16,14 0-6-16,-10 0-25 15,17 19-2-15,0 10-6 16,0 5 10-16,0 6-2 16,17 1 0-16,18-7 10 15,9-11-10-15,8-9 3 16,10-8 1-16,-10-6 14 15,-8 0-14-15,-9-3 18 16,-11-20 22-16,-11-2-16 0,-13-4 25 16,0 0-26-16,0 4-22 15,-20-1 19-15,-32 3-23 16,-10 5-1-16,-3 13 0 16,7 2 0-16,13 3-9 15,14 0 9-15,17 0-88 16,14 12-66-16,0-1-109 15,31-11-103-15</inkml:trace>
+  <inkml:trace contextRef="#ctx0" brushRef="#br0" timeOffset="-141542.73">9710 57 645 0,'0'0'188'0,"0"0"-11"15,0 0 6-15,0 0-55 16,0 0-37-16,0 0-38 16,0-57-32-16,0 57-11 15,0 6-9-15,0 22-1 16,0 16 13-16,0 6-10 16,0 11 18-16,10 4-21 15,4-2 0-15,-7-3 0 16,0-11 7-16,10-6-7 15,-10-12 0-15,7-8 10 0,-7-14-14 16,0-7 4 0,-7-2 0-16,6 0-11 0,5-5 14 15,-4-27-6-15,-7 1 3 16,0-3-28-16,0 5 24 16,-18 6-13-16,-16 3 10 15,3 5-4-15,0 5 9 16,10 6 2-16,8 2 0 15,-4 2-4-15,10 0-3 16,7 0 7-16,0 0-21 16,24 0 18-16,41 0-4 15,38 0 7-15,24 0 5 0,-10 0 3 16,-20-14-7-16,-8-1-1 16,-20 6 0-16,-25 4 1 15,-37 5-1-15,-7 0-15 16,-17 0-177-16,-86 14-173 15</inkml:trace>
+  <inkml:trace contextRef="#ctx0" brushRef="#br0" timeOffset="-141260.73">8235 969 662 0,'0'0'198'0,"0"0"-36"16,0 0 3-16,0 0-52 0,0 0-82 16,378-74 62-16,-168 51-28 15,3-6-57-15,-13 6 24 16,-15 0-32-16,-20-3 1 16,-31 10-3-16,-30 4 2 15,-53 7-21-15,-30 5-27 16,-14 0-65-16,-7 0-39 15,-14 13-85-15,-82 22 37 16,-59 5-84-16,-31 6-86 16</inkml:trace>
+  <inkml:trace contextRef="#ctx0" brushRef="#br0" timeOffset="-141051.73">8414 1083 122 0,'0'0'215'0,"0"0"-32"0,0 0-13 15,0 0-13-15,0 0-24 16,0 0-20-16,-179 18-56 15,286-18-5-15,40-24 51 16,46 4-13-16,27-7-32 16,-3 0-24-16,-25 4-21 15,-30 3 24-15,-21 3-32 16,-45 5-2-16,-34 7 2 16,-41 5 0-16,-21 0-10 15,0 0-24-15,-38 9-241 16,-28 8-36-16</inkml:trace>
+  <inkml:trace contextRef="#ctx0" brushRef="#br2" timeOffset="-177136.919">6258 617 623 0,'0'0'141'0,"0"0"-4"0,0 0 27 16,0 0-59-16,0 0-15 15,0 0-8-15,21-3-17 16,-21 3 11-16,0 0-36 15,0 0 2-15,0 0 4 16,0 0-32-16,0 0 11 16,-7 0-4-16,-31 0-20 15,-21 0 18-15,-13 0-19 16,-3 7 0-16,-1 3-1 16,4 5 10-16,-11-2-9 15,25 0 0-15,6-5 3 0,21-3-8 16,24-2 5-1,1-3 0-15,6 0-4 0,0 0 0 16,0 0 2-16,0 0-6 16,0 0-12-16,0 0 19 15,0-8-29-15,0-13 20 16,0-1 4-16,6-4-5 16,18 1 10-16,-17-1 1 15,14 0 0-15,-7 4-6 16,3 5 6-16,-10 5 0 15,0 4-3-15,0 4 7 16,-7 2-4-16,6-1 0 0,-6 3 6 16,0 0-11-1,0 0 5-15,0 0 0 0,0 0-2 16,0 0 11-16,0 0-9 16,0 0 0-16,-34 23 3 15,-28 8 8-15,-3 3-8 16,-1-2 0-16,5 3 7 15,9-4-2-15,7-5-8 16,18 2 0-16,-4 1 2 16,17-8-5-16,14 9 3 15,0-4 0-15,21 0-4 16,30 2 13-16,25-8-7 16,6-5-2-16,15-7 4 15,-1-2 1-15,-31 0-5 16,-34-4-20-16,-31 6-72 15,-44 1-227-15,-60 6-502 16</inkml:trace>
+  <inkml:trace contextRef="#ctx0" brushRef="#br2" timeOffset="-172006.919">4553 700 646 0,'0'0'200'16,"0"0"-82"-16,0 0 54 16,0 0-51-16,0 0-45 15,0 0 14-15,0 0-40 16,0-17-6-16,6 14 1 15,-6 3-33-15,0 0 17 16,0 0-9-16,0 0-19 16,0 0 21-16,0 0-22 15,0 0 0-15,0 0 0 16,0 0-3-16,0 20-1 0,0 11 4 16,0 15 0-1,-13-3 1-15,13 0-1 0,0 0 0 16,0-6 0-1,0-3 5-15,0-8-7 0,20-6 2 16,4-6-5-16,14-4-6 16,-3-9 11-16,2-1 0 15,1 0 0-15,7 0 13 16,-7-11-13-16,-11-8 0 16,11-7 2-16,-7-6 0 15,-3-2 2-15,-4-6-4 16,-11 0 10-16,-6-4-1 15,-7 3 0-15,0 0-9 16,0 9 6-16,-7 3-3 16,-24 11-1-16,4 0-2 15,-11 6 0-15,0 10-1 16,0 2-3-16,4 0 4 0,-11 0-3 16,8 5-10-16,-1 16 1 15,10-2-29-15,11 1 0 16,-4 4-47-16,21 7-23 15,0 6-110-15,0-1-134 16</inkml:trace>
+  <inkml:trace contextRef="#ctx0" brushRef="#br2" timeOffset="-158506.919">5251 1909 264 0,'0'0'138'0,"0"0"-64"0,0 0 72 16,0 0-21-16,0 0-8 15,0 0-11-15,58 0 2 16,-58 0 9-16,0 0-45 15,0 0-19-15,0 0-11 0,0 0-31 16,-14 4 11 0,-24-2-4-16,-6 4-14 0,-1-4 21 15,-7 2-18-15,8-2 0 16,-1 2-1-16,-7-2 0 16,15 1-4-16,16-3-2 15,4 0 2-15,17 0-5 16,0 0 5-16,0 0-2 15,0 0 0-15,0 0-8 16,0 0-4-16,0 0-18 16,0-3-6-16,10-9 17 15,-3 4-6-15,7 2 22 16,-7 1-2-16,0-4-10 16,10 4 12-16,-10-4 3 15,-1 0 0-15,8 1-4 0,-7 0 4 16,10 2 0-16,-10 2 0 15,-7 4 4-15,0 0-13 16,0 0 9 0,0 0-3-16,0 0-5 0,0 0 7 15,0 0 1-15,0 0 0 16,0 0 9-16,0 0-14 16,0 0 8-16,-14 10-3 15,-23 9 14-15,-1 1-12 16,-14 4 1-16,8-8 5 15,13 2-3-15,10-10-1 16,14 1-4-16,0-1 2 0,7-2-9 16,0 2 9-16,0 1-2 15,0 0 2-15,14-1 6 16,13 0-4-16,11 1-4 16,0-3 1-16,-7 0-7 15,3-3-40-15,-10 1-46 16,-10-4-54-16,-14 0-97 15,-27 0-426-15</inkml:trace>
+  <inkml:trace contextRef="#ctx0" brushRef="#br2" timeOffset="-157846.919">4116 1901 347 0,'0'0'239'15,"0"0"-137"-15,0 0 22 16,0 0-26-16,0 0-5 15,0 0-39-15,14-4-22 0,-7 4 24 16,10-5-30 0,3 0 3-16,11-7 13 0,-3 1-16 15,3-2 18-15,-18 3-17 16,5 2-3-16,-18 1 18 16,7 2-29-16,-1 5 5 15,-6 0 0-15,0 0-15 16,0 0 2-16,0 0-5 15,0 0-7-15,0 0 6 16,0 9-12-16,0 17 13 16,0 5 3-16,0 3 3 15,0 0-3-15,0 1-3 16,0-4 0-16,0 2-6 16,0-12 11-16,0-1-5 15,0-5 0-15,0-10 6 0,0-2-10 16,0-3 4-1,0 0 0-15,0 0-2 0,-31 0 8 16,4 3-6 0,-4-3 0-16,17 0 10 0,7 0-11 15,7 0 1-15,0 0 0 16,0 0-5-16,0 0 0 16,0 0 5-16,28 0-1 15,23 0 5-15,18 0-11 16,-3 0-6-16,9 0-64 15,-16 0-39-15,-15 0-109 16,8 0-64-16,0-11-214 16</inkml:trace>
 </inkml:ink>
 </file>
 
@@ -2374,7 +2374,7 @@
   <inkml:trace contextRef="#ctx0" brushRef="#br0" timeOffset="40938">2900 2311 368 0,'0'0'105'0,"0"0"9"15,0 0 26-15,0 0-7 0,0 0-60 16,0 0-24-16,-28-26-27 16,28 20 14-16,28-7-24 15,16 0-9-15,8 2 3 16,17 4-6-16,-4-2-11 16,-7-3-93-16,-13 6-123 15,-7 1-77-15</inkml:trace>
   <inkml:trace contextRef="#ctx0" brushRef="#br0" timeOffset="41398">3137 1819 493 0,'0'0'155'0,"0"0"-15"0,0 0-53 16,0 0 41-16,-258-148-36 15,213 137-39-15,8 11 10 16,-1 0-27-16,0 0-13 16,3 34-23-16,-9 17 10 15,-1 18-17-15,14 10 12 16,4 17-5-16,3 12 0 16,17 0 6-16,7 4-6 15,0-3 0-15,44-18 5 16,39-5-9-16,3-23 4 0,14-17 0 15,10-21 4-15,-7-19 3 16,0-6-3-16,-7-4 6 16,-6-32 16-16,-1-16 36 15,-7-13-12-15,-9-18-7 16,-15-17 6-16,-20-15-32 16,-31-8 22-16,-7 1-17 15,-28 7-21-15,-54 12 11 16,-21 11-11-16,-25 19-1 15,12 15 0-15,12 24 10 16,8 17-12-16,20 17 2 16,18 0-9-16,13 40 5 0,8 31-3 15,16 29-59-15,11 21-20 16,10 13-121-16,0 8-162 16</inkml:trace>
   <inkml:trace contextRef="#ctx0" brushRef="#br0" timeOffset="42262">3849 3975 462 0,'0'0'252'0,"0"0"-129"15,0 0 3-15,0 0 40 16,0 0-67-16,0 0-12 15,-7-9-25-15,7 9-30 16,0 0 5-16,0 0-30 16,0 0 2-16,0 15-9 15,-7 16 10-15,-7 11 7 16,-10 8-2-16,10-8-10 16,-3 5 4-16,10-7-9 15,0-6 0-15,7-5-1 16,0-10 10-16,0-4-9 15,0-10 0-15,0-2 0 16,14-3-2-16,10 0 3 0,14 0-1 16,-4 0 1-16,4 0 5 15,7 0-6-15,0 0 0 16,-8 0 4-16,-6-12-5 16,-3 1 1-16,-14 0 0 15,-4 3 0-15,-3-2 11 16,-7 2-7-16,0-3 2 15,0-4 5-15,0 4 23 16,0-1-24-16,-24 1-1 16,10 2 16-16,0 4-23 0,-3 2 10 15,17 3 2 1,0 0-11-16,0 0 11 0,0 0-14 16,0 0 0-16,0 0 0 15,0 14-14-15,0 26 14 16,0 9 0-16,0 6 7 15,0 7-10-15,10-2 3 16,-3 3 0-16,7-3-1 16,-14-11-3-16,7-9-13 15,-7-11-96-15,0-15-164 16,0-6-204-16</inkml:trace>
-  <inkml:trace contextRef="#ctx0" brushRef="#br1" timeOffset="-2.14748E6">1597 2122 462 0,'0'0'173'15,"0"0"-68"-15,0 0 43 16,0 0-49-16,0 0-25 16,0 0-10-16,0 0 20 15,13 0 11-15,1-2-31 16,17-18-22-16,0-6-4 16,3-3-33-16,4-5 13 15,-7-6 19-15,7-3-37 16,-11 3 20-16,4 9-20 15,-24 14 8-15,0 11 1 16,-7 6-9-16,0 0 0 16,0 0-2-16,0 0-11 0,0 0 9 15,-27 20-9-15,-11 9 13 16,0-1 10-16,17 1-10 16,4-1 0-16,10 4-9 15,7-3-1-15,0-4 7 16,0-2-2-16,38-9-22 15,7-3 24-15,6-5-21 16,1-6-6-16,-1 0-15 16,1 0-67-16,-14 0-5 15,-17-2-76-15,-11-18-23 16,-10-6-61-16</inkml:trace>
+  <inkml:trace contextRef="#ctx0" brushRef="#br1" timeOffset="3.647">1597 2122 462 0,'0'0'173'15,"0"0"-68"-15,0 0 43 16,0 0-49-16,0 0-25 16,0 0-10-16,0 0 20 15,13 0 11-15,1-2-31 16,17-18-22-16,0-6-4 16,3-3-33-16,4-5 13 15,-7-6 19-15,7-3-37 16,-11 3 20-16,4 9-20 15,-24 14 8-15,0 11 1 16,-7 6-9-16,0 0 0 16,0 0-2-16,0 0-11 0,0 0 9 15,-27 20-9-15,-11 9 13 16,0-1 10-16,17 1-10 16,4-1 0-16,10 4-9 15,7-3-1-15,0-4 7 16,0-2-2-16,38-9-22 15,7-3 24-15,6-5-21 16,1-6-6-16,-1 0-15 16,1 0-67-16,-14 0-5 15,-17-2-76-15,-11-18-23 16,-10-6-61-16</inkml:trace>
 </inkml:ink>
 </file>
 
@@ -2608,25 +2608,25 @@
   <inkml:trace contextRef="#ctx0" brushRef="#br0" timeOffset="661">2587 921 539 0,'0'0'193'0,"0"0"-45"0,0 0 3 15,0 0-25-15,0 0-83 0,0 0-28 16,-45 38 29-1,121 4-24-15,-4 2 13 0,17-2-26 16,-6-1-5-16,-1-1 4 16,-10-1-6-16,-3-1-71 15,-10-7-157-15,-8-5-127 16</inkml:trace>
   <inkml:trace contextRef="#ctx0" brushRef="#br0" timeOffset="808">3137 1022 279 0,'0'0'276'0,"0"0"-134"0,0 0-12 15,0 0-38 1,-237-49-3-16,178 64-54 16,-17 25-13-16,-13 13 22 0,7 5-40 15,16 0 5-15,22 1-9 16,30-1-127-16,14 5-300 15</inkml:trace>
   <inkml:trace contextRef="#ctx0" brushRef="#br0" timeOffset="1305">3106 456 553 0,'0'0'216'0,"-399"-192"-105"15,162 109-19-15,-25 12-11 16,5 20-29-16,6 22 1 16,13 29-44-16,8 25 6 15,6 70-7-15,1 42 0 16,10 41 6-16,6 18-14 15,36 16 0-15,50 6 0 16,56 1 4-16,58 8-4 16,38-2 0-16,124-13-28 15,75-20 21-15,66-30 7 0,58-33 0 16,31-32 3 0,17-39 8-16,-10-47-10 0,-13-11-1 15,-39-69 9-15,-34-44 5 16,-41-36 28-16,-56-38 44 15,-54-38 22-15,-52-24-49 16,-65-23-3-16,-38-2-26 16,-134 15-28-16,-83 20 5 15,-71 31-7-15,-67 38 0 16,-37 54-12-16,-30 50 1 16,-1 51 11-16,31 19 0 15,34 56-35-15,62 25-59 16,45 18-124-16,21-1-150 15</inkml:trace>
-  <inkml:trace contextRef="#ctx0" brushRef="#br1" timeOffset="380818">84 2953 414 0,'0'0'68'15,"0"0"15"-15,0 0-6 16,0 0 33-16,0 0-53 16,0 0-46-16,-83 0 13 15,83 0-22-15,0 0 26 0,14 3-2 16,30 0-4 0,15-3 29-16,10 0-14 0,-11 0-9 15,1 0 32-15,-15 0-22 16,-6 0-11-16,-14-3 14 15,-3-5-11-15,-21-4 22 16,0 1-20-16,0-1-23 16,0-6 19-16,-7 5-27 15,-24-2 1-15,-14 4 3 16,18 6 3-16,-4-2-8 16,17 5 0-16,-3-2 5 15,10 4-8-15,7 0 3 16,0 0 0-16,0 0-5 15,0 0-1-15,0 0 6 16,7 0-4-16,24 13 4 0,14 0 1 16,-15 7-1-16,-2 1 0 15,3 1-5-15,-17 4 10 16,10-3-5-16,-24 3 0 16,0-2 2-16,0 3-8 15,-24 1 6-15,-21 4-89 16,0-4-113-16,25-4-61 15,13-10-232-15</inkml:trace>
-  <inkml:trace contextRef="#ctx0" brushRef="#br1" timeOffset="381283">892 2948 395 0,'0'0'220'16,"0"0"-90"-16,0 0-3 16,0 0-22-16,0 0-25 15,0 0-49-15,0-58 4 16,0 58-25-16,0 0-5 16,13 0-10-16,8 0 2 15,3 3 3-15,-10 20-2 16,-7 9 1-16,10-4-1 15,-10 6 2-15,-7-2 0 0,0-7-5 16,0-5 7 0,0-8-2-16,7-6 0 0,-7-6 8 15,0 0-6-15,0 0 3 16,0 0 2-16,0-12 31 16,0-16-37-16,6-1 16 15,1-3 10-15,11 1-16 16,-5 3 11-16,1 2-22 15,10 8 3-15,-3 7-6 16,-8 11 3-16,12 0-3 16,6 0 2-16,-4 0-9 15,4 23 2-15,-10 3 8 0,-4 3-64 16,3 1-52 0,-13-2-99-16,10-12-139 0</inkml:trace>
-  <inkml:trace contextRef="#ctx0" brushRef="#br1" timeOffset="381471">1490 2982 421 0,'0'0'172'0,"0"0"-80"16,0 0 20-16,0 0-27 15,0 0-70-15,0 0-6 16,120-34-9-16,-61 34 0 15,-1-3-5-15,1-2-50 16,-15 5-84-16,-13-1-37 0,-10-2-227 16</inkml:trace>
-  <inkml:trace contextRef="#ctx0" brushRef="#br1" timeOffset="381677">1937 2856 336 0,'0'0'182'0,"0"0"-58"15,0 0-5-15,0 0 0 16,0 0-27-16,0 0-42 16,0-46 3-16,0 46-53 15,0 12 5-15,0 19-12 16,0 11 14-16,0 3-4 0,0 3-3 16,7-6 5-1,0-2-12-15,-1-8-100 0,8-10-128 16,-3-5-334-16</inkml:trace>
-  <inkml:trace contextRef="#ctx0" brushRef="#br1" timeOffset="382104">1689 2504 372 0,'0'0'236'0,"-251"-77"-106"0,141 57-15 16,7 11 17 0,7 9-52-16,0 6-43 0,13 40-4 15,0 20-32-15,18 11 13 16,14 18-12-16,27 7 7 16,17 13-3-16,7 2-6 15,7 5 0-15,44 2 2 16,25-13 6-16,20-11-8 15,38-22 0-15,35-27 5 16,30-26 1-16,25-25-3 16,-8 0-1-16,-16-45 34 15,-22-13 8-15,-30-10 35 0,-24-18-8 16,-17-14-16 0,-35-14 26-16,-28-15-53 0,-30-11 8 15,-14-1-5 1,-65 10-28-16,-55 14 16 0,-49 29-19 15,-23 27 0-15,-39 39-10 16,-20 22-2-16,-3 37-75 16,27 34-138-16,34 12-263 15</inkml:trace>
-  <inkml:trace contextRef="#ctx0" brushRef="#br1" timeOffset="405979">496 3357 675 0,'0'0'190'0,"0"0"-38"0,0 0-25 16,0 0-23-16,0 0-4 15,0 0-68-15,0 0-23 16,-14-73-9-16,14 108 6 16,0 13-6-16,0 7 2 15,0 2 4-15,-13 0 10 16,6 1-16-16,-4-7 0 16,-2 0 4-16,13-5 8 15,0-3-12-15,0-3 0 16,0-9 1-16,0-11-4 15,13-5 5-15,12-4-2 16,12-8 3-16,36-3 6 16,16 0-1-16,45 0-8 0,14-20 1 15,7 0 5 1,23-3-2-16,15 0-4 0,0 7 0 16,-8-4 12-16,-13-1-12 15,-24 1 0-15,-31-2 0 16,-4-2 5-16,-40 4-4 15,-15 3 12-15,-20 5 15 16,-24-2-19-16,-4 0 34 16,-3-9-7-16,-7-5-22 15,0-7 13-15,0-1-23 16,-24 1 6-16,-4-3-1 16,-3 1 0-16,0 3 2 0,4 3-11 15,3 3 7-15,3 4-11 16,14 4 7-16,-10 10-3 15,10 1 0-15,0 9-22 16,7 0-52-16,0 0-99 16,14 5-213-16,31 9-116 15</inkml:trace>
-  <inkml:trace contextRef="#ctx0" brushRef="#br1" timeOffset="406532">3412 2828 507 0,'0'0'152'15,"0"0"-65"-15,0 0-13 16,0 0-20-16,0 0-29 15,0 0-14-15,124-6 18 16,-66 6 5-16,4 0 2 16,-4 0 21-16,-13 0-30 15,-14 0 12-15,-17 0-7 16,-7 0-21-16,-7 0 27 0,0 0-8 16,0-3-2-1,0-9 0-15,0-8-21 0,0 3-4 16,-14-3-3-16,-17 0 9 15,-7 0-5-15,-6 3-4 16,-1 0 0-16,10 2 4 16,11 7 3-16,18 2-7 15,6 6 0-15,0 0 7 16,0 0-17-16,13 0 7 16,39 6 3-16,17 14 1 15,3 3 9-15,-3-3-10 16,-11 3 5-16,0-1 3 15,-6 2-1-15,-14-5-7 16,-14-4 0-16,-10-1 1 16,-14-5 6-16,0 2-7 0,0 5 0 15,-45-1 2-15,-13 2-9 16,-4 1-85-16,10 2-106 16,25 0-56-16,27-11-356 15</inkml:trace>
-  <inkml:trace contextRef="#ctx0" brushRef="#br1" timeOffset="407009">4619 2567 538 0,'0'0'260'0,"0"0"-112"0,0 0 1 15,0 0-41-15,0 0-70 16,0 0-13-16,0 94 34 15,0-31-37-15,0 0 15 16,7 1-34-16,6-8 17 16,-2-10-18-16,2-15 4 15,-6-11 0-15,0-14-4 16,-7-6-2-16,0 0 26 16,17-17 23-16,-10-28 43 15,7-16-92-15,0-4 8 16,-7-7-2-16,-7 3-4 15,0-2-2-15,-7-1 0 16,-14 1 12-16,-10-3-14 16,17 5 2-16,8 7 0 15,-1 7-5-15,7 18 6 0,0 14-1 16,0 12 0-16,20 5-1 16,25 6-6-16,13 0 7 15,11 23 0-15,3 19-9 16,4 7 11-16,-17 8-2 15,-15 1 0-15,-13-1 1 16,-17-3-10-16,-14-3 9 16,0-2-34-16,-45 0-42 15,-20-4-72-15,-4-1-66 16,18-8-79-16,13 0-226 16</inkml:trace>
-  <inkml:trace contextRef="#ctx0" brushRef="#br1" timeOffset="408336">5650 2830 540 0,'0'0'186'0,"0"0"-51"16,0 0-26-16,0 0-14 15,0 0-13-15,0 0-31 16,-96-140-4-16,65 140-24 15,-7 0-14-15,-6 12-12 16,-1 19 3-16,17 9 0 16,4 0-8-16,24-2 10 0,0-2-2 15,0-10 0-15,17-3 9 16,11-11-9-16,10-7 0 16,-7-5 0-16,-11 0 12 15,1 0-6-15,10-14 0 16,-7-9-6-16,-10-9 13 15,6 1-5-15,4-3-3 16,-17 0 1-16,-7 8 30 16,0 8-28-16,0 4 16 15,0 11-7-15,0 1-11 16,0 2 3-16,0 0-9 16,0 0-13-16,0 19 9 0,0 15 3 15,0 4 1-15,31 0 0 16,-3-7 7-16,10 0-10 15,-1-8 3-15,8-9 0 16,-10-8 1-16,-5-6 11 16,15 0-12-16,-7-11 3 15,0-21 8-15,6-2-8 16,-16-3-3-16,3-1 0 16,-4 7 2-16,-9 8 3 15,2 12-5-15,-3 8 0 16,4 3 0-16,10 0-10 15,14 16 8-15,-4 13 2 16,-3 0-5-16,-7-3 8 0,-4-4-3 16,-3-7 0-1,7-6 5-15,-10-9-8 0,3 0 3 16,4 0 0-16,9-13 5 16,1-18 4-16,-3-9-9 15,-5-6 0-15,-16-2 5 16,-14 3-6-16,0-1 1 15,0 9 0-15,-14 5 15 16,-6 12-13-16,-4 9 11 16,3 11-13-16,4 0 3 15,3 29-8-15,7 22 5 16,7 6 0-16,0 1-2 16,7-7 12-16,45-6-10 15,-1-7 0-15,8-11 3 0,3-6-4 16,-11-10 1-16,-6-1 0 15,-7-10-1-15,-4 0 14 16,-3 0-12-16,-10-4-1 16,3-16 3-16,3 0-5 15,-3 1 3-15,-10 1-1 16,3 10 0-16,-10 2 9 16,0 6-14-16,-7 0 5 15,0 0-5-15,14 0-2 16,3 12 0-16,-3 8 7 15,0-4 0-15,-1-1 6 16,-2-4-7-16,-5-2 1 16,1-3 0-16,0-4-4 0,-7-2 4 15,0 0 0-15,7 0-1 16,17 0 14-16,4-2-14 16,3-16 1-16,0 4 0 15,-18 5-3-15,-6 7 5 16,0-2-2-16,0 4 0 15,10 0 0-15,-3 0-7 16,7 4 6-16,9 13 1 16,-5-1-6-16,2-4 7 15,11-3-1-15,7-3 0 16,-1-6 12-16,8 0-16 16,-7 0 4-16,-1-27 0 0,-6-4 2 15,-10-11 1-15,-4-10-3 16,-11-8 0-16,-6-9 12 15,-7-5-7-15,0 6 4 16,0 4-2-16,-31 20 33 16,4 12-32-16,-4 14 9 15,17 18-15-15,0 0-1 16,4 46-1-16,3 26 0 16,7 16 0-16,0 4-7 15,24-4 14-15,35-8-14 16,6-14-6-16,11-12-110 15,6-17-58-15,-16-13-110 16,-22-14-53-16,-23-10-302 16</inkml:trace>
-  <inkml:trace contextRef="#ctx0" brushRef="#br1" timeOffset="408500">7679 2693 441 0,'0'0'182'0,"0"0"-14"15,0 0-100-15,0 0-48 16,217-38-3-16,-114 38-11 16,0 0 1-16,-21 0-7 15,-23 0-7-15,-28 12-126 16,-31 5-200-16</inkml:trace>
-  <inkml:trace contextRef="#ctx0" brushRef="#br1" timeOffset="412041">8459 2287 13 0,'0'0'5'0,"0"0"1"16,0 0-4-16,0 0 0 15,0 0-2-15,0 0-28 16</inkml:trace>
-  <inkml:trace contextRef="#ctx0" brushRef="#br1" timeOffset="433493">9821 2681 481 0,'0'0'177'0,"0"0"-34"15,0 0-20-15,0 0-6 16,0 0-36-16,0 0-10 16,-21-68-10-16,21 48-27 15,0 3 25-15,0-7-38 16,14 5-19-16,10 5 22 15,4 1-22-15,-4 8-2 0,3 5 0 16,11 0 2-16,7 5-8 16,0 27 6-16,-1 7-2 15,-13 9-12-15,-17-3 13 16,0 1 1-16,-14-12 0 16,0-4 8-16,0-14-12 15,0-8 4-15,0-8 0 16,0 0 1-16,0 0 8 15,0 0-6-15,0 0 15 16,0-19-12-16,0-14 10 16,0-6-16-16,31-7 2 15,13-6 1-15,15-4 1 16,-1 10-4-16,-13 8 0 0,-7 22 10 16,-7 16-23-16,-11 0 13 15,11 20-5-15,-3 22-6 16,3 10 4-16,-11 2 7 15,4-3 0-15,-3-2 6 16,-4-6-18-16,-3-6-22 16,-7-8-60-16,-7-3-16 15,0-9-126-15,0-9-98 16</inkml:trace>
-  <inkml:trace contextRef="#ctx0" brushRef="#br1" timeOffset="434072">8645 2775 469 0,'0'0'119'0,"0"0"-34"16,0 0 64-16,0 0-63 15,0 0-31-15,0 0-34 0,21 0-13 16,37-2 18-16,18-6-12 16,3-5 19-16,-10 5 29 15,-4-3-46-15,-20 2 7 16,-14 1-13-16,-11 2-4 15,-13 0 10-15,-7 0-15 16,0-2 0-16,0-4 10 16,0 4-7-16,-20-3-4 15,-18-1 0-15,0 4 6 16,10-1-11-16,-3 0 5 16,4 3 0-16,10 1-1 15,3 2 10-15,14 3-9 0,0-2 0 16,0 2 5-1,0 0-17-15,0 0 12 0,0 0 0 16,0 0-7-16,21 0 10 16,16 2-3-16,8 16 0 15,0 4 3-15,-7 4-10 16,-1 3 7-16,-9 2 0 16,-4-5-2-16,-17-4 7 15,-7 1-7-15,0-3 2 16,-14 4-19-16,-31-5-38 15,8 4-118-15,6-6-126 16</inkml:trace>
-  <inkml:trace contextRef="#ctx0" brushRef="#br1" timeOffset="434432">11066 2627 512 0,'0'0'136'0,"0"0"-11"0,0 0 2 16,0 0-14-16,0 0-61 16,0 0-29-16,-28 18 18 15,28-16-31-15,0-2 3 16,7 0 3-16,14 0-13 16,23 0 13-16,1 0-16 15,17 0-7-15,-21 0-61 16,14 0-192-16,-10 0-218 15</inkml:trace>
-  <inkml:trace contextRef="#ctx0" brushRef="#br1" timeOffset="434820">11667 2396 579 0,'0'0'140'0,"0"0"1"16,0 0-39-16,0 0-44 16,0 0-8-16,0 0-46 15,141-46 1-15,-96 49 0 16,0 11 4-16,-7 10 9 16,-18-3-8-16,-13 8-9 15,-7 9 28-15,0 2-28 0,-27 5 21 16,-35 4 7-1,10-3-27-15,1-9 22 0,13-9-24 16,24-8 0-16,7-5-1 16,0-7 10-16,7-2-9 15,0 1 0-15,7-2 10 16,45-5 2-16,37 0-12 16,14 0 2-16,7-12-3 15,-3-9 1-15,-18 8-23 16,-30 7-25-16,-32 6-53 15,-27 0-52-15,0 0-134 16</inkml:trace>
-  <inkml:trace contextRef="#ctx0" brushRef="#br1" timeOffset="435122">9941 3093 397 0,'0'0'200'16,"0"0"-66"-16,0 0-6 16,0 0 14-16,0 0-40 15,0 0-67-15,214 0 5 16,-5-8 6-16,49-7 14 16,17-2 0-16,7-3-47 15,-17 3 10-15,-17 3-20 16,-22-4 8-16,-40 7-13 0,-38 2 2 15,-59 4 0-15,-44 5-6 16,-31 0 0-16,-14 0-25 16,-52 23-86-16,-51 8-74 15,-59 9-89-15,-30 4-274 16</inkml:trace>
-  <inkml:trace contextRef="#ctx0" brushRef="#br1" timeOffset="435404">10994 3361 421 0,'0'0'123'0,"0"0"-32"0,0 0 18 15,0 0-26 1,0 0-26-16,0 0 1 16,223 21-38-16,-202-7 13 0,-14 0-15 15,-7 6-11-15,0 4 24 16,0 4-13-16,-28 1 6 15,-17-4 5-15,21-7-29 16,10-7 25-16,8-6-23 16,6 4-1-16,0 0 14 15,20-3-14-15,49-4 9 16,41-2 1-16,31 0-11 16,27-17-2-16,11-14-156 15,-7-13-214-15</inkml:trace>
-  <inkml:trace contextRef="#ctx0" brushRef="#br1" timeOffset="435743">12314 1898 680 0,'0'0'180'0,"0"0"-86"0,0 0 34 15,0 0 2 1,0 0-91-16,0 0-20 0,7 26-17 16,58 54-2-16,18 26 40 15,-1 17-27-15,14 22 25 16,-10 13-9-16,4 4-24 15,-28 9 11-15,-35 4-16 16,-27 2 0-16,-20 1-8 16,-77 6 0-16,-51-2-110 15,-61-10-172-15,-49-21-699 16</inkml:trace>
-  <inkml:trace contextRef="#ctx0" brushRef="#br1" timeOffset="436343">10007 2007 366 0,'0'0'162'0,"0"0"-59"0,0 0 19 16,0 0-9-1,-83-149-32-15,56 132 5 0,13 8-29 16,-10 9 6-16,-14 0-28 16,-7 13-31-16,1 35 32 15,-8 17-17-15,-6 32 9 16,-1 29 26-16,1 34-17 16,-11 29 17-16,10 11-15 15,15 10-30-15,44 3 33 16,31-19-42-16,130-8 1 15,114-23-1-15,104-25 0 16,57-33-5-16,-6-30-130 16,-96-24-367-16</inkml:trace>
+  <inkml:trace contextRef="#ctx0" brushRef="#br1" timeOffset="-48678.73">84 2953 414 0,'0'0'68'15,"0"0"15"-15,0 0-6 16,0 0 33-16,0 0-53 16,0 0-46-16,-83 0 13 15,83 0-22-15,0 0 26 0,14 3-2 16,30 0-4 0,15-3 29-16,10 0-14 0,-11 0-9 15,1 0 32-15,-15 0-22 16,-6 0-11-16,-14-3 14 15,-3-5-11-15,-21-4 22 16,0 1-20-16,0-1-23 16,0-6 19-16,-7 5-27 15,-24-2 1-15,-14 4 3 16,18 6 3-16,-4-2-8 16,17 5 0-16,-3-2 5 15,10 4-8-15,7 0 3 16,0 0 0-16,0 0-5 15,0 0-1-15,0 0 6 16,7 0-4-16,24 13 4 0,14 0 1 16,-15 7-1-16,-2 1 0 15,3 1-5-15,-17 4 10 16,10-3-5-16,-24 3 0 16,0-2 2-16,0 3-8 15,-24 1 6-15,-21 4-89 16,0-4-113-16,25-4-61 15,13-10-232-15</inkml:trace>
+  <inkml:trace contextRef="#ctx0" brushRef="#br1" timeOffset="-48213.73">892 2948 395 0,'0'0'220'16,"0"0"-90"-16,0 0-3 16,0 0-22-16,0 0-25 15,0 0-49-15,0-58 4 16,0 58-25-16,0 0-5 16,13 0-10-16,8 0 2 15,3 3 3-15,-10 20-2 16,-7 9 1-16,10-4-1 15,-10 6 2-15,-7-2 0 0,0-7-5 16,0-5 7 0,0-8-2-16,7-6 0 0,-7-6 8 15,0 0-6-15,0 0 3 16,0 0 2-16,0-12 31 16,0-16-37-16,6-1 16 15,1-3 10-15,11 1-16 16,-5 3 11-16,1 2-22 15,10 8 3-15,-3 7-6 16,-8 11 3-16,12 0-3 16,6 0 2-16,-4 0-9 15,4 23 2-15,-10 3 8 0,-4 3-64 16,3 1-52 0,-13-2-99-16,10-12-139 0</inkml:trace>
+  <inkml:trace contextRef="#ctx0" brushRef="#br1" timeOffset="-48025.73">1490 2982 421 0,'0'0'172'0,"0"0"-80"16,0 0 20-16,0 0-27 15,0 0-70-15,0 0-6 16,120-34-9-16,-61 34 0 15,-1-3-5-15,1-2-50 16,-15 5-84-16,-13-1-37 0,-10-2-227 16</inkml:trace>
+  <inkml:trace contextRef="#ctx0" brushRef="#br1" timeOffset="-47819.73">1937 2856 336 0,'0'0'182'0,"0"0"-58"15,0 0-5-15,0 0 0 16,0 0-27-16,0 0-42 16,0-46 3-16,0 46-53 15,0 12 5-15,0 19-12 16,0 11 14-16,0 3-4 0,0 3-3 16,7-6 5-1,0-2-12-15,-1-8-100 0,8-10-128 16,-3-5-334-16</inkml:trace>
+  <inkml:trace contextRef="#ctx0" brushRef="#br1" timeOffset="-47392.73">1689 2504 372 0,'0'0'236'0,"-251"-77"-106"0,141 57-15 16,7 11 17 0,7 9-52-16,0 6-43 0,13 40-4 15,0 20-32-15,18 11 13 16,14 18-12-16,27 7 7 16,17 13-3-16,7 2-6 15,7 5 0-15,44 2 2 16,25-13 6-16,20-11-8 15,38-22 0-15,35-27 5 16,30-26 1-16,25-25-3 16,-8 0-1-16,-16-45 34 15,-22-13 8-15,-30-10 35 0,-24-18-8 16,-17-14-16 0,-35-14 26-16,-28-15-53 0,-30-11 8 15,-14-1-5 1,-65 10-28-16,-55 14 16 0,-49 29-19 15,-23 27 0-15,-39 39-10 16,-20 22-2-16,-3 37-75 16,27 34-138-16,34 12-263 15</inkml:trace>
+  <inkml:trace contextRef="#ctx0" brushRef="#br1" timeOffset="-23517.73">496 3357 675 0,'0'0'190'0,"0"0"-38"0,0 0-25 16,0 0-23-16,0 0-4 15,0 0-68-15,0 0-23 16,-14-73-9-16,14 108 6 16,0 13-6-16,0 7 2 15,0 2 4-15,-13 0 10 16,6 1-16-16,-4-7 0 16,-2 0 4-16,13-5 8 15,0-3-12-15,0-3 0 16,0-9 1-16,0-11-4 15,13-5 5-15,12-4-2 16,12-8 3-16,36-3 6 16,16 0-1-16,45 0-8 0,14-20 1 15,7 0 5 1,23-3-2-16,15 0-4 0,0 7 0 16,-8-4 12-16,-13-1-12 15,-24 1 0-15,-31-2 0 16,-4-2 5-16,-40 4-4 15,-15 3 12-15,-20 5 15 16,-24-2-19-16,-4 0 34 16,-3-9-7-16,-7-5-22 15,0-7 13-15,0-1-23 16,-24 1 6-16,-4-3-1 16,-3 1 0-16,0 3 2 0,4 3-11 15,3 3 7-15,3 4-11 16,14 4 7-16,-10 10-3 15,10 1 0-15,0 9-22 16,7 0-52-16,0 0-99 16,14 5-213-16,31 9-116 15</inkml:trace>
+  <inkml:trace contextRef="#ctx0" brushRef="#br1" timeOffset="-22964.73">3412 2828 507 0,'0'0'152'15,"0"0"-65"-15,0 0-13 16,0 0-20-16,0 0-29 15,0 0-14-15,124-6 18 16,-66 6 5-16,4 0 2 16,-4 0 21-16,-13 0-30 15,-14 0 12-15,-17 0-7 16,-7 0-21-16,-7 0 27 0,0 0-8 16,0-3-2-1,0-9 0-15,0-8-21 0,0 3-4 16,-14-3-3-16,-17 0 9 15,-7 0-5-15,-6 3-4 16,-1 0 0-16,10 2 4 16,11 7 3-16,18 2-7 15,6 6 0-15,0 0 7 16,0 0-17-16,13 0 7 16,39 6 3-16,17 14 1 15,3 3 9-15,-3-3-10 16,-11 3 5-16,0-1 3 15,-6 2-1-15,-14-5-7 16,-14-4 0-16,-10-1 1 16,-14-5 6-16,0 2-7 0,0 5 0 15,-45-1 2-15,-13 2-9 16,-4 1-85-16,10 2-106 16,25 0-56-16,27-11-356 15</inkml:trace>
+  <inkml:trace contextRef="#ctx0" brushRef="#br1" timeOffset="-22487.73">4619 2567 538 0,'0'0'260'0,"0"0"-112"0,0 0 1 15,0 0-41-15,0 0-70 16,0 0-13-16,0 94 34 15,0-31-37-15,0 0 15 16,7 1-34-16,6-8 17 16,-2-10-18-16,2-15 4 15,-6-11 0-15,0-14-4 16,-7-6-2-16,0 0 26 16,17-17 23-16,-10-28 43 15,7-16-92-15,0-4 8 16,-7-7-2-16,-7 3-4 15,0-2-2-15,-7-1 0 16,-14 1 12-16,-10-3-14 16,17 5 2-16,8 7 0 15,-1 7-5-15,7 18 6 0,0 14-1 16,0 12 0-16,20 5-1 16,25 6-6-16,13 0 7 15,11 23 0-15,3 19-9 16,4 7 11-16,-17 8-2 15,-15 1 0-15,-13-1 1 16,-17-3-10-16,-14-3 9 16,0-2-34-16,-45 0-42 15,-20-4-72-15,-4-1-66 16,18-8-79-16,13 0-226 16</inkml:trace>
+  <inkml:trace contextRef="#ctx0" brushRef="#br1" timeOffset="-21160.73">5650 2830 540 0,'0'0'186'0,"0"0"-51"16,0 0-26-16,0 0-14 15,0 0-13-15,0 0-31 16,-96-140-4-16,65 140-24 15,-7 0-14-15,-6 12-12 16,-1 19 3-16,17 9 0 16,4 0-8-16,24-2 10 0,0-2-2 15,0-10 0-15,17-3 9 16,11-11-9-16,10-7 0 16,-7-5 0-16,-11 0 12 15,1 0-6-15,10-14 0 16,-7-9-6-16,-10-9 13 15,6 1-5-15,4-3-3 16,-17 0 1-16,-7 8 30 16,0 8-28-16,0 4 16 15,0 11-7-15,0 1-11 16,0 2 3-16,0 0-9 16,0 0-13-16,0 19 9 0,0 15 3 15,0 4 1-15,31 0 0 16,-3-7 7-16,10 0-10 15,-1-8 3-15,8-9 0 16,-10-8 1-16,-5-6 11 16,15 0-12-16,-7-11 3 15,0-21 8-15,6-2-8 16,-16-3-3-16,3-1 0 16,-4 7 2-16,-9 8 3 15,2 12-5-15,-3 8 0 16,4 3 0-16,10 0-10 15,14 16 8-15,-4 13 2 16,-3 0-5-16,-7-3 8 0,-4-4-3 16,-3-7 0-1,7-6 5-15,-10-9-8 0,3 0 3 16,4 0 0-16,9-13 5 16,1-18 4-16,-3-9-9 15,-5-6 0-15,-16-2 5 16,-14 3-6-16,0-1 1 15,0 9 0-15,-14 5 15 16,-6 12-13-16,-4 9 11 16,3 11-13-16,4 0 3 15,3 29-8-15,7 22 5 16,7 6 0-16,0 1-2 16,7-7 12-16,45-6-10 15,-1-7 0-15,8-11 3 0,3-6-4 16,-11-10 1-16,-6-1 0 15,-7-10-1-15,-4 0 14 16,-3 0-12-16,-10-4-1 16,3-16 3-16,3 0-5 15,-3 1 3-15,-10 1-1 16,3 10 0-16,-10 2 9 16,0 6-14-16,-7 0 5 15,0 0-5-15,14 0-2 16,3 12 0-16,-3 8 7 15,0-4 0-15,-1-1 6 16,-2-4-7-16,-5-2 1 16,1-3 0-16,0-4-4 0,-7-2 4 15,0 0 0-15,7 0-1 16,17 0 14-16,4-2-14 16,3-16 1-16,0 4 0 15,-18 5-3-15,-6 7 5 16,0-2-2-16,0 4 0 15,10 0 0-15,-3 0-7 16,7 4 6-16,9 13 1 16,-5-1-6-16,2-4 7 15,11-3-1-15,7-3 0 16,-1-6 12-16,8 0-16 16,-7 0 4-16,-1-27 0 0,-6-4 2 15,-10-11 1-15,-4-10-3 16,-11-8 0-16,-6-9 12 15,-7-5-7-15,0 6 4 16,0 4-2-16,-31 20 33 16,4 12-32-16,-4 14 9 15,17 18-15-15,0 0-1 16,4 46-1-16,3 26 0 16,7 16 0-16,0 4-7 15,24-4 14-15,35-8-14 16,6-14-6-16,11-12-110 15,6-17-58-15,-16-13-110 16,-22-14-53-16,-23-10-302 16</inkml:trace>
+  <inkml:trace contextRef="#ctx0" brushRef="#br1" timeOffset="-20996.73">7679 2693 441 0,'0'0'182'0,"0"0"-14"15,0 0-100-15,0 0-48 16,217-38-3-16,-114 38-11 16,0 0 1-16,-21 0-7 15,-23 0-7-15,-28 12-126 16,-31 5-200-16</inkml:trace>
+  <inkml:trace contextRef="#ctx0" brushRef="#br1" timeOffset="-17455.73">8459 2287 13 0,'0'0'5'0,"0"0"1"16,0 0-4-16,0 0 0 15,0 0-2-15,0 0-28 16</inkml:trace>
+  <inkml:trace contextRef="#ctx0" brushRef="#br1" timeOffset="3996.27">9821 2681 481 0,'0'0'177'0,"0"0"-34"15,0 0-20-15,0 0-6 16,0 0-36-16,0 0-10 16,-21-68-10-16,21 48-27 15,0 3 25-15,0-7-38 16,14 5-19-16,10 5 22 15,4 1-22-15,-4 8-2 0,3 5 0 16,11 0 2-16,7 5-8 16,0 27 6-16,-1 7-2 15,-13 9-12-15,-17-3 13 16,0 1 1-16,-14-12 0 16,0-4 8-16,0-14-12 15,0-8 4-15,0-8 0 16,0 0 1-16,0 0 8 15,0 0-6-15,0 0 15 16,0-19-12-16,0-14 10 16,0-6-16-16,31-7 2 15,13-6 1-15,15-4 1 16,-1 10-4-16,-13 8 0 0,-7 22 10 16,-7 16-23-16,-11 0 13 15,11 20-5-15,-3 22-6 16,3 10 4-16,-11 2 7 15,4-3 0-15,-3-2 6 16,-4-6-18-16,-3-6-22 16,-7-8-60-16,-7-3-16 15,0-9-126-15,0-9-98 16</inkml:trace>
+  <inkml:trace contextRef="#ctx0" brushRef="#br1" timeOffset="4575.27">8645 2775 469 0,'0'0'119'0,"0"0"-34"16,0 0 64-16,0 0-63 15,0 0-31-15,0 0-34 0,21 0-13 16,37-2 18-16,18-6-12 16,3-5 19-16,-10 5 29 15,-4-3-46-15,-20 2 7 16,-14 1-13-16,-11 2-4 15,-13 0 10-15,-7 0-15 16,0-2 0-16,0-4 10 16,0 4-7-16,-20-3-4 15,-18-1 0-15,0 4 6 16,10-1-11-16,-3 0 5 16,4 3 0-16,10 1-1 15,3 2 10-15,14 3-9 0,0-2 0 16,0 2 5-1,0 0-17-15,0 0 12 0,0 0 0 16,0 0-7-16,21 0 10 16,16 2-3-16,8 16 0 15,0 4 3-15,-7 4-10 16,-1 3 7-16,-9 2 0 16,-4-5-2-16,-17-4 7 15,-7 1-7-15,0-3 2 16,-14 4-19-16,-31-5-38 15,8 4-118-15,6-6-126 16</inkml:trace>
+  <inkml:trace contextRef="#ctx0" brushRef="#br1" timeOffset="4935.27">11066 2627 512 0,'0'0'136'0,"0"0"-11"0,0 0 2 16,0 0-14-16,0 0-61 16,0 0-29-16,-28 18 18 15,28-16-31-15,0-2 3 16,7 0 3-16,14 0-13 16,23 0 13-16,1 0-16 15,17 0-7-15,-21 0-61 16,14 0-192-16,-10 0-218 15</inkml:trace>
+  <inkml:trace contextRef="#ctx0" brushRef="#br1" timeOffset="5323.27">11667 2396 579 0,'0'0'140'0,"0"0"1"16,0 0-39-16,0 0-44 16,0 0-8-16,0 0-46 15,141-46 1-15,-96 49 0 16,0 11 4-16,-7 10 9 16,-18-3-8-16,-13 8-9 15,-7 9 28-15,0 2-28 0,-27 5 21 16,-35 4 7-1,10-3-27-15,1-9 22 0,13-9-24 16,24-8 0-16,7-5-1 16,0-7 10-16,7-2-9 15,0 1 0-15,7-2 10 16,45-5 2-16,37 0-12 16,14 0 2-16,7-12-3 15,-3-9 1-15,-18 8-23 16,-30 7-25-16,-32 6-53 15,-27 0-52-15,0 0-134 16</inkml:trace>
+  <inkml:trace contextRef="#ctx0" brushRef="#br1" timeOffset="5625.27">9941 3093 397 0,'0'0'200'16,"0"0"-66"-16,0 0-6 16,0 0 14-16,0 0-40 15,0 0-67-15,214 0 5 16,-5-8 6-16,49-7 14 16,17-2 0-16,7-3-47 15,-17 3 10-15,-17 3-20 16,-22-4 8-16,-40 7-13 0,-38 2 2 15,-59 4 0-15,-44 5-6 16,-31 0 0-16,-14 0-25 16,-52 23-86-16,-51 8-74 15,-59 9-89-15,-30 4-274 16</inkml:trace>
+  <inkml:trace contextRef="#ctx0" brushRef="#br1" timeOffset="5907.27">10994 3361 421 0,'0'0'123'0,"0"0"-32"0,0 0 18 15,0 0-26 1,0 0-26-16,0 0 1 16,223 21-38-16,-202-7 13 0,-14 0-15 15,-7 6-11-15,0 4 24 16,0 4-13-16,-28 1 6 15,-17-4 5-15,21-7-29 16,10-7 25-16,8-6-23 16,6 4-1-16,0 0 14 15,20-3-14-15,49-4 9 16,41-2 1-16,31 0-11 16,27-17-2-16,11-14-156 15,-7-13-214-15</inkml:trace>
+  <inkml:trace contextRef="#ctx0" brushRef="#br1" timeOffset="6246.27">12314 1898 680 0,'0'0'180'0,"0"0"-86"0,0 0 34 15,0 0 2 1,0 0-91-16,0 0-20 0,7 26-17 16,58 54-2-16,18 26 40 15,-1 17-27-15,14 22 25 16,-10 13-9-16,4 4-24 15,-28 9 11-15,-35 4-16 16,-27 2 0-16,-20 1-8 16,-77 6 0-16,-51-2-110 15,-61-10-172-15,-49-21-699 16</inkml:trace>
+  <inkml:trace contextRef="#ctx0" brushRef="#br1" timeOffset="6846.27">10007 2007 366 0,'0'0'162'0,"0"0"-59"0,0 0 19 16,0 0-9-1,-83-149-32-15,56 132 5 0,13 8-29 16,-10 9 6-16,-14 0-28 16,-7 13-31-16,1 35 32 15,-8 17-17-15,-6 32 9 16,-1 29 26-16,1 34-17 16,-11 29 17-16,10 11-15 15,15 10-30-15,44 3 33 16,31-19-42-16,130-8 1 15,114-23-1-15,104-25 0 16,57-33-5-16,-6-30-130 16,-96-24-367-16</inkml:trace>
 </inkml:ink>
 </file>
 
@@ -2724,32 +2724,32 @@
   <inkml:trace contextRef="#ctx0" brushRef="#br2" timeOffset="188230">10992 4259 114 0,'0'0'102'16,"0"0"9"-16,0 0-17 0,0 177-1 15,0-131-13 1,0 6-11-16,-7-1-7 0,-7 9-6 16,-10 3-2-16,-3 2-11 15,-4 7-43-15,0 2 14 16,3 1-14-16,-16 2-78 15,-1 0-330-15</inkml:trace>
   <inkml:trace contextRef="#ctx0" brushRef="#br2" timeOffset="184795">10882 1792 802 0,'0'0'160'16,"0"0"-31"-16,0 0-26 15,0 0 8-15,0 0-27 16,-38-160-65-16,18 134 9 16,-11 6-28-16,-7 3-7 15,-21 6-8-15,-16 4-160 0,-22 5-113 16,-19-4-254 0</inkml:trace>
   <inkml:trace contextRef="#ctx0" brushRef="#br2" timeOffset="187816">10438 1760 342 0,'0'0'179'15,"0"0"-58"-15,0 0-34 16,0 0 5-16,0 0-52 15,0 0-13-15,80 0-27 16,-36 0 8-16,8 23-11 16,10 9 3-16,-11 4 0 15,8 7-5-15,-1 3-4 0,8 3-18 16,-5 2-21-16,-2 1-34 16,-21-1-32-16,-11 1-93 15,-27 2-194-15</inkml:trace>
-  <inkml:trace contextRef="#ctx0" brushRef="#br0" timeOffset="233563">12402 1234 765 0,'0'0'164'0,"0"0"-48"16,0 0 84-16,0 0-56 15,0 0-86-15,0 0-38 16,14-28-19-16,-8 85-1 15,-6 26 5-15,7 23 0 16,-7 7 13-16,11 8-17 16,-11-7-1-16,6-11 6 15,1-19 2-15,0-19-8 0,7-17 0 16,-14-13-19 0,0-13-60-16,0-10-98 15,0-6-73-15,-28-6-50 0,-9 0-362 16</inkml:trace>
-  <inkml:trace contextRef="#ctx0" brushRef="#br0" timeOffset="233953">12134 1866 360 0,'0'0'143'0,"0"0"-50"16,0 0-20-16,0 0 12 16,0 0-67-16,0 0-17 15,24-18 26-15,34 36-2 16,25-7 12-16,13-8 11 0,14-3 9 15,-7 0 16 1,0-29-20-16,-20-7-2 0,-8-16 11 16,-23-5-24-16,-7-11 23 15,-18-9-28-15,-3-6-14 16,-3-4 17-16,-14 10-13 16,-7 9 3-16,0 17 8 15,0 13-19-15,0 21 21 16,0 14-12-16,0 3-21 15,0 3-3-15,0 49-12 16,0 25 12-16,0 16-2 16,10 11 8-16,11-1-6 0,10-9 0 15,-4-3 3 1,4-13-6-16,-3-16 4 0,-4-13-2 16,-11-15 1-16,5-10-98 15,-18-13-52-15,7-2-68 16,-7-9-43-16,0 0-82 15</inkml:trace>
+  <inkml:trace contextRef="#ctx0" brushRef="#br0" timeOffset="-195933.73">12402 1234 765 0,'0'0'164'0,"0"0"-48"16,0 0 84-16,0 0-56 15,0 0-86-15,0 0-38 16,14-28-19-16,-8 85-1 15,-6 26 5-15,7 23 0 16,-7 7 13-16,11 8-17 16,-11-7-1-16,6-11 6 15,1-19 2-15,0-19-8 0,7-17 0 16,-14-13-19 0,0-13-60-16,0-10-98 15,0-6-73-15,-28-6-50 0,-9 0-362 16</inkml:trace>
+  <inkml:trace contextRef="#ctx0" brushRef="#br0" timeOffset="-195543.73">12134 1866 360 0,'0'0'143'0,"0"0"-50"16,0 0-20-16,0 0 12 16,0 0-67-16,0 0-17 15,24-18 26-15,34 36-2 16,25-7 12-16,13-8 11 0,14-3 9 15,-7 0 16 1,0-29-20-16,-20-7-2 0,-8-16 11 16,-23-5-24-16,-7-11 23 15,-18-9-28-15,-3-6-14 16,-3-4 17-16,-14 10-13 16,-7 9 3-16,0 17 8 15,0 13-19-15,0 21 21 16,0 14-12-16,0 3-21 15,0 3-3-15,0 49-12 16,0 25 12-16,0 16-2 16,10 11 8-16,11-1-6 0,10-9 0 15,-4-3 3 1,4-13-6-16,-3-16 4 0,-4-13-2 16,-11-15 1-16,5-10-98 15,-18-13-52-15,7-2-68 16,-7-9-43-16,0 0-82 15</inkml:trace>
   <inkml:trace contextRef="#ctx0" brushRef="#br2" timeOffset="187996">11023 2884 136 0,'0'0'94'0,"0"0"-23"16,-52 163 17-16,46-109 1 15,6 0-16-15,0-2-16 16,0-7-33-16,0-4 6 0,13-2-17 15,1-7-11-15,3 0 5 16,-10-1-7-16,0 3-88 16,-7 3-93-16</inkml:trace>
-  <inkml:trace contextRef="#ctx0" brushRef="#br0" timeOffset="233227">11030 3252 10 0,'0'0'851'0,"0"0"-681"0,0 0-26 16,0 0 11-16,0 0-67 0,0 0-12 16,0 0-11-1,58-128-44-15,-51 128 27 16,-7 0-32-16,0 0-13 0,0 0-3 15,17 0 0 1,-3 35 0-16,7 13-4 0,10 15 8 16,0 3-5-16,-4-6 1 15,4-7 0-15,0-9 1 16,-3-10 4-16,-4-11-5 16,-11-12 0-16,1-8 9 15,-7-3-10-15,24-8 2 16,21-50 14-16,30-39 40 15,28-34-54-15,38-21 13 16,-7 4-7-16,0 6 4 16,-14 18-6-16,-17 27-5 15,-27 25 0-15,-18 27-3 16,-27 21 10-16,-14 15-7 0,-10 7 0 16,-14 2-4-16,7 0-6 15,-1 0 2-15,1 2-25 16,-7 7-26-16,0 6-70 15,0 4-71-15,-20 7-127 16,-32-3-198-16</inkml:trace>
-  <inkml:trace contextRef="#ctx0" brushRef="#br0" timeOffset="235079">13430 1832 396 0,'0'0'152'0,"0"0"-7"16,0 0-13-16,0 0 6 0,0 0-45 15,172-169-15-15,-152 135 4 16,-2-3-46-16,-18 3 29 16,0-1-33-16,0 0-17 15,0 6 2-15,-31 13-15 16,3 4-2-16,-10 12 0 16,-6 0 6-16,13 0-9 15,-7 23 3-15,10 21 0 16,4 9-6-16,17 14 8 15,7-2-2-15,0-2 0 16,45-9 3-16,14-11-5 16,16-11 2-16,-9-9 0 15,16-15-11-15,-17-8 10 0,11 0 1 16,-11-23 0-16,-3-14 10 16,-10-9-7-16,-7-5-3 15,-11-3 0-15,-3-1 1 16,-17-1 4-16,-4-2-5 15,-10 10 0-15,0 10 13 16,0 15-13-16,0 17 0 16,-38 6 0-16,0 0-11 15,0 29 3-15,1 14 8 16,16 5 0-16,7 5 5 16,4-5-9-16,10-3 4 15,0-5 0-15,24-11-8 16,21-12 8-16,6-11 0 15,-6-6-7-15,0 0 17 16,-1-20-10-16,-16-12 0 0,3-2 0 16,-7-3 3-16,-17 5 3 15,-7 10-6-15,0 6 2 16,0 11 7-16,0 5-2 16,0 0-7-16,0 0-16 15,0 21 14-15,0 19-7 16,27 5 9-16,18 1 0 15,13-6 10-15,-3-9-15 16,11-8 5-16,-15-11 0 16,1-9-6-16,-7-3 13 15,-14 0-7-15,-4-6 7 16,-10-16 0-16,-3-5 24 0,-14-4 11 16,0-6-16-16,0-3 20 15,0 9-36-15,0 7 14 16,0 10-3-16,0 14-20 15,0 0 26-15,0 0-27 16,0 34-10-16,0 33 1 16,0 18 11-16,0 9-2 15,0 1 0-15,0-1 9 16,0-8-14-16,0-9 5 16,0-12 0-16,0-18-4 15,0-19 9-15,0-14-5 16,0-11 0-16,0-3 9 0,0 0-4 15,0-3 12-15,-14-33 35 16,-3-19-27-16,-4-16-17 16,15-13-5-16,-12-4-3 15,12-12 10-15,6-4-12 16,-7-7 2-16,7 3 0 16,0 5-6-16,0 11 12 15,0 18-6-15,0 17 0 16,0 17 3-16,7 14-18 15,23 12 14-15,-2 8-26 16,27 6 25-16,3 0-30 16,1 38 29-16,-1 10-3 15,-20 11 0-15,-14 2-5 0,-17 3 11 16,-7-5-3-16,-24 1-6 16,-41 0-23-16,-4 0-27 15,-10-3-41-15,3-3-97 16,11-14-101-16,6-11-284 15</inkml:trace>
-  <inkml:trace contextRef="#ctx0" brushRef="#br0" timeOffset="235384">12096 2461 675 0,'0'0'138'0,"0"0"-52"16,0 0-3-16,0 0 3 15,0 0-31-15,364-43 57 16,-68-14-26-16,62-17-57 16,-4-2-7-16,-14 5-4 15,-34 11-15-15,-48 15 21 16,-48 11-22-16,-56 16-1 15,-64 12-1-15,-56 6-12 16,-34 0-42-16,-7 18-125 16,-72 22 5-16,-48 9-70 0,-28 4-290 15</inkml:trace>
-  <inkml:trace contextRef="#ctx0" brushRef="#br0" timeOffset="235634">13069 2529 93 0,'0'0'355'0,"0"0"-175"15,-261 34-41-15,247-34 37 16,14 0-71-16,0 0-63 16,14 0 3-16,47 0-32 15,36 0 84-15,51 0 17 16,51-37-61-16,59-14 22 16,48-9-20-16,21-3-30 15,-18 3 14-15,-34 12-24 16,-51 4-7-16,-49 13 5 15,-62 9-8-15,-47 7 6 0,-35 6-11 16,-31 8-15-16,0 1-4 16,-69 0-137-16,-34 30-102 15,-31 4-316-15</inkml:trace>
+  <inkml:trace contextRef="#ctx0" brushRef="#br0" timeOffset="-196269.73">11030 3252 10 0,'0'0'851'0,"0"0"-681"0,0 0-26 16,0 0 11-16,0 0-67 0,0 0-12 16,0 0-11-1,58-128-44-15,-51 128 27 16,-7 0-32-16,0 0-13 0,0 0-3 15,17 0 0 1,-3 35 0-16,7 13-4 0,10 15 8 16,0 3-5-16,-4-6 1 15,4-7 0-15,0-9 1 16,-3-10 4-16,-4-11-5 16,-11-12 0-16,1-8 9 15,-7-3-10-15,24-8 2 16,21-50 14-16,30-39 40 15,28-34-54-15,38-21 13 16,-7 4-7-16,0 6 4 16,-14 18-6-16,-17 27-5 15,-27 25 0-15,-18 27-3 16,-27 21 10-16,-14 15-7 0,-10 7 0 16,-14 2-4-16,7 0-6 15,-1 0 2-15,1 2-25 16,-7 7-26-16,0 6-70 15,0 4-71-15,-20 7-127 16,-32-3-198-16</inkml:trace>
+  <inkml:trace contextRef="#ctx0" brushRef="#br0" timeOffset="-194417.73">13430 1832 396 0,'0'0'152'0,"0"0"-7"16,0 0-13-16,0 0 6 0,0 0-45 15,172-169-15-15,-152 135 4 16,-2-3-46-16,-18 3 29 16,0-1-33-16,0 0-17 15,0 6 2-15,-31 13-15 16,3 4-2-16,-10 12 0 16,-6 0 6-16,13 0-9 15,-7 23 3-15,10 21 0 16,4 9-6-16,17 14 8 15,7-2-2-15,0-2 0 16,45-9 3-16,14-11-5 16,16-11 2-16,-9-9 0 15,16-15-11-15,-17-8 10 0,11 0 1 16,-11-23 0-16,-3-14 10 16,-10-9-7-16,-7-5-3 15,-11-3 0-15,-3-1 1 16,-17-1 4-16,-4-2-5 15,-10 10 0-15,0 10 13 16,0 15-13-16,0 17 0 16,-38 6 0-16,0 0-11 15,0 29 3-15,1 14 8 16,16 5 0-16,7 5 5 16,4-5-9-16,10-3 4 15,0-5 0-15,24-11-8 16,21-12 8-16,6-11 0 15,-6-6-7-15,0 0 17 16,-1-20-10-16,-16-12 0 0,3-2 0 16,-7-3 3-16,-17 5 3 15,-7 10-6-15,0 6 2 16,0 11 7-16,0 5-2 16,0 0-7-16,0 0-16 15,0 21 14-15,0 19-7 16,27 5 9-16,18 1 0 15,13-6 10-15,-3-9-15 16,11-8 5-16,-15-11 0 16,1-9-6-16,-7-3 13 15,-14 0-7-15,-4-6 7 16,-10-16 0-16,-3-5 24 0,-14-4 11 16,0-6-16-16,0-3 20 15,0 9-36-15,0 7 14 16,0 10-3-16,0 14-20 15,0 0 26-15,0 0-27 16,0 34-10-16,0 33 1 16,0 18 11-16,0 9-2 15,0 1 0-15,0-1 9 16,0-8-14-16,0-9 5 16,0-12 0-16,0-18-4 15,0-19 9-15,0-14-5 16,0-11 0-16,0-3 9 0,0 0-4 15,0-3 12-15,-14-33 35 16,-3-19-27-16,-4-16-17 16,15-13-5-16,-12-4-3 15,12-12 10-15,6-4-12 16,-7-7 2-16,7 3 0 16,0 5-6-16,0 11 12 15,0 18-6-15,0 17 0 16,0 17 3-16,7 14-18 15,23 12 14-15,-2 8-26 16,27 6 25-16,3 0-30 16,1 38 29-16,-1 10-3 15,-20 11 0-15,-14 2-5 0,-17 3 11 16,-7-5-3-16,-24 1-6 16,-41 0-23-16,-4 0-27 15,-10-3-41-15,3-3-97 16,11-14-101-16,6-11-284 15</inkml:trace>
+  <inkml:trace contextRef="#ctx0" brushRef="#br0" timeOffset="-194112.73">12096 2461 675 0,'0'0'138'0,"0"0"-52"16,0 0-3-16,0 0 3 15,0 0-31-15,364-43 57 16,-68-14-26-16,62-17-57 16,-4-2-7-16,-14 5-4 15,-34 11-15-15,-48 15 21 16,-48 11-22-16,-56 16-1 15,-64 12-1-15,-56 6-12 16,-34 0-42-16,-7 18-125 16,-72 22 5-16,-48 9-70 0,-28 4-290 15</inkml:trace>
+  <inkml:trace contextRef="#ctx0" brushRef="#br0" timeOffset="-193862.73">13069 2529 93 0,'0'0'355'0,"0"0"-175"15,-261 34-41-15,247-34 37 16,14 0-71-16,0 0-63 16,14 0 3-16,47 0-32 15,36 0 84-15,51 0 17 16,51-37-61-16,59-14 22 16,48-9-20-16,21-3-30 15,-18 3 14-15,-34 12-24 16,-51 4-7-16,-49 13 5 15,-62 9-8-15,-47 7 6 0,-35 6-11 16,-31 8-15-16,0 1-4 16,-69 0-137-16,-34 30-102 15,-31 4-316-15</inkml:trace>
   <inkml:trace contextRef="#ctx0" brushRef="#br2" timeOffset="186447">4507 8313 336 0,'0'0'163'16,"0"0"-141"-16,310 26-7 16,-169-23-5-16,24-3 10 15,14 0-19-15,-11 0 27 16,-3 0-1-16,-17-6-19 16,-24 3 19-16,-4-2 0 15,7-7-24-15,4-5-3 16,27-9-155-16</inkml:trace>
-  <inkml:trace contextRef="#ctx0" brushRef="#br0" timeOffset="285998">1062 9117 756 0,'0'0'176'0,"0"0"-34"0,0 0 16 0,0 0-64 16,0 0 10-1,0 0-39-15,-69-19-30 0,69 19-1 16,0 0-27-16,14-4-7 15,24-2 0-15,20-2-13 16,39-7 13-16,37-5 10 16,14 0-6-16,3-3 1 15,-21 6-4-15,-23 3-1 16,-42 5 0-16,-27 6-8 16,-24 3-8-16,-14 0-49 15,0 0-38-15,0 0-14 16,0 0-62-16,-38 9 10 15,-7 10 4-15,-13 3-214 16</inkml:trace>
-  <inkml:trace contextRef="#ctx0" brushRef="#br0" timeOffset="286233">1578 9053 211 0,'0'0'249'0,"0"0"-35"0,0 0-55 0,0 0-30 15,0 0 36-15,0 0-94 16,-35 0-8-16,35 0-4 15,0 0-42-15,0 0 23 16,0 0-40-16,0 15 7 16,7 15 1-16,7 11 9 15,-7 14 14-15,0 2-6 16,10 6-20-16,-10 2 21 16,0-5-26-16,0-4 1 0,-1-8 1 15,-6-12 2-15,0-7-4 16,11-3 0-16,-11-9-66 15,0 0-73-15,20-5-113 16,11-7-94-16,21-5-354 16</inkml:trace>
-  <inkml:trace contextRef="#ctx0" brushRef="#br0" timeOffset="286603">2149 9508 453 0,'0'0'244'16,"0"0"-70"-16,0 0-51 0,0 0-32 16,0 0-37-16,0 0-27 15,-52-21-25-15,45 21 6 16,0 0-8-16,7 0 0 16,0 0-8-16,0 0 4 15,0 0 4-15,0 8 0 16,21-7 2-16,3 3 2 15,-17-4 21-15,7 0 6 16,3 0 28-16,-10 0-23 16,6 0 18-16,-6-13 4 15,4 2-8-15,-11 4-13 16,0-5-15-16,0 3-16 0,-11 0-6 16,-16 7-1-16,-4 2-3 15,0 0 2-15,3 0-83 16,15 2-37-16,2 21-68 15,11-11-100-15,62 0-89 16</inkml:trace>
-  <inkml:trace contextRef="#ctx0" brushRef="#br0" timeOffset="286984">2912 9185 7 0,'0'0'618'0,"0"0"-407"16,0 0-57-16,0 0-23 0,0 0-8 15,0 0-51-15,-35-145-15 16,29 141-1-16,-12 2-34 16,12 2 10-16,6 0-32 15,-21 0-9-15,4 40 8 16,-11 10-5-16,-3 21 6 15,11 7 1-15,2 5 8 16,18-2-9-16,0-16 0 16,38-8 2-16,28-14-12 15,2-19 11-15,5-13-1 16,-5-8 14-16,-9-3-10 16,-8 0 13-16,-20-12 6 0,-3-4-23 15,-18 6 21-15,-10-1-21 16,0 4-2-16,0 2-31 15,0-3-74-15,0 8-130 16,0-3-87-16,0 3-148 16</inkml:trace>
-  <inkml:trace contextRef="#ctx0" brushRef="#br0" timeOffset="287677">3634 9370 347 0,'0'0'319'0,"0"0"-137"16,0 0-61-16,0 0-2 15,0 0-20-15,0 0-32 16,-10-16-15-16,10 16-38 16,0 0-11-16,0 0-6 15,10 0-11-15,24 0 14 16,28 0 17-16,-3-9-15 15,-22 6 14-15,-2-5-6 16,-4 5-9-16,-17-3 23 16,-8 3-17-16,-6 3 15 15,0 0 13-15,0 0-26 16,0 0 30-16,0 0 1 0,0 0-20 16,0 0 8-1,0 0-25-15,0 0-3 0,0 0 0 16,0 0 8-16,0 0-9 15,0 0 1-15,0-6 0 16,0 6 4-16,0 0 2 16,0 0-6-16,0-2 1 15,0-4 11-15,0-3-13 16,0 1 1-16,0-6 0 16,-6 2 2-16,-8 0 1 15,0 4-3-15,-10-3 0 16,-4 0 5-16,4 2-6 15,-3-5 1-15,-4 4 0 16,17 2 0-16,4 6 8 16,10-1-5-16,0 3 12 0,0 0-5 15,0 0-17-15,0 0 7 16,17 0-8-16,35 0 0 16,13 5 11-16,18 15-3 15,-18 1 0-15,4 1 11 16,-11-2-12-16,-6 3 1 15,-21-3 0-15,-4 0-10 16,-17-3 11-16,4-2-1 16,-14-1 0-16,0 3-6 15,-24 3-4-15,-41-3 1 16,-18 6-92-16,-13-3-121 16,13 5-319-16</inkml:trace>
-  <inkml:trace contextRef="#ctx0" brushRef="#br0" timeOffset="288785">5346 9139 388 0,'0'0'272'16,"0"0"-84"-16,0 0-64 15,0 0 22-15,0 0-38 0,0 0-52 16,0-51 24 0,0 51-48-16,0 0-10 0,0 0 2 15,0 0-17-15,0 0-1 16,0 0-6-16,0 0 4 16,0 0-6-16,0 0 3 15,0 0-1-15,0 0 12 16,0 0-4-16,0 0 9 15,0 0 3-15,0 0-16 16,0 0 32-16,0 0-20 16,0 0 1-16,0-3 18 15,0 0-34-15,0 3 21 16,7-2-17-16,-7 2 2 16,7-6 4-16,0-8-11 0,-7 2 0 15,0-5-4-15,7 5 15 16,-7 4-11-16,0-4 0 15,0 0 4-15,0 2-13 16,0 1 9-16,-7 0 0 16,-7 1-4-16,-3 2 5 15,3 6-4-15,0 0 3 16,8 0-6-16,-12 0-4 16,-9 14 8-16,-4 20 2 15,0 13 0-15,10 11 5 16,8 6-5-16,2 13 0 15,11 0 2-15,0 1-8 16,11-10 6-16,40-10 0 0,8-19-2 16,6-14-5-1,11-12 7-15,-11-13 0 0,4 0 0 16,-11-13 8-16,-6-20-2 16,-8-13-6-16,-13-8 16 15,-3-12-11-15,-11-5 9 16,-17 2-9-16,0 6-2 15,-55 12 0-15,-17 2-3 16,-11 17 0-16,-6 13 0 16,17 10-9-16,20 9 6 15,14 0-45-15,31 18-69 16,7 18-51-16,7-1-87 0,66-1-147 16</inkml:trace>
-  <inkml:trace contextRef="#ctx0" brushRef="#br0" timeOffset="289140">6226 8763 833 0,'0'0'248'0,"0"0"-79"15,0 0-15-15,-58-173-35 16,34 153-54-16,17 9-6 15,0 8-35-15,7 3 3 0,0 0-26 16,-7 20 2 0,-6 40-3-16,-5 29 8 0,5 23-6 15,-1 10 15-15,-3 17-11 16,10 8-5-16,7 7-1 16,0 6 16-16,0 4-18 15,0-11 2-15,0-6 0 16,14-27-5-16,10-31 10 15,7-32-5-15,-4-23 0 16,11-17-28-16,13-17 15 16,15 0-34-16,9-11-49 15,1-29-56-15,-17-15-260 16</inkml:trace>
-  <inkml:trace contextRef="#ctx0" brushRef="#br0" timeOffset="289638">6670 9170 755 0,'0'0'192'0,"0"0"-23"15,0 0-55-15,0 0-19 16,0 0-62-16,0 0 3 0,24-117-16 15,-3 117-17 1,3 0 10-16,3 0-13 0,11 9 0 16,-7 20-8-16,-10 11 4 15,3 6 4-15,-10 2 0 16,-8 0 4-16,-6-5-10 16,0-5 6-16,0-18 0 15,0-9-5-15,0-8 6 16,0-3-1-16,0 0 17 15,0 0-16-15,7-9 36 16,-7-22-1-16,11-12-27 16,2-5 7-16,15-7-10 15,10-2-2-15,-1 3-3 16,1 11 7-16,-17 17-5 0,-4 15-3 16,-3 11 0-1,0 0-7-15,10 0-7 0,-4 29 14 16,-6 13 0-16,3 0-3 15,-10 8-2-15,0 1 5 16,0-5-19-16,-7-1-4 16,7-1-78-16,10-13-84 15,-17 1-67-15,0-10-269 16</inkml:trace>
-  <inkml:trace contextRef="#ctx0" brushRef="#br0" timeOffset="289868">6464 9588 649 0,'0'0'113'0,"0"0"13"0,0 0-16 16,0 0 3-16,319 0 17 16,-164-20-30-16,-7-5-61 15,-21 4-7-15,-17 7-6 16,-20 8-23-16,-32 4 1 15,-20 2-4-15,-31 0-39 16,-7 13-109-16,-14 25-133 16,-37 2-107-16</inkml:trace>
-  <inkml:trace contextRef="#ctx0" brushRef="#br0" timeOffset="290203">6938 9858 574 0,'0'0'199'0,"0"0"-45"16,0 0-31-16,0 0-10 16,0 0-59-16,0 0-42 15,90-53 21-15,-59 53-11 16,3 9-2-16,-3 17 4 16,-10 8-22-16,-11 9 16 15,-10 13-13-15,0 8 4 16,-24 5 14-16,-21-6-22 15,7-13 11-15,11-18-3 16,10-6-3-16,10-20 5 0,7-4-2 16,0-2-9-1,0 0 38-15,0 0-19 0,17 0-4 16,28 0 0-16,13-8-7 16,31-18 3-16,15 1-11 15,12-8-69-15,19 3-85 16,12 4-138-16,-6 0-309 15</inkml:trace>
-  <inkml:trace contextRef="#ctx0" brushRef="#br0" timeOffset="290521">7863 9190 515 0,'0'0'428'15,"0"0"-255"-15,0 0 16 16,0 0-72-16,0 0-28 16,0 0-45-16,-65-108-41 15,89 108-4-15,17 16 6 16,21 10-5-16,-10 15 0 15,6 8 11-15,1-6-13 16,2 5 2-16,-2-5 0 16,-14-6-9-16,-1-6-67 0,-16-8-115 15,-4-5-94-15,-17-6-198 16</inkml:trace>
-  <inkml:trace contextRef="#ctx0" brushRef="#br0" timeOffset="290735">8183 9113 755 0,'0'0'212'15,"0"0"-14"-15,0 0-57 16,0 0-14-16,0 0-76 16,0 0-43-16,-28-31-8 0,18 62 0 15,-4 18 0-15,1 3 1 16,-11 5 10-16,17-3-22 15,7-5-14-15,0-7-111 16,0-7-126-16,37-12-133 16</inkml:trace>
-  <inkml:trace contextRef="#ctx0" brushRef="#br0" timeOffset="291408">8561 9180 349 0,'0'0'398'0,"0"0"-205"16,0 0-48-1,0 0-34-15,0 0-30 0,0 0-28 16,224-178-5-16,-142 135 11 16,-17-8-37-16,-13 3 21 15,-21-1 1-15,-10-3-24 16,-21 3 20-16,0 3-27 15,0 10-12-15,0 12 16 16,-14 10-8-16,7 12-9 16,7 2 0-16,-10 0-6 15,-4 2-2-15,-14 36-2 16,4 16 10-16,-7 9 5 0,11 5 4 16,6 4-9-1,14-6 0-15,0-6 3 0,14-11-14 16,24-11 11-16,-1-12 0 15,5-8-11-15,-11-12 11 16,0-6 0-16,-4 0 0 16,4 0 7-16,0-15-5 15,-4-5-2-15,4-5 0 16,-17 2-2-16,0 3 15 16,-4 2-13-16,-10 13 0 15,0 2 8-15,0 3-15 16,0 0 7-16,0 0-13 15,7 12 11-15,7 19-7 16,10 9 9-16,3-3 0 16,4-2 3-16,7-14-12 0,7-2 9 15,-11-19 0-15,11 0 3 16,-7 0 6-16,7-14-9 16,-8-16 0-16,-9-1 8 15,-11-6 4-15,-17-5-8 16,0-2-2-16,-17 5 4 15,-42 1-6-15,1 9 0 16,-11 9 0-16,11 8-5 16,6 12-4-16,21 0-27 15,4 16-67-15,20 24-42 16,7 8-72-16,0 1-74 16,34-4-263-16</inkml:trace>
-  <inkml:trace contextRef="#ctx0" brushRef="#br0" timeOffset="291934">9851 9157 432 0,'0'0'265'0,"0"0"-50"15,0 0-11-15,0 0-63 16,0 0-35-16,17-164-25 16,-41 144-36-16,-7 6 5 15,3 3-34-15,-3 8-6 16,4 3-7-16,3 0 7 15,3 8-10-15,-3 21 0 16,17 8 2-16,7-3-12 0,0 1 10 16,21-6-4-16,23-7-1 15,11-4-10-15,-3-13 15 16,0-5 0-16,-18 0 3 16,-3 0 4-16,0 0-5 15,-17-3 5-15,-14-4 26 16,6 0-11-16,-6 1 25 15,0 6-20-15,0 0-25 16,0 0 2-16,0 13-4 16,-6 30 0-16,-8 25 6 15,-3 9 5-15,10 6-8 16,7 7-3-16,0 11 2 0,0 4 5 16,0 6-1-16,0-7-6 15,0-10 4-15,-14-22 4 16,-10-18-2-16,10-22-6 15,-6-17 1-15,13-13 3 16,-24-2 4-16,-7 0 6 16,-14 0 10-16,-6-28-17 15,-18-10-5-15,4-8-2 16,-10-11-42-16,16-6-20 16,4-17-42-16,42-6-52 15,20-2-110-15,51-1-177 16</inkml:trace>
-  <inkml:trace contextRef="#ctx0" brushRef="#br0" timeOffset="292258">10332 8735 529 0,'0'0'217'0,"0"0"-60"15,0 0-29-15,0 0 17 16,0 0-42-16,0 0-24 15,10-115 11-15,-10 115-48 16,0 0 4-16,0 0-9 16,0 0-36-16,0 0 18 15,0 0-19-15,0 10-15 16,0 31 15-16,-24 13 5 16,17 14 6-16,0 10-11 0,7 4 11 15,0 1-8-15,14-8-3 16,17-6 1-16,3-15-8 15,-3-15 2-15,-7-7-35 16,-3-9-43-16,-14-6-95 16,0-8-58-16,0-9-90 15,3 0-211-15</inkml:trace>
-  <inkml:trace contextRef="#ctx0" brushRef="#br0" timeOffset="292648">10518 9137 541 0,'0'0'143'15,"0"0"56"-15,0 0-73 16,0-150 15-16,0 122-41 0,0 3-16 16,0 7-48-16,0 10-7 15,24 5-5-15,-4 3-21 16,11 0-3-16,-3 5 0 16,3 19 6-16,-7 1-14 15,-17 1 8-15,6 0 0 16,-6-3-10-16,-7-4 11 15,0 2-1-15,7-15 0 16,-7-4 10-16,0-2-10 16,0 0 0-16,7 0 1 15,-7 0 25-15,10-2-24 16,-3-18 8-16,0-6-10 16,14 1 8-16,10 1-7 0,-11 1-1 15,11 6 0-15,0 6-5 16,-10 5 5-16,3 6 0 15,3 0 0-15,4 0-4 16,7 17-6-16,-17 3 9 16,10 0-40-16,-11 4-32 15,-2-2-85-15,2-3-63 16,11 5-241-16</inkml:trace>
-  <inkml:trace contextRef="#ctx0" brushRef="#br0" timeOffset="292925">11037 8536 474 0,'0'0'258'0,"0"0"-66"0,0 0-41 15,0 0-17-15,0 0-103 16,0 0 3-16,127-31 8 15,-82 65-22-15,6 15 26 16,-13 5-33-16,7 14-3 16,-11 10 4-16,-3 2-2 15,-24 3-12-15,0-3 0 0,-7-9 3 16,0-8-12 0,0-5-138-16,-21-16-152 0,-17-8-261 15</inkml:trace>
-  <inkml:trace contextRef="#ctx0" brushRef="#br0" timeOffset="293226">11222 8265 624 0,'0'0'273'0,"0"0"-130"16,0 0 28-16,0 0-14 0,0 0-114 16,0 0-2-16,224-15-5 15,-159 61-22-15,18 25 35 16,-1 24-39-16,-16 16 3 16,-8 21 35-16,-20 2-40 15,-17 0 13-15,-21 4-21 16,0-8 4-16,-28-1-11 15,-30-3-27-15,-18-8-184 16,-7-1-426-16</inkml:trace>
+  <inkml:trace contextRef="#ctx0" brushRef="#br0" timeOffset="-143498.73">1062 9117 756 0,'0'0'176'0,"0"0"-34"0,0 0 16 0,0 0-64 16,0 0 10-1,0 0-39-15,-69-19-30 0,69 19-1 16,0 0-27-16,14-4-7 15,24-2 0-15,20-2-13 16,39-7 13-16,37-5 10 16,14 0-6-16,3-3 1 15,-21 6-4-15,-23 3-1 16,-42 5 0-16,-27 6-8 16,-24 3-8-16,-14 0-49 15,0 0-38-15,0 0-14 16,0 0-62-16,-38 9 10 15,-7 10 4-15,-13 3-214 16</inkml:trace>
+  <inkml:trace contextRef="#ctx0" brushRef="#br0" timeOffset="-143263.73">1578 9053 211 0,'0'0'249'0,"0"0"-35"0,0 0-55 0,0 0-30 15,0 0 36-15,0 0-94 16,-35 0-8-16,35 0-4 15,0 0-42-15,0 0 23 16,0 0-40-16,0 15 7 16,7 15 1-16,7 11 9 15,-7 14 14-15,0 2-6 16,10 6-20-16,-10 2 21 16,0-5-26-16,0-4 1 0,-1-8 1 15,-6-12 2-15,0-7-4 16,11-3 0-16,-11-9-66 15,0 0-73-15,20-5-113 16,11-7-94-16,21-5-354 16</inkml:trace>
+  <inkml:trace contextRef="#ctx0" brushRef="#br0" timeOffset="-142893.73">2149 9508 453 0,'0'0'244'16,"0"0"-70"-16,0 0-51 0,0 0-32 16,0 0-37-16,0 0-27 15,-52-21-25-15,45 21 6 16,0 0-8-16,7 0 0 16,0 0-8-16,0 0 4 15,0 0 4-15,0 8 0 16,21-7 2-16,3 3 2 15,-17-4 21-15,7 0 6 16,3 0 28-16,-10 0-23 16,6 0 18-16,-6-13 4 15,4 2-8-15,-11 4-13 16,0-5-15-16,0 3-16 0,-11 0-6 16,-16 7-1-16,-4 2-3 15,0 0 2-15,3 0-83 16,15 2-37-16,2 21-68 15,11-11-100-15,62 0-89 16</inkml:trace>
+  <inkml:trace contextRef="#ctx0" brushRef="#br0" timeOffset="-142512.73">2912 9185 7 0,'0'0'618'0,"0"0"-407"16,0 0-57-16,0 0-23 0,0 0-8 15,0 0-51-15,-35-145-15 16,29 141-1-16,-12 2-34 16,12 2 10-16,6 0-32 15,-21 0-9-15,4 40 8 16,-11 10-5-16,-3 21 6 15,11 7 1-15,2 5 8 16,18-2-9-16,0-16 0 16,38-8 2-16,28-14-12 15,2-19 11-15,5-13-1 16,-5-8 14-16,-9-3-10 16,-8 0 13-16,-20-12 6 0,-3-4-23 15,-18 6 21-15,-10-1-21 16,0 4-2-16,0 2-31 15,0-3-74-15,0 8-130 16,0-3-87-16,0 3-148 16</inkml:trace>
+  <inkml:trace contextRef="#ctx0" brushRef="#br0" timeOffset="-141819.73">3634 9370 347 0,'0'0'319'0,"0"0"-137"16,0 0-61-16,0 0-2 15,0 0-20-15,0 0-32 16,-10-16-15-16,10 16-38 16,0 0-11-16,0 0-6 15,10 0-11-15,24 0 14 16,28 0 17-16,-3-9-15 15,-22 6 14-15,-2-5-6 16,-4 5-9-16,-17-3 23 16,-8 3-17-16,-6 3 15 15,0 0 13-15,0 0-26 16,0 0 30-16,0 0 1 0,0 0-20 16,0 0 8-1,0 0-25-15,0 0-3 0,0 0 0 16,0 0 8-16,0 0-9 15,0 0 1-15,0-6 0 16,0 6 4-16,0 0 2 16,0 0-6-16,0-2 1 15,0-4 11-15,0-3-13 16,0 1 1-16,0-6 0 16,-6 2 2-16,-8 0 1 15,0 4-3-15,-10-3 0 16,-4 0 5-16,4 2-6 15,-3-5 1-15,-4 4 0 16,17 2 0-16,4 6 8 16,10-1-5-16,0 3 12 0,0 0-5 15,0 0-17-15,0 0 7 16,17 0-8-16,35 0 0 16,13 5 11-16,18 15-3 15,-18 1 0-15,4 1 11 16,-11-2-12-16,-6 3 1 15,-21-3 0-15,-4 0-10 16,-17-3 11-16,4-2-1 16,-14-1 0-16,0 3-6 15,-24 3-4-15,-41-3 1 16,-18 6-92-16,-13-3-121 16,13 5-319-16</inkml:trace>
+  <inkml:trace contextRef="#ctx0" brushRef="#br0" timeOffset="-140711.73">5346 9139 388 0,'0'0'272'16,"0"0"-84"-16,0 0-64 15,0 0 22-15,0 0-38 0,0 0-52 16,0-51 24 0,0 51-48-16,0 0-10 0,0 0 2 15,0 0-17-15,0 0-1 16,0 0-6-16,0 0 4 16,0 0-6-16,0 0 3 15,0 0-1-15,0 0 12 16,0 0-4-16,0 0 9 15,0 0 3-15,0 0-16 16,0 0 32-16,0 0-20 16,0 0 1-16,0-3 18 15,0 0-34-15,0 3 21 16,7-2-17-16,-7 2 2 16,7-6 4-16,0-8-11 0,-7 2 0 15,0-5-4-15,7 5 15 16,-7 4-11-16,0-4 0 15,0 0 4-15,0 2-13 16,0 1 9-16,-7 0 0 16,-7 1-4-16,-3 2 5 15,3 6-4-15,0 0 3 16,8 0-6-16,-12 0-4 16,-9 14 8-16,-4 20 2 15,0 13 0-15,10 11 5 16,8 6-5-16,2 13 0 15,11 0 2-15,0 1-8 16,11-10 6-16,40-10 0 0,8-19-2 16,6-14-5-1,11-12 7-15,-11-13 0 0,4 0 0 16,-11-13 8-16,-6-20-2 16,-8-13-6-16,-13-8 16 15,-3-12-11-15,-11-5 9 16,-17 2-9-16,0 6-2 15,-55 12 0-15,-17 2-3 16,-11 17 0-16,-6 13 0 16,17 10-9-16,20 9 6 15,14 0-45-15,31 18-69 16,7 18-51-16,7-1-87 0,66-1-147 16</inkml:trace>
+  <inkml:trace contextRef="#ctx0" brushRef="#br0" timeOffset="-140356.73">6226 8763 833 0,'0'0'248'0,"0"0"-79"15,0 0-15-15,-58-173-35 16,34 153-54-16,17 9-6 15,0 8-35-15,7 3 3 0,0 0-26 16,-7 20 2 0,-6 40-3-16,-5 29 8 0,5 23-6 15,-1 10 15-15,-3 17-11 16,10 8-5-16,7 7-1 16,0 6 16-16,0 4-18 15,0-11 2-15,0-6 0 16,14-27-5-16,10-31 10 15,7-32-5-15,-4-23 0 16,11-17-28-16,13-17 15 16,15 0-34-16,9-11-49 15,1-29-56-15,-17-15-260 16</inkml:trace>
+  <inkml:trace contextRef="#ctx0" brushRef="#br0" timeOffset="-139858.73">6670 9170 755 0,'0'0'192'0,"0"0"-23"15,0 0-55-15,0 0-19 16,0 0-62-16,0 0 3 0,24-117-16 15,-3 117-17 1,3 0 10-16,3 0-13 0,11 9 0 16,-7 20-8-16,-10 11 4 15,3 6 4-15,-10 2 0 16,-8 0 4-16,-6-5-10 16,0-5 6-16,0-18 0 15,0-9-5-15,0-8 6 16,0-3-1-16,0 0 17 15,0 0-16-15,7-9 36 16,-7-22-1-16,11-12-27 16,2-5 7-16,15-7-10 15,10-2-2-15,-1 3-3 16,1 11 7-16,-17 17-5 0,-4 15-3 16,-3 11 0-1,0 0-7-15,10 0-7 0,-4 29 14 16,-6 13 0-16,3 0-3 15,-10 8-2-15,0 1 5 16,0-5-19-16,-7-1-4 16,7-1-78-16,10-13-84 15,-17 1-67-15,0-10-269 16</inkml:trace>
+  <inkml:trace contextRef="#ctx0" brushRef="#br0" timeOffset="-139628.73">6464 9588 649 0,'0'0'113'0,"0"0"13"0,0 0-16 16,0 0 3-16,319 0 17 16,-164-20-30-16,-7-5-61 15,-21 4-7-15,-17 7-6 16,-20 8-23-16,-32 4 1 15,-20 2-4-15,-31 0-39 16,-7 13-109-16,-14 25-133 16,-37 2-107-16</inkml:trace>
+  <inkml:trace contextRef="#ctx0" brushRef="#br0" timeOffset="-139293.73">6938 9858 574 0,'0'0'199'0,"0"0"-45"16,0 0-31-16,0 0-10 16,0 0-59-16,0 0-42 15,90-53 21-15,-59 53-11 16,3 9-2-16,-3 17 4 16,-10 8-22-16,-11 9 16 15,-10 13-13-15,0 8 4 16,-24 5 14-16,-21-6-22 15,7-13 11-15,11-18-3 16,10-6-3-16,10-20 5 0,7-4-2 16,0-2-9-1,0 0 38-15,0 0-19 0,17 0-4 16,28 0 0-16,13-8-7 16,31-18 3-16,15 1-11 15,12-8-69-15,19 3-85 16,12 4-138-16,-6 0-309 15</inkml:trace>
+  <inkml:trace contextRef="#ctx0" brushRef="#br0" timeOffset="-138975.73">7863 9190 515 0,'0'0'428'15,"0"0"-255"-15,0 0 16 16,0 0-72-16,0 0-28 16,0 0-45-16,-65-108-41 15,89 108-4-15,17 16 6 16,21 10-5-16,-10 15 0 15,6 8 11-15,1-6-13 16,2 5 2-16,-2-5 0 16,-14-6-9-16,-1-6-67 0,-16-8-115 15,-4-5-94-15,-17-6-198 16</inkml:trace>
+  <inkml:trace contextRef="#ctx0" brushRef="#br0" timeOffset="-138761.73">8183 9113 755 0,'0'0'212'15,"0"0"-14"-15,0 0-57 16,0 0-14-16,0 0-76 16,0 0-43-16,-28-31-8 0,18 62 0 15,-4 18 0-15,1 3 1 16,-11 5 10-16,17-3-22 15,7-5-14-15,0-7-111 16,0-7-126-16,37-12-133 16</inkml:trace>
+  <inkml:trace contextRef="#ctx0" brushRef="#br0" timeOffset="-138088.73">8561 9180 349 0,'0'0'398'0,"0"0"-205"16,0 0-48-1,0 0-34-15,0 0-30 0,0 0-28 16,224-178-5-16,-142 135 11 16,-17-8-37-16,-13 3 21 15,-21-1 1-15,-10-3-24 16,-21 3 20-16,0 3-27 15,0 10-12-15,0 12 16 16,-14 10-8-16,7 12-9 16,7 2 0-16,-10 0-6 15,-4 2-2-15,-14 36-2 16,4 16 10-16,-7 9 5 0,11 5 4 16,6 4-9-1,14-6 0-15,0-6 3 0,14-11-14 16,24-11 11-16,-1-12 0 15,5-8-11-15,-11-12 11 16,0-6 0-16,-4 0 0 16,4 0 7-16,0-15-5 15,-4-5-2-15,4-5 0 16,-17 2-2-16,0 3 15 16,-4 2-13-16,-10 13 0 15,0 2 8-15,0 3-15 16,0 0 7-16,0 0-13 15,7 12 11-15,7 19-7 16,10 9 9-16,3-3 0 16,4-2 3-16,7-14-12 0,7-2 9 15,-11-19 0-15,11 0 3 16,-7 0 6-16,7-14-9 16,-8-16 0-16,-9-1 8 15,-11-6 4-15,-17-5-8 16,0-2-2-16,-17 5 4 15,-42 1-6-15,1 9 0 16,-11 9 0-16,11 8-5 16,6 12-4-16,21 0-27 15,4 16-67-15,20 24-42 16,7 8-72-16,0 1-74 16,34-4-263-16</inkml:trace>
+  <inkml:trace contextRef="#ctx0" brushRef="#br0" timeOffset="-137562.73">9851 9157 432 0,'0'0'265'0,"0"0"-50"15,0 0-11-15,0 0-63 16,0 0-35-16,17-164-25 16,-41 144-36-16,-7 6 5 15,3 3-34-15,-3 8-6 16,4 3-7-16,3 0 7 15,3 8-10-15,-3 21 0 16,17 8 2-16,7-3-12 0,0 1 10 16,21-6-4-16,23-7-1 15,11-4-10-15,-3-13 15 16,0-5 0-16,-18 0 3 16,-3 0 4-16,0 0-5 15,-17-3 5-15,-14-4 26 16,6 0-11-16,-6 1 25 15,0 6-20-15,0 0-25 16,0 0 2-16,0 13-4 16,-6 30 0-16,-8 25 6 15,-3 9 5-15,10 6-8 16,7 7-3-16,0 11 2 0,0 4 5 16,0 6-1-16,0-7-6 15,0-10 4-15,-14-22 4 16,-10-18-2-16,10-22-6 15,-6-17 1-15,13-13 3 16,-24-2 4-16,-7 0 6 16,-14 0 10-16,-6-28-17 15,-18-10-5-15,4-8-2 16,-10-11-42-16,16-6-20 16,4-17-42-16,42-6-52 15,20-2-110-15,51-1-177 16</inkml:trace>
+  <inkml:trace contextRef="#ctx0" brushRef="#br0" timeOffset="-137238.73">10332 8735 529 0,'0'0'217'0,"0"0"-60"15,0 0-29-15,0 0 17 16,0 0-42-16,0 0-24 15,10-115 11-15,-10 115-48 16,0 0 4-16,0 0-9 16,0 0-36-16,0 0 18 15,0 0-19-15,0 10-15 16,0 31 15-16,-24 13 5 16,17 14 6-16,0 10-11 0,7 4 11 15,0 1-8-15,14-8-3 16,17-6 1-16,3-15-8 15,-3-15 2-15,-7-7-35 16,-3-9-43-16,-14-6-95 16,0-8-58-16,0-9-90 15,3 0-211-15</inkml:trace>
+  <inkml:trace contextRef="#ctx0" brushRef="#br0" timeOffset="-136848.73">10518 9137 541 0,'0'0'143'15,"0"0"56"-15,0 0-73 16,0-150 15-16,0 122-41 0,0 3-16 16,0 7-48-16,0 10-7 15,24 5-5-15,-4 3-21 16,11 0-3-16,-3 5 0 16,3 19 6-16,-7 1-14 15,-17 1 8-15,6 0 0 16,-6-3-10-16,-7-4 11 15,0 2-1-15,7-15 0 16,-7-4 10-16,0-2-10 16,0 0 0-16,7 0 1 15,-7 0 25-15,10-2-24 16,-3-18 8-16,0-6-10 16,14 1 8-16,10 1-7 0,-11 1-1 15,11 6 0-15,0 6-5 16,-10 5 5-16,3 6 0 15,3 0 0-15,4 0-4 16,7 17-6-16,-17 3 9 16,10 0-40-16,-11 4-32 15,-2-2-85-15,2-3-63 16,11 5-241-16</inkml:trace>
+  <inkml:trace contextRef="#ctx0" brushRef="#br0" timeOffset="-136571.73">11037 8536 474 0,'0'0'258'0,"0"0"-66"0,0 0-41 15,0 0-17-15,0 0-103 16,0 0 3-16,127-31 8 15,-82 65-22-15,6 15 26 16,-13 5-33-16,7 14-3 16,-11 10 4-16,-3 2-2 15,-24 3-12-15,0-3 0 0,-7-9 3 16,0-8-12 0,0-5-138-16,-21-16-152 0,-17-8-261 15</inkml:trace>
+  <inkml:trace contextRef="#ctx0" brushRef="#br0" timeOffset="-136270.73">11222 8265 624 0,'0'0'273'0,"0"0"-130"16,0 0 28-16,0 0-14 0,0 0-114 16,0 0-2-16,224-15-5 15,-159 61-22-15,18 25 35 16,-1 24-39-16,-16 16 3 16,-8 21 35-16,-20 2-40 15,-17 0 13-15,-21 4-21 16,0-8 4-16,-28-1-11 15,-30-3-27-15,-18-8-184 16,-7-1-426-16</inkml:trace>
   <inkml:trace contextRef="#ctx0" brushRef="#br2" timeOffset="33328">6055 1896 49 0,'0'0'776'16,"0"0"-608"-16,0 0-7 15,0 0-6-15,0 0-81 16,0 0-7-16,10-17-41 16,-10 17 9-16,0 0 0 15,0 0-34-15,0 0 14 16,0 0-15-16,0 0 1 15,0 8-11-15,-10 16-2 0,-4 7 12 16,0 6-3 0,14 3 6-16,0-6-3 0,21-2 0 15,30-7-2-15,11-11-6 16,-10-8 5-16,-1-6 3 16,-6 0 13-16,-18 0-4 15,4-11-7-15,-24-14 11 16,0-10-10-16,-7-5 38 15,0-3-26-15,-7-3-6 16,-20 9 7-16,-11 9-5 16,7 5-10-16,-21 8-1 15,1 10-2-15,-14 5-9 16,-4 0 11-16,10 14-31 16,28 22-40-16,11 14-137 15,20-3-164-15,0-1-177 0</inkml:trace>
   <inkml:trace contextRef="#ctx0" brushRef="#br2" timeOffset="35451">2193 4876 646 0,'0'0'194'0,"0"0"-74"16,0 0 1-16,0 0-51 15,0 0-52-15,0 0 21 16,114-24 15-16,-63 19-6 15,1-2 5-15,-1 5-40 16,8-4 20-16,-1 6 9 16,-13 0-40-16,-7 0 14 15,-7 0-16-15,-4 0 0 16,-16 0-5-16,-4 3 5 16,-7 9-4-16,0 7-1 0,-38 10 5 15,-21 5 9-15,-23 1-9 16,6-4 4-16,4-8-6 15,13-9 8-15,15-6-6 16,20-4 0-16,24-2 9 16,0-2-10-16,0 0 1 15,0 0 0-15,0 0-7 16,0 0 7-16,37 0 0 16,22 0-4-16,10 0 14 15,-4 4-11-15,-7 7 1 0,4 3 0 16,-27 6-9-1,3 0 12-15,-25 0-3 0,-2 2 0 16,-11-1-4-16,-11 5 4 16,-54-1 0-16,-18-1 0 15,-27-4 9-15,-10-6-6 16,17-9-3-16,0-1 0 16,20-4 9-16,25 0-24 15,20 0-6-15,17 0-69 16,21-18-83-16,31-11-276 15</inkml:trace>
   <inkml:trace contextRef="#ctx0" brushRef="#br2" timeOffset="184981">9761 1434 470 0,'0'0'175'0,"0"0"-126"16,0 0-11-16,-251-48-14 15,193 39-20-15,-18-2 11 16,11-1-15-16,-18-2-13 15,-6-3-8-15,-1 0-26 16,-13 0-45-16,-7 3-75 0</inkml:trace>
@@ -2764,7 +2764,7 @@
   <inkml:trace contextRef="#ctx0" brushRef="#br0" timeOffset="-69123">447 1537 18 0,'0'0'139'0,"0"0"-11"15,0 0 6-15,0 0-35 16,-217 0 33-16,186 0-43 16,10 0-27-16,1 0 17 0,9 0-28 15,5 0-4-15,-1 0 2 16,7 0-28-16,0 1 25 16,0-1-21-16,0 0-5 15,0 0 14-15,7 0-34 16,44 4 0-16,45-4 25 15,52 0-23-15,76 0 23 16,89 0-5-16,55-20 5 16,72-6 7-16,10 3-31 15,-6 3 10-15,-28 5-6 16,-59 4 2-16,-40 2 2 16,-49 1-9-16,-24 0 3 15,-21-1-2-15,-30-2 9 16,-25 2-7-16,-27-5 2 15,-13-4 2-15,-8 2 8 0,-24-2 6 16,-10 2-14-16,-24 3 20 16,-17 2-24-16,-18 2 9 15,-10 3 1-15,-10 1-10 16,-7 3 10-16,0-1-13 16,7 3 0-16,-7 0-8 15,7 0 8-15,0 0 0 16,0 0-1-16,0 0-3 15,-7 0-6-15,0 0-76 16,0 0-48-16,0 0-19 16,-7 8-7-16,-14-6-77 15,-10 8-146-15</inkml:trace>
   <inkml:trace contextRef="#ctx0" brushRef="#br2" timeOffset="185266">7574 1140 410 0,'0'0'149'0,"0"0"-73"0,0 0 1 15,-271-15-8 1,195 15-52-16,-13 0-2 0,-8 0-15 16,1 12 7-16,7 2-22 15,-1 1-3-15,18-4 2 16,3 0-9-16,-3 1-15 15,7 1-7-15,-18 2-30 16,-13 0-59-16,-7 1-112 16</inkml:trace>
   <inkml:trace contextRef="#ctx0" brushRef="#br2" timeOffset="185434">5604 1312 126 0,'0'0'162'0,"0"0"-31"0,-244 0-42 16,134 2-10-16,-10 7-37 15,3 6-2-15,-4 4-15 0,18 4-23 16,7 6 6-16,0-1-8 16,13 4-23-16,18-1-59 15,13-5-93-15</inkml:trace>
-  <inkml:trace contextRef="#ctx0" brushRef="#br0" timeOffset="220332">7567 2229 176 0,'0'0'307'0,"0"0"-158"16,0 0-13-16,0 0 13 16,0 0-84-16,0 0 3 15,0-34 19-15,0 22-31 16,0-2 16-16,-6-3-37 16,-1-3 8-16,-7 0-7 0,-3 0-28 15,3 0 13-15,-7 6-16 16,4 0 3-16,-3 5-10 15,-5 6 2-15,12 3 0 16,-18 0-1-16,10 0-1 16,-10 20 2-16,-3 12 0 15,3 2 2-15,0-3-10 16,10 1 9-16,14-2-1 16,-3-1 0-16,10-2 5 15,0-7-9-15,0-4 4 16,0-7-19-16,24-3 17 15,14-6-9-15,-11 0 11 16,4 0 2-16,0-3 14 0,-17-15-11 16,7 2-5-1,3-7 1-15,-10 0-1 0,10 6 1 16,-17 5-1 0,-7 4 0-16,0 5 15 0,0 3-15 15,0 0 0-15,0 0 1 16,0 0-15-16,0 0 1 15,0 11 13-15,0 18-2 16,0 8 17-16,-7 6-16 16,-4 0 1-1,11 2 0-15,-7-5 4 0,7-5 3 16,0-7-7-16,0-8 0 16,0-2 12-16,0-8-16 15,0 3 4-15,0-5-8 0,0 4-38 16,0-4-171-1,0-3-156-15</inkml:trace>
+  <inkml:trace contextRef="#ctx0" brushRef="#br0" timeOffset="-209164.73">7567 2229 176 0,'0'0'307'0,"0"0"-158"16,0 0-13-16,0 0 13 16,0 0-84-16,0 0 3 15,0-34 19-15,0 22-31 16,0-2 16-16,-6-3-37 16,-1-3 8-16,-7 0-7 0,-3 0-28 15,3 0 13-15,-7 6-16 16,4 0 3-16,-3 5-10 15,-5 6 2-15,12 3 0 16,-18 0-1-16,10 0-1 16,-10 20 2-16,-3 12 0 15,3 2 2-15,0-3-10 16,10 1 9-16,14-2-1 16,-3-1 0-16,10-2 5 15,0-7-9-15,0-4 4 16,0-7-19-16,24-3 17 15,14-6-9-15,-11 0 11 16,4 0 2-16,0-3 14 0,-17-15-11 16,7 2-5-1,3-7 1-15,-10 0-1 0,10 6 1 16,-17 5-1 0,-7 4 0-16,0 5 15 0,0 3-15 15,0 0 0-15,0 0 1 16,0 0-15-16,0 0 1 15,0 11 13-15,0 18-2 16,0 8 17-16,-7 6-16 16,-4 0 1-1,11 2 0-15,-7-5 4 0,7-5 3 16,0-7-7-16,0-8 0 16,0-2 12-16,0-8-16 15,0 3 4-15,0-5-8 0,0 4-38 16,0-4-171-1,0-3-156-15</inkml:trace>
   <inkml:trace contextRef="#ctx0" brushRef="#br2" timeOffset="34523">9094 2888 602 0,'0'0'121'0,"0"0"-5"15,0 0 24-15,0 0-86 16,0 0-19-16,0 0-27 15,107-17 1-15,-49 17 20 16,-6 0-20-16,-25 17-4 16,4 9 13-16,-24 11-15 15,-7 3 12-15,0 6 27 16,-38 2-29-16,-27-1 41 16,0-8-35-16,-4-7 9 0,31-12 5 15,17-14-27-15,21-6-5 16,0 0-1-16,31 0 6 15,48 0-6-15,42 0 24 16,27-6-8-16,-14-8-6 16,-24 8-5-16,-35 6-10 15,-47 0-102-15,-28 20-250 16</inkml:trace>
   <inkml:trace contextRef="#ctx0" brushRef="#br0" timeOffset="-44383">6079 4801 220 0,'0'0'57'16,"0"0"11"-16,0 0-53 16,0 0-6-16,0 0-9 15,0 0 8-15,-207-9-8 16,183 9 0-16,10 0 0 15,1 0-5-15,-4 0 5 16,17 0-4-16,-14 0-101 16</inkml:trace>
   <inkml:trace contextRef="#ctx0" brushRef="#br0" timeOffset="-37602">7908 4205 9 0,'0'0'120'15,"0"0"-52"-15,0 0-46 16,0 0 61-16,0 0-65 16,261 124-17-16,-196-91 18 15,11-3-19-15,20-2-53 0,1-2-160 16</inkml:trace>
@@ -2772,20 +2772,20 @@
   <inkml:trace contextRef="#ctx0" brushRef="#br2" timeOffset="59172">7671 5384 100 0,'0'0'92'0,"0"0"30"0,0 0-44 15,0 0 15-15,0 0-86 16,0 0-7-16,-42-155-53 16,42 116 28-16,-10 1 25 15,3 1 1-15,-7 3 3 16,1-3 6-16,-5 3-6 15,5-3-1-15,6-1 4 16,-10 4-7-16,10-1-9 16,7 1-3-16,-14 0-7 15,14 0-1-15,0 0-75 16,0-1-63-16</inkml:trace>
   <inkml:trace contextRef="#ctx0" brushRef="#br0" timeOffset="171727">3713 5588 496 0,'0'0'185'16,"0"0"-62"-16,0 0 4 0,0 0-5 15,0 0-17-15,0 0-75 16,0 0 8-16,-27-26-3 15,54 7-29-15,25-4 22 16,-1-6-3-16,-6 3 4 16,0 4 14-16,-8-1-32 15,-13 3 12-15,-10 3 11 16,7 5-30-16,-21 6 27 16,0 4-14-16,0 2-9 15,0 0-2-15,0 0-6 16,0 0-5-16,0 20 4 15,0 19-5-15,0 13 6 0,0 11 0 16,0-3 1-16,0 0 3 16,0-3 1-1,0-8-5-15,0-6 0 0,0-3 12 16,0-9-12-16,0-11 0 16,0-8 0-16,0-6-5 15,0-6 12-15,0 0-7 16,0 2 0-16,-28 1 9 15,-23 6-3-15,6 0-3 16,-17-1 4-16,21 0-7 16,10-6 4-16,17 2-4 0,14-4 0 15,0 0 6 1,0 0-12-16,0 0 6 0,0 0-7 16,45 0 1-16,34 0 11 15,48-9-5-15,14-17 2 16,0-2 3-16,-45 14-10 15,-68 11-86-15,-28 3-289 16,-52 0-657-16</inkml:trace>
   <inkml:trace contextRef="#ctx0" brushRef="#br2" timeOffset="182717">4122 3060 442 0,'0'0'356'0,"0"0"-212"0,0 0 1 16,0 0 3-16,0 0-82 15,0 0-8-15,0-22-12 16,0 22-22-16,0-3 22 16,0 3-18-16,0-6-12 15,0 4 26-15,7-12-30 16,14-6 12-16,10-3-15 16,6-6 2-16,-6 5-2 15,4 2-9-15,-11 2 1 16,-4 6 9-16,5 2-8 15,-19 9 2-15,-6 3-2 16,7 0 10-16,-7 0-14 16,0 0 2-16,0 0-10 0,0 9-1 15,0 35 3-15,14 13 8 16,-14 6 1-16,7 2 10 16,3-5-12-16,4 0 1 15,0-3 0-15,10-9-4 16,-17-7 7-16,6-14-3 15,-13-8 0-15,7-8 7 16,-7-5-8-16,0-6 1 16,0 0 0-16,0 0-4 15,-13 0 4-15,-32 3 0 16,-7-3-1-16,-13 0 13 16,3 0-13-16,17 0 1 0,18 0 0 15,10 3-1-15,3-3 1 16,14 0 0-16,0 0-2 15,0 0-1-15,0 2-6 16,31-2 5-16,41 0 4 16,17 0-1-16,39 0 3 15,6-8-2-15,-10-15 0 16,3 0 8-16,-10-3-8 16,-11 6 0-16,-40 4 2 15,-22 4-13-15,-30 12-22 16,-14 0-91-16,-7 0-133 15,-44 22-359-15</inkml:trace>
-  <inkml:trace contextRef="#ctx0" brushRef="#br0" timeOffset="225303">6240 5617 242 0,'0'0'260'0,"0"0"-98"0,0 0-26 16,0 0-25-16,0 0 32 15,0 0-60-15,24-55 10 16,-24 53-14-16,0 2-32 16,0 0 7-16,0 0-40 15,0 0-1-15,0 0-13 16,0 2-14-16,0 27 14 16,0 15 0-16,-7 4 8 15,-17-3 2-15,4-5-9 16,3-5-1-16,-4-4 0 15,14-5 13-15,0-6-13 16,7-5 0-16,0-10 1 16,0-5-6-16,0 0 8 0,0 0-3 15,0 0 0 1,0 0 7-16,0 0-12 0,28 0 5 16,9 0 0-16,1 0 1 15,7 0 1-15,-17 0-2 16,2 0 0-16,1 0 6 15,-10-3-6-15,-7-9 0 16,3-5 2-16,-10 7-7 16,0-2 12-16,-7 0-7 15,0 4 0-15,0-4 14 16,0 1-8-16,0 3 2 16,0-2 2-16,0 5 19 15,-7 2-19-15,0-3 5 16,7 6 4-16,0 0-11 0,0 0-13 15,-7 0 5-15,-3 29-4 16,10 9-7 0,-7 7 12-16,7 1-1 0,0-1 0 15,0 1 9 1,0 0-22-16,0 2 11 0,0-2-114 16,0-5-111-16,-21-16-300 15</inkml:trace>
-  <inkml:trace contextRef="#ctx0" brushRef="#br0" timeOffset="226135">5522 3613 61 0,'0'0'553'0,"0"0"-419"16,0 0 15-16,0 0-54 15,0 0 8-15,0 0-9 16,-35-28-47-16,35 24 1 16,0 4-32-16,0 0-6 0,0-3-15 15,7 1 5-15,38-1 0 16,-1-3 9-16,8 0-3 15,-18 4-6-15,-9-1 0 16,-5 3 10-16,-3-4-13 16,-17 4 3-16,0 0 0 15,14 0-9-15,-14 0 8 16,7 15 1-16,-7 19 0 16,0 12 10-16,0 9-12 15,0 4 2-15,0 4 0 16,-7 0-2-16,0-9 10 15,7-7-8-15,0-10 0 16,0-9-15-16,0-8-34 0,0-5-106 16,0-7-15-1,0-8-18-15,0 0-114 0</inkml:trace>
-  <inkml:trace contextRef="#ctx0" brushRef="#br0" timeOffset="226301">5573 3950 426 0,'0'0'162'0,"0"0"-44"15,0 0-43-15,0 0 9 16,231-40-44-16,-142 37-38 0,-13 3-4 16,-32 0-372-16</inkml:trace>
-  <inkml:trace contextRef="#ctx0" brushRef="#br3" timeOffset="691983">3142 11060 540 0,'0'0'277'0,"0"0"-115"0,0 0 10 16,0 0-21-16,0 0-75 15,0 0-17-15,-34-19-27 16,92 7-20-16,39-5 9 16,44-6-14-16,13 0 22 15,18 3-9-15,-3-6-17 16,-15 9 6-16,-26 9-5 16,-46 2-4-16,-44 6 0 15,-24 0-4-15,-14 0-36 16,0 0-61-16,0 18-61 15,-38 4-2-15,-7 2-82 16,-13-11-19-16,6 4-51 0</inkml:trace>
-  <inkml:trace contextRef="#ctx0" brushRef="#br3" timeOffset="692212">3967 10986 128 0,'0'0'244'16,"0"0"-41"-16,0 0-47 16,0 0 7-16,0 0-54 15,0 0 18-15,-158-57-27 16,158 57-53-16,-7 9-45 15,1 36 15-15,-8 22 1 16,-3 15 50-16,10-2-45 16,7 4 23-16,0 0-2 15,0-3-20-15,0 2-2 16,0-18-15-16,0-2-3 16,7-14 1-16,3-9 1 15,-3-14-8-15,0-9 2 16,-7 3-79-16,0-12-73 0,0-2-163 15,13-6-231-15</inkml:trace>
-  <inkml:trace contextRef="#ctx0" brushRef="#br3" timeOffset="692568">4346 11404 727 0,'0'0'202'16,"0"0"-58"-16,0 0-8 16,0 0-16-16,0 0-77 0,0 0-43 15,-83-37 0 1,83 48-20-16,0 15 20 0,0 5 0 16,7-5 4-16,31 0-4 15,13-7-1-15,1-7-1 16,-14-6 3-16,-4-6-1 15,-3 0 9-15,-7 0 3 16,-17-18 46-16,0-1 5 16,-7-5-11-16,0 2-11 15,-7 5-28-15,-31-3-5 16,-6 8-8-16,-1 5-8 16,-7 7 8-16,14 0-53 15,18 7-85-15,20 19-79 0,20-3-137 16</inkml:trace>
-  <inkml:trace contextRef="#ctx0" brushRef="#br3" timeOffset="692918">5687 11017 608 0,'0'0'354'0,"0"0"-162"15,0 0-32-15,0 0-22 16,0 0-73-16,0 0-38 0,-238-117-9 16,177 170-18-16,-12 18 0 15,15 23 4-15,13-3 3 16,14 9-7-16,17-3 0 16,14 3 0-16,0-11 3 15,59-7 0-15,23-16-3 16,8-11 0-16,-1-21 3 15,-3-8 3-15,4-15-5 16,-8-5 0-16,-6-6 13 16,-11 0-13-16,-6 0 11 15,-22-11-12-15,-23 8-1 16,-14-3-37-16,0 6-90 16,0 0-114-16,0-5-339 15</inkml:trace>
-  <inkml:trace contextRef="#ctx0" brushRef="#br3" timeOffset="694187">5917 11487 72 0,'0'0'380'16,"0"0"-242"-16,0 0-32 15,0 0 34-15,0 0-24 16,0 0-10-16,-69-63-22 15,62 63-45-15,7 0 4 16,-7 0-13-16,7 0-30 16,0 0-6-16,-13 0 3 15,2 17 3-15,5 5 3 16,-1 2-3-16,7-5 5 16,0-1-11-16,13-4 6 15,25-8 0-15,7-6 9 0,0 0-4 16,-14 0 32-1,-4-23 30-15,-3-3 1 0,-3 0-8 16,-21-5-21-16,0 6 0 16,0-4-6-16,-28 5-29 15,-34 10-4-15,-10 3 0 16,-3 11-10-16,2 0-9 16,22 11-75-16,20 21-84 15,24 8-104-15,7 3-217 16</inkml:trace>
-  <inkml:trace contextRef="#ctx0" brushRef="#br3" timeOffset="696698">6753 11435 166 0,'0'0'256'0,"0"0"-123"15,0 0 1-15,0 0-18 16,0 0-11-16,0 0-28 16,-141 0-5-16,141 0 31 15,0 0-37-15,0 0-15 0,0-6-14 16,0 6-32-1,6 0 2-15,46-5-5 0,31 5-2 16,20 0 11-16,0 0-10 16,-3 0 5-16,-21 0 5 15,-4-11-9-15,-3 2 17 16,4-10 3-16,-17 12-8 16,-15-4 11-16,-30 4-12 15,-14 5 7-15,0 2 4 16,0-9 3-16,0-8 9 15,-14-6-36-15,-37 2 0 16,-1-1-3-16,-6 8 4 0,-4 5-1 16,3 4 0-16,15-1 0 15,6 6-2-15,17 0 2 16,14 0 0 0,7-6-10-16,0 6 10 0,0 0 0 15,0 0 0-15,14 0-12 16,24 14 12-16,20 12 1 15,1-4 2-15,3-1 2 16,-4 5-3-16,1-1-2 16,-1 0 0-16,-20 3 4 15,-7-3-7-15,-17 0 3 16,-14 4 0-16,0 0-3 16,-31 0 3-16,-28 5-9 15,-13-5-105-15,20-7-88 16,8 2-76-16,26-6-267 0</inkml:trace>
-  <inkml:trace contextRef="#ctx0" brushRef="#br3" timeOffset="697128">8272 11163 710 0,'0'0'203'15,"0"0"-28"-15,0 0-31 16,0 0 14-16,0 0-73 16,0 0-53-16,0-37-12 0,0 37-20 15,-13 9-13-15,-5 25 8 16,-2 17 5-16,-1 7 4 16,21 5-4-16,0 0 4 15,14-6-6-15,24-6 2 16,13-17 0-16,-6-5-2 15,0-20 6-15,-4-4-4 16,14-5 6-16,-3 0-3 16,-1-20 23-16,-6-17-2 15,-1 0 8-15,-16-3 4 16,-11-11-15-16,-17-4 8 16,0 2-14-16,-55 0-14 15,-10 11 5-15,-7 4-6 0,-4 18 0 16,18 6-5-16,13 14 2 15,0 0-9-15,14 3-33 16,17 34-60-16,14 3-60 16,0 0-138-16,21-6-144 15</inkml:trace>
-  <inkml:trace contextRef="#ctx0" brushRef="#br3" timeOffset="697906">9524 10620 57 0,'0'0'629'0,"0"0"-442"16,0-189-41-16,0 138-1 15,0 11-4-15,0 11-15 16,0 13-38-16,-7 6-22 16,7 8-33-16,-7 2-2 15,7 0-31-15,-7 12-10 16,-17 53 7-16,-10 32 3 16,-11 37 0-16,0 21 8 15,8 11-2-15,23 8 3 16,14-8-5-16,0 0-4 15,27-15 9-15,35-28-7 0,17-17 0 16,4-29 0-16,-8-31-1 16,-33-9-2-16,-4-19-5 15,-14-4-52-15,-4-9-79 16,11-5-128-16,7-19-155 16</inkml:trace>
-  <inkml:trace contextRef="#ctx0" brushRef="#br3" timeOffset="699501">9902 11309 554 0,'0'0'154'0,"0"0"32"0,0 0-36 15,0 0-45-15,0 0-28 16,0 0-9-16,7-146-36 16,24 126 5-16,0 3-18 15,-11 9-16-15,11 2 8 16,-10 6-11-16,-4 0-2 15,11 0-3-15,-4 26-3 16,-10 11 8-16,-1 0 0 16,-6 9 2-16,-7-3-6 15,0 2 4-15,0-13 0 16,0-6 3-16,0-6-1 16,0-15-2-16,0-5 0 15,0 0 3-15,0 0 7 16,17 0-2-16,-10-14 13 15,7-23 39-15,10-9-48 0,-3-3-12 16,17-2 1-16,-7 0 5 16,-4 5-3-16,4 17-3 15,-17 15 0-15,-7 8-4 16,-1 6 2-16,19 0-1 16,5 6-5-16,-2 20 3 15,3 5-2-15,-4 6 5 16,4 3 2-16,-17-2-2 15,3-6-8-15,-10-7-5 16,0-5-43-16,0-12-50 0,-7 1-23 16,0 0-65-1,0-9-94-15</inkml:trace>
-  <inkml:trace contextRef="#ctx0" brushRef="#br3" timeOffset="699796">10793 10494 689 0,'0'0'190'0,"0"0"-22"16,0 0-59-16,0 0-10 15,0 0-67-15,0 0-29 0,65 17 27 16,11 47 2-16,-1 14-2 15,-3 18-4-15,4 7-4 16,-17 5 8-16,-15-2-27 16,-16 3 1-16,-18-12 1 15,-10 3 4-15,-10-11-10 16,-69-4 1-16,-24-4-111 16,-4-18-124-16,11-12-232 15</inkml:trace>
-  <inkml:trace contextRef="#ctx0" brushRef="#br3" timeOffset="705081">12608 9983 164 0,'0'0'339'15,"0"0"-250"-15,0 0 26 16,0 0 13-16,0 0-26 16,0 0 3-16,38-51-22 15,-38 48-13-15,0 0 4 16,0-3-36-16,-45 3 5 15,-44 0-25-15,-38-3-10 16,-21 4 9-16,0-7-15 0,0 0 0 16,0-3 11-16,-7 5-6 15,-16 1-4-15,-36 6-3 16,-44 0 9-16,-31 0-11 16,-37 0 2-16,-29 11 0 15,-23 3-7-15,-38 0 14 16,-14 1-7-16,-14-3 0 15,14 5 4-15,38-8-4 16,14-1 0-16,48 0 0 16,10-8-7-16,0 2 14 15,10 2-7-15,8 8 0 16,6 2 4-16,7 6-10 0,7 3 6 16,24-1 0-1,13-2-3-15,29-8 10 0,33-1-7 16,28-11 0-1,14 0 5-15,7 0-13 0,24 0 8 16,0 0 0-16,0 0-4 16,-11 0 12-16,-3 0-8 15,-17 0 0-15,-7 14 2 16,-7 4-5-16,7-7 3 16,14 6 0-16,10-5-2 15,14-2 11-15,28 5-9 16,2-4 0-16,29-4 0 15,-1 4-7-15,7-2 7 16,7-4 0-16,4 4-2 16,-4 8 7-16,-14 3-5 0,0 6 0 15,1 11 0 1,-1-3-10-16,11 15 10 0,-4 2 0 16,14 12-4-16,10 12 11 15,7 16-7-15,7 4 0 16,0 12 1-16,0 9-5 15,0 0 7-15,7 5-3 16,7-1 3-16,-7-6 5 16,3-5-3-16,4-6-1 15,-8-3-1-15,-6-9 18 16,0 4-19-16,0-7 6 16,0 1 2-16,0-12-6 0,7-8 2 15,0-11-6 1,10-13 4-16,-3-8-5 15,7-11 2-15,3-1-1 0,7-11 0 16,10 4 6-16,28 2-4 16,20-9-2-16,21 3 0 15,24-2 4-15,7 2 1 16,7-2-5-16,0 8 3 16,7-1 2-16,10 4-2 15,10-2-3-15,21-2 0 16,10 1-3-16,25-9 6 15,34-3-3-15,47-3 1 16,15-5 5-16,27 0-5 0,-3 8-1 16,-28-3 0-1,-3 7-5-15,-17-9 6 0,3 0-1 16,-11-3 0-16,1 0 2 16,17 0-2-16,-4 0 0 15,18-6 1-15,0 0-2 16,-8-5 2-16,-23 3-2 15,-21-5 0-15,-17 8 1 16,-28-3 0-16,-13 3 0 16,-11 5 0-16,-13 0 1 15,6 0-1-15,-6 0 2 16,17 0-2-16,3 0 1 0,3 0-1 16,4 0 0-1,-27 0-2-15,0 0 1 0,-28 0 0 16,-4 0 1-16,-13-7-2 15,0 7 7-15,3-11-7 16,11 5 2-16,-1-2 0 16,-2-4-2-16,-19 3 6 15,-23-8-4-15,-13 3 0 16,-43 3 0-16,-9-9-4 16,-31 2 10-16,-8-2-6 15,5-17 19-15,-18-3 9 16,0-9-8-16,0-10-8 15,0-10 2-15,6-14-8 16,-6-8-4-16,0-4-2 16,7 1 7-16,-7-1-1 0,0 4 0 15,0 2 0-15,0-5-5 16,-7 3 7-16,1 2-2 16,-12 0-5-16,5 1 3 15,6-7 2-15,0 7-2 16,7-4-4-16,0-2 0 15,0 3-2-15,0 5 3 16,0 6-1-16,0 12 5 16,0 4-2-16,0 1-1 15,0 12-2-15,-14-1 7 16,-3 1-3-16,3 5-4 16,0 12 0-16,4 8 5 0,10 12 4 15,-7-6-9-15,7 14 0 16,0-6 8-16,0 9-9 15,0 3 4-15,0 0-3 16,0 0 3-16,0 0 3 16,0 0-6-16,0 0 0 15,0 0 9-15,0 0-7 16,0 0-2-16,0-2 0 16,0-7 0-16,-7-14 0 15,0 1 0-15,1-1-7 16,-1 3 16-16,-17 0-21 15,10-3 12-15,-10 0 0 16,3-2-6-16,-3 1 10 16,10 4-4-16,1 6 0 15,6 9 0-15,0-1-5 0,7 6 5 16,0 0-2-16,0 0-8 16,0 0 6-16,0 0 4 15,-17-5-1-15,3-8-10 16,-10 5 6-16,3-4 0 15,14 4 5-15,-17 2-6 16,4 0 6-16,-4 6 0 16,-11-5-2-16,-3 5-10 15,-6 0 5-15,-1 0 2 16,-13 0 2-16,6 5-7 16,0 1 12-16,-3-3-2 15,4 0 0-15,-1 0 3 0,1 2-7 16,-15 0 4-16,-9-5 0 15,9 4-6-15,-9-1 14 16,2 3-8-16,22-4 0 16,-1 2 3-16,8 5-14 15,13-9 11-15,10 0 0 16,-3 0-4-16,3 0-3 16,-10 0-11-16,-13 0-22 15,-15 0-51-15,-9 1-23 16,9 23-140-16,14-1-89 15,25 5-270-15</inkml:trace>
+  <inkml:trace contextRef="#ctx0" brushRef="#br0" timeOffset="-204193.73">6240 5617 242 0,'0'0'260'0,"0"0"-98"0,0 0-26 16,0 0-25-16,0 0 32 15,0 0-60-15,24-55 10 16,-24 53-14-16,0 2-32 16,0 0 7-16,0 0-40 15,0 0-1-15,0 0-13 16,0 2-14-16,0 27 14 16,0 15 0-16,-7 4 8 15,-17-3 2-15,4-5-9 16,3-5-1-16,-4-4 0 15,14-5 13-15,0-6-13 16,7-5 0-16,0-10 1 16,0-5-6-16,0 0 8 0,0 0-3 15,0 0 0 1,0 0 7-16,0 0-12 0,28 0 5 16,9 0 0-16,1 0 1 15,7 0 1-15,-17 0-2 16,2 0 0-16,1 0 6 15,-10-3-6-15,-7-9 0 16,3-5 2-16,-10 7-7 16,0-2 12-16,-7 0-7 15,0 4 0-15,0-4 14 16,0 1-8-16,0 3 2 16,0-2 2-16,0 5 19 15,-7 2-19-15,0-3 5 16,7 6 4-16,0 0-11 0,0 0-13 15,-7 0 5-15,-3 29-4 16,10 9-7 0,-7 7 12-16,7 1-1 0,0-1 0 15,0 1 9 1,0 0-22-16,0 2 11 0,0-2-114 16,0-5-111-16,-21-16-300 15</inkml:trace>
+  <inkml:trace contextRef="#ctx0" brushRef="#br0" timeOffset="-203361.73">5522 3613 61 0,'0'0'553'0,"0"0"-419"16,0 0 15-16,0 0-54 15,0 0 8-15,0 0-9 16,-35-28-47-16,35 24 1 16,0 4-32-16,0 0-6 0,0-3-15 15,7 1 5-15,38-1 0 16,-1-3 9-16,8 0-3 15,-18 4-6-15,-9-1 0 16,-5 3 10-16,-3-4-13 16,-17 4 3-16,0 0 0 15,14 0-9-15,-14 0 8 16,7 15 1-16,-7 19 0 16,0 12 10-16,0 9-12 15,0 4 2-15,0 4 0 16,-7 0-2-16,0-9 10 15,7-7-8-15,0-10 0 16,0-9-15-16,0-8-34 0,0-5-106 16,0-7-15-1,0-8-18-15,0 0-114 0</inkml:trace>
+  <inkml:trace contextRef="#ctx0" brushRef="#br0" timeOffset="-203195.73">5573 3950 426 0,'0'0'162'0,"0"0"-44"15,0 0-43-15,0 0 9 16,231-40-44-16,-142 37-38 0,-13 3-4 16,-32 0-372-16</inkml:trace>
+  <inkml:trace contextRef="#ctx0" brushRef="#br3" timeOffset="-167010.46">3142 11060 540 0,'0'0'277'0,"0"0"-115"0,0 0 10 16,0 0-21-16,0 0-75 15,0 0-17-15,-34-19-27 16,92 7-20-16,39-5 9 16,44-6-14-16,13 0 22 15,18 3-9-15,-3-6-17 16,-15 9 6-16,-26 9-5 16,-46 2-4-16,-44 6 0 15,-24 0-4-15,-14 0-36 16,0 0-61-16,0 18-61 15,-38 4-2-15,-7 2-82 16,-13-11-19-16,6 4-51 0</inkml:trace>
+  <inkml:trace contextRef="#ctx0" brushRef="#br3" timeOffset="-166781.46">3967 10986 128 0,'0'0'244'16,"0"0"-41"-16,0 0-47 16,0 0 7-16,0 0-54 15,0 0 18-15,-158-57-27 16,158 57-53-16,-7 9-45 15,1 36 15-15,-8 22 1 16,-3 15 50-16,10-2-45 16,7 4 23-16,0 0-2 15,0-3-20-15,0 2-2 16,0-18-15-16,0-2-3 16,7-14 1-16,3-9 1 15,-3-14-8-15,0-9 2 16,-7 3-79-16,0-12-73 0,0-2-163 15,13-6-231-15</inkml:trace>
+  <inkml:trace contextRef="#ctx0" brushRef="#br3" timeOffset="-166425.46">4346 11404 727 0,'0'0'202'16,"0"0"-58"-16,0 0-8 16,0 0-16-16,0 0-77 0,0 0-43 15,-83-37 0 1,83 48-20-16,0 15 20 0,0 5 0 16,7-5 4-16,31 0-4 15,13-7-1-15,1-7-1 16,-14-6 3-16,-4-6-1 15,-3 0 9-15,-7 0 3 16,-17-18 46-16,0-1 5 16,-7-5-11-16,0 2-11 15,-7 5-28-15,-31-3-5 16,-6 8-8-16,-1 5-8 16,-7 7 8-16,14 0-53 15,18 7-85-15,20 19-79 0,20-3-137 16</inkml:trace>
+  <inkml:trace contextRef="#ctx0" brushRef="#br3" timeOffset="-166075.46">5687 11017 608 0,'0'0'354'0,"0"0"-162"15,0 0-32-15,0 0-22 16,0 0-73-16,0 0-38 0,-238-117-9 16,177 170-18-16,-12 18 0 15,15 23 4-15,13-3 3 16,14 9-7-16,17-3 0 16,14 3 0-16,0-11 3 15,59-7 0-15,23-16-3 16,8-11 0-16,-1-21 3 15,-3-8 3-15,4-15-5 16,-8-5 0-16,-6-6 13 16,-11 0-13-16,-6 0 11 15,-22-11-12-15,-23 8-1 16,-14-3-37-16,0 6-90 16,0 0-114-16,0-5-339 15</inkml:trace>
+  <inkml:trace contextRef="#ctx0" brushRef="#br3" timeOffset="-164806.46">5917 11487 72 0,'0'0'380'16,"0"0"-242"-16,0 0-32 15,0 0 34-15,0 0-24 16,0 0-10-16,-69-63-22 15,62 63-45-15,7 0 4 16,-7 0-13-16,7 0-30 16,0 0-6-16,-13 0 3 15,2 17 3-15,5 5 3 16,-1 2-3-16,7-5 5 16,0-1-11-16,13-4 6 15,25-8 0-15,7-6 9 0,0 0-4 16,-14 0 32-1,-4-23 30-15,-3-3 1 0,-3 0-8 16,-21-5-21-16,0 6 0 16,0-4-6-16,-28 5-29 15,-34 10-4-15,-10 3 0 16,-3 11-10-16,2 0-9 16,22 11-75-16,20 21-84 15,24 8-104-15,7 3-217 16</inkml:trace>
+  <inkml:trace contextRef="#ctx0" brushRef="#br3" timeOffset="-162295.46">6753 11435 166 0,'0'0'256'0,"0"0"-123"15,0 0 1-15,0 0-18 16,0 0-11-16,0 0-28 16,-141 0-5-16,141 0 31 15,0 0-37-15,0 0-15 0,0-6-14 16,0 6-32-1,6 0 2-15,46-5-5 0,31 5-2 16,20 0 11-16,0 0-10 16,-3 0 5-16,-21 0 5 15,-4-11-9-15,-3 2 17 16,4-10 3-16,-17 12-8 16,-15-4 11-16,-30 4-12 15,-14 5 7-15,0 2 4 16,0-9 3-16,0-8 9 15,-14-6-36-15,-37 2 0 16,-1-1-3-16,-6 8 4 0,-4 5-1 16,3 4 0-16,15-1 0 15,6 6-2-15,17 0 2 16,14 0 0 0,7-6-10-16,0 6 10 0,0 0 0 15,0 0 0-15,14 0-12 16,24 14 12-16,20 12 1 15,1-4 2-15,3-1 2 16,-4 5-3-16,1-1-2 16,-1 0 0-16,-20 3 4 15,-7-3-7-15,-17 0 3 16,-14 4 0-16,0 0-3 16,-31 0 3-16,-28 5-9 15,-13-5-105-15,20-7-88 16,8 2-76-16,26-6-267 0</inkml:trace>
+  <inkml:trace contextRef="#ctx0" brushRef="#br3" timeOffset="-161865.46">8272 11163 710 0,'0'0'203'15,"0"0"-28"-15,0 0-31 16,0 0 14-16,0 0-73 16,0 0-53-16,0-37-12 0,0 37-20 15,-13 9-13-15,-5 25 8 16,-2 17 5-16,-1 7 4 16,21 5-4-16,0 0 4 15,14-6-6-15,24-6 2 16,13-17 0-16,-6-5-2 15,0-20 6-15,-4-4-4 16,14-5 6-16,-3 0-3 16,-1-20 23-16,-6-17-2 15,-1 0 8-15,-16-3 4 16,-11-11-15-16,-17-4 8 16,0 2-14-16,-55 0-14 15,-10 11 5-15,-7 4-6 0,-4 18 0 16,18 6-5-16,13 14 2 15,0 0-9-15,14 3-33 16,17 34-60-16,14 3-60 16,0 0-138-16,21-6-144 15</inkml:trace>
+  <inkml:trace contextRef="#ctx0" brushRef="#br3" timeOffset="-161087.46">9524 10620 57 0,'0'0'629'0,"0"0"-442"16,0-189-41-16,0 138-1 15,0 11-4-15,0 11-15 16,0 13-38-16,-7 6-22 16,7 8-33-16,-7 2-2 15,7 0-31-15,-7 12-10 16,-17 53 7-16,-10 32 3 16,-11 37 0-16,0 21 8 15,8 11-2-15,23 8 3 16,14-8-5-16,0 0-4 15,27-15 9-15,35-28-7 0,17-17 0 16,4-29 0-16,-8-31-1 16,-33-9-2-16,-4-19-5 15,-14-4-52-15,-4-9-79 16,11-5-128-16,7-19-155 16</inkml:trace>
+  <inkml:trace contextRef="#ctx0" brushRef="#br3" timeOffset="-159492.46">9902 11309 554 0,'0'0'154'0,"0"0"32"0,0 0-36 15,0 0-45-15,0 0-28 16,0 0-9-16,7-146-36 16,24 126 5-16,0 3-18 15,-11 9-16-15,11 2 8 16,-10 6-11-16,-4 0-2 15,11 0-3-15,-4 26-3 16,-10 11 8-16,-1 0 0 16,-6 9 2-16,-7-3-6 15,0 2 4-15,0-13 0 16,0-6 3-16,0-6-1 16,0-15-2-16,0-5 0 15,0 0 3-15,0 0 7 16,17 0-2-16,-10-14 13 15,7-23 39-15,10-9-48 0,-3-3-12 16,17-2 1-16,-7 0 5 16,-4 5-3-16,4 17-3 15,-17 15 0-15,-7 8-4 16,-1 6 2-16,19 0-1 16,5 6-5-16,-2 20 3 15,3 5-2-15,-4 6 5 16,4 3 2-16,-17-2-2 15,3-6-8-15,-10-7-5 16,0-5-43-16,0-12-50 0,-7 1-23 16,0 0-65-1,0-9-94-15</inkml:trace>
+  <inkml:trace contextRef="#ctx0" brushRef="#br3" timeOffset="-159197.46">10793 10494 689 0,'0'0'190'0,"0"0"-22"16,0 0-59-16,0 0-10 15,0 0-67-15,0 0-29 0,65 17 27 16,11 47 2-16,-1 14-2 15,-3 18-4-15,4 7-4 16,-17 5 8-16,-15-2-27 16,-16 3 1-16,-18-12 1 15,-10 3 4-15,-10-11-10 16,-69-4 1-16,-24-4-111 16,-4-18-124-16,11-12-232 15</inkml:trace>
+  <inkml:trace contextRef="#ctx0" brushRef="#br3" timeOffset="-153912.46">12608 9983 164 0,'0'0'339'15,"0"0"-250"-15,0 0 26 16,0 0 13-16,0 0-26 16,0 0 3-16,38-51-22 15,-38 48-13-15,0 0 4 16,0-3-36-16,-45 3 5 15,-44 0-25-15,-38-3-10 16,-21 4 9-16,0-7-15 0,0 0 0 16,0-3 11-16,-7 5-6 15,-16 1-4-15,-36 6-3 16,-44 0 9-16,-31 0-11 16,-37 0 2-16,-29 11 0 15,-23 3-7-15,-38 0 14 16,-14 1-7-16,-14-3 0 15,14 5 4-15,38-8-4 16,14-1 0-16,48 0 0 16,10-8-7-16,0 2 14 15,10 2-7-15,8 8 0 16,6 2 4-16,7 6-10 0,7 3 6 16,24-1 0-1,13-2-3-15,29-8 10 0,33-1-7 16,28-11 0-1,14 0 5-15,7 0-13 0,24 0 8 16,0 0 0-16,0 0-4 16,-11 0 12-16,-3 0-8 15,-17 0 0-15,-7 14 2 16,-7 4-5-16,7-7 3 16,14 6 0-16,10-5-2 15,14-2 11-15,28 5-9 16,2-4 0-16,29-4 0 15,-1 4-7-15,7-2 7 16,7-4 0-16,4 4-2 16,-4 8 7-16,-14 3-5 0,0 6 0 15,1 11 0 1,-1-3-10-16,11 15 10 0,-4 2 0 16,14 12-4-16,10 12 11 15,7 16-7-15,7 4 0 16,0 12 1-16,0 9-5 15,0 0 7-15,7 5-3 16,7-1 3-16,-7-6 5 16,3-5-3-16,4-6-1 15,-8-3-1-15,-6-9 18 16,0 4-19-16,0-7 6 16,0 1 2-16,0-12-6 0,7-8 2 15,0-11-6 1,10-13 4-16,-3-8-5 15,7-11 2-15,3-1-1 0,7-11 0 16,10 4 6-16,28 2-4 16,20-9-2-16,21 3 0 15,24-2 4-15,7 2 1 16,7-2-5-16,0 8 3 16,7-1 2-16,10 4-2 15,10-2-3-15,21-2 0 16,10 1-3-16,25-9 6 15,34-3-3-15,47-3 1 16,15-5 5-16,27 0-5 0,-3 8-1 16,-28-3 0-1,-3 7-5-15,-17-9 6 0,3 0-1 16,-11-3 0-16,1 0 2 16,17 0-2-16,-4 0 0 15,18-6 1-15,0 0-2 16,-8-5 2-16,-23 3-2 15,-21-5 0-15,-17 8 1 16,-28-3 0-16,-13 3 0 16,-11 5 0-16,-13 0 1 15,6 0-1-15,-6 0 2 16,17 0-2-16,3 0 1 0,3 0-1 16,4 0 0-1,-27 0-2-15,0 0 1 0,-28 0 0 16,-4 0 1-16,-13-7-2 15,0 7 7-15,3-11-7 16,11 5 2-16,-1-2 0 16,-2-4-2-16,-19 3 6 15,-23-8-4-15,-13 3 0 16,-43 3 0-16,-9-9-4 16,-31 2 10-16,-8-2-6 15,5-17 19-15,-18-3 9 16,0-9-8-16,0-10-8 15,0-10 2-15,6-14-8 16,-6-8-4-16,0-4-2 16,7 1 7-16,-7-1-1 0,0 4 0 15,0 2 0-15,0-5-5 16,-7 3 7-16,1 2-2 16,-12 0-5-16,5 1 3 15,6-7 2-15,0 7-2 16,7-4-4-16,0-2 0 15,0 3-2-15,0 5 3 16,0 6-1-16,0 12 5 16,0 4-2-16,0 1-1 15,0 12-2-15,-14-1 7 16,-3 1-3-16,3 5-4 16,0 12 0-16,4 8 5 0,10 12 4 15,-7-6-9-15,7 14 0 16,0-6 8-16,0 9-9 15,0 3 4-15,0 0-3 16,0 0 3-16,0 0 3 16,0 0-6-16,0 0 0 15,0 0 9-15,0 0-7 16,0 0-2-16,0-2 0 16,0-7 0-16,-7-14 0 15,0 1 0-15,1-1-7 16,-1 3 16-16,-17 0-21 15,10-3 12-15,-10 0 0 16,3-2-6-16,-3 1 10 16,10 4-4-16,1 6 0 15,6 9 0-15,0-1-5 0,7 6 5 16,0 0-2-16,0 0-8 16,0 0 6-16,0 0 4 15,-17-5-1-15,3-8-10 16,-10 5 6-16,3-4 0 15,14 4 5-15,-17 2-6 16,4 0 6-16,-4 6 0 16,-11-5-2-16,-3 5-10 15,-6 0 5-15,-1 0 2 16,-13 0 2-16,6 5-7 16,0 1 12-16,-3-3-2 15,4 0 0-15,-1 0 3 0,1 2-7 16,-15 0 4-16,-9-5 0 15,9 4-6-15,-9-1 14 16,2 3-8-16,22-4 0 16,-1 2 3-16,8 5-14 15,13-9 11-15,10 0 0 16,-3 0-4-16,3 0-3 16,-10 0-11-16,-13 0-22 15,-15 0-51-15,-9 1-23 16,9 23-140-16,14-1-89 15,25 5-270-15</inkml:trace>
 </inkml:ink>
 </file>
 
@@ -3207,12 +3207,12 @@
   <inkml:trace contextRef="#ctx0" brushRef="#br0">1142 1007 638 0,'0'0'107'0,"0"0"8"0,0 0-18 15,0 0-6 1,0 0 24-16,0 0-38 0,0 0-29 15,0 0-1-15,-21-36-29 16,21 36 21-16,0 0-8 16,0-2-21-16,0 2 13 15,0 0-23-15,0 0 0 16,0 0 2-16,0 0 4 16,0 0-7-16,14 17 1 15,17 25 0-15,14 16-2 16,-11 8 2-16,-3 3 0 15,0-7-3-15,-3-5 13 16,2-8-7-16,8-15-3 16,7-11 5-16,0-15 0 0,-4-8-1 15,21 0-4-15,17-37 32 16,34-40-5-16,35-28 9 16,31-21-15-16,-10-12-20 15,2-10 14-15,-23-4-15 16,-7-5 0-16,-7 0-4 15,-10 14 17-15,-28 34-15 16,-27 40 2-16,-41 38 0 16,-11 26-2-16,-17 5 2 15,0 0-5-15,0 25 0 16,0 33-34-16,7 27 12 16,-7 20-93-16,-31 25-151 0,-65 10-81 15</inkml:trace>
   <inkml:trace contextRef="#ctx0" brushRef="#br0" timeOffset="281">781 2675 963 0,'0'0'84'15,"0"0"-45"-15,0 0 12 16,368-226 41-16,-100 103-2 0,66-17-50 16,37-17-16-1,35-14-11-15,3-6-11 0,-45 19 5 16,-61 32-7-16,-90 49 0 16,-93 40-2-16,-75 29 2 15,-45 8-65-15,-127 62-179 16,-73 47 31-16,-82 49-168 15</inkml:trace>
   <inkml:trace contextRef="#ctx0" brushRef="#br0" timeOffset="512">877 3236 704 0,'0'0'258'15,"0"0"-214"-15,0 0-32 0,317-158 66 16,-49 36 41-16,86-38-44 15,55-18-38-15,35-11 2 16,-4 7-27-16,-55 21-1 16,-89 42-7-16,-90 36 1 15,-103 36-1-15,-51 27-4 16,-35 20-6-16,-17 0-14 16,0 0-129-16,0 15-80 15,-24 16 53-15,-28 10-226 16</inkml:trace>
-  <inkml:trace contextRef="#ctx0" brushRef="#br0" timeOffset="1.12204E6">1782 4331 645 0,'0'0'148'0,"0"0"-51"16,0 0-5-16,0 0 14 15,0 0-32-15,0 0-20 16,-25-160-11-16,39 142-35 16,17 0 14-16,-7 8-22 15,4 4 1-15,-4 6-4 0,3 0 2 16,-3 0-2-16,-3 16 2 15,-4 14-1-15,-3-2-5 16,-7 1 7-16,-7-3 0 16,0-1-5-16,0-5 9 15,0-3-4-15,0-8 0 16,0-9 0-16,0 0 0 16,0 0 1-16,0 0 5 15,7 0 16-15,6-6-16 16,5-19 8-16,2-9-14 15,18 2-1-15,0-5 0 16,0 5 1-16,-4 12 0 16,-10 6-4-16,-17 12 1 15,7 2 0-15,-7 0-3 0,10 16-4 16,4 16 4-16,-15 2 5 16,5 3 1-16,-4 0-11 15,-7-5-21-15,0 2-41 16,0-5-43-16,0-3-60 15,0-6-88-15</inkml:trace>
-  <inkml:trace contextRef="#ctx0" brushRef="#br0" timeOffset="1.12224E6">2514 4225 381 0,'0'0'155'16,"0"0"-46"-16,0 0-5 15,0 0-11-15,0 0-44 16,0 0-44-16,65-15 1 16,-10 15-3-16,-3 0-3 15,13 0 4-15,-6 0-8 16,2 0-68-16,-9 0-122 16,-7 0-82-16</inkml:trace>
-  <inkml:trace contextRef="#ctx0" brushRef="#br0" timeOffset="1.12254E6">3040 4135 379 0,'0'0'124'0,"0"0"-33"0,0 0-15 16,0 0-8-16,0 0 5 16,0 0-38-16,103-76-10 15,-96 76-19-15,3 0-3 16,4 0-6-16,-7 3-1 15,7 17 4-15,-4 6-4 16,-3-1 7-16,-7 1-3 16,0 6 11-16,0-7-5 15,0 1 2-15,0-9-8 16,0-3 0-16,0 1 5 16,21-4-5-16,23-11-5 0,22 0-45 15,9 0-8-15,15 0-7 16,6-26-57-16,-14 1-85 15,-9-1-138-15</inkml:trace>
-  <inkml:trace contextRef="#ctx0" brushRef="#br0" timeOffset="1.12294E6">3841 3644 128 0,'0'0'110'0,"-223"-128"12"16,68 71-35-16,-31 9-14 15,-13 19 11-15,-25 23-47 16,-13 6 24-16,-14 11-5 16,0 47-1-16,7 39-2 15,34 34-16-15,31 35-5 0,49 20 6 16,33 11-22-16,53 0 3 16,44 11-17-16,0 5 4 15,96-11-8-15,45-16 3 16,58-46-1-16,59-43 1 15,55-48 4-15,21-49 2 16,-1-25-5-16,-13-62 27 16,-31-29 21-16,-38-30 9 15,-38-40 0-15,-55-23 28 16,-68-14-20-16,-84-6-23 16,-37 7-17-16,-137 22-27 15,-86 30 0-15,-87 42-3 0,-68 57-19 16,-35 48 11-16,1 23-53 15,41 68-15-15,47 33-18 16,67 30-34-16,57 14-36 16,52-5-160-16</inkml:trace>
-  <inkml:trace contextRef="#ctx0" brushRef="#br0" timeOffset="1.12325E6">0 6240 609 0,'0'0'100'16,"0"0"-38"-16,0 0-29 15,0 0-12-15,365-63 75 16,20-31-27-16,89-20-44 16,84-1 4-16,12 18-6 15,-16 23-20-15,-80 34-1 16,-123 20-2-16,-145 20-11 16,-147 0-112-16,-118 45-164 0,-164 24-37 15</inkml:trace>
-  <inkml:trace contextRef="#ctx0" brushRef="#br0" timeOffset="1.12339E6">1121 6509 545 0,'0'0'167'15,"0"0"-90"-15,0 0-65 16,0 0 20-16,444-40 72 16,-97-29-83-16,62-14-15 15,21 6-6-15,-52 14-181 16</inkml:trace>
+  <inkml:trace contextRef="#ctx0" brushRef="#br0" timeOffset="-166450.189">1782 4331 645 0,'0'0'148'0,"0"0"-51"16,0 0-5-16,0 0 14 15,0 0-32-15,0 0-20 16,-25-160-11-16,39 142-35 16,17 0 14-16,-7 8-22 15,4 4 1-15,-4 6-4 0,3 0 2 16,-3 0-2-16,-3 16 2 15,-4 14-1-15,-3-2-5 16,-7 1 7-16,-7-3 0 16,0-1-5-16,0-5 9 15,0-3-4-15,0-8 0 16,0-9 0-16,0 0 0 16,0 0 1-16,0 0 5 15,7 0 16-15,6-6-16 16,5-19 8-16,2-9-14 15,18 2-1-15,0-5 0 16,0 5 1-16,-4 12 0 16,-10 6-4-16,-17 12 1 15,7 2 0-15,-7 0-3 0,10 16-4 16,4 16 4-16,-15 2 5 16,5 3 1-16,-4 0-11 15,-7-5-21-15,0 2-41 16,0-5-43-16,0-3-60 15,0-6-88-15</inkml:trace>
+  <inkml:trace contextRef="#ctx0" brushRef="#br0" timeOffset="-166250.189">2514 4225 381 0,'0'0'155'16,"0"0"-46"-16,0 0-5 15,0 0-11-15,0 0-44 16,0 0-44-16,65-15 1 16,-10 15-3-16,-3 0-3 15,13 0 4-15,-6 0-8 16,2 0-68-16,-9 0-122 16,-7 0-82-16</inkml:trace>
+  <inkml:trace contextRef="#ctx0" brushRef="#br0" timeOffset="-165950.189">3040 4135 379 0,'0'0'124'0,"0"0"-33"0,0 0-15 16,0 0-8-16,0 0 5 16,0 0-38-16,103-76-10 15,-96 76-19-15,3 0-3 16,4 0-6-16,-7 3-1 15,7 17 4-15,-4 6-4 16,-3-1 7-16,-7 1-3 16,0 6 11-16,0-7-5 15,0 1 2-15,0-9-8 16,0-3 0-16,0 1 5 16,21-4-5-16,23-11-5 0,22 0-45 15,9 0-8-15,15 0-7 16,6-26-57-16,-14 1-85 15,-9-1-138-15</inkml:trace>
+  <inkml:trace contextRef="#ctx0" brushRef="#br0" timeOffset="-165550.189">3841 3644 128 0,'0'0'110'0,"-223"-128"12"16,68 71-35-16,-31 9-14 15,-13 19 11-15,-25 23-47 16,-13 6 24-16,-14 11-5 16,0 47-1-16,7 39-2 15,34 34-16-15,31 35-5 0,49 20 6 16,33 11-22-16,53 0 3 16,44 11-17-16,0 5 4 15,96-11-8-15,45-16 3 16,58-46-1-16,59-43 1 15,55-48 4-15,21-49 2 16,-1-25-5-16,-13-62 27 16,-31-29 21-16,-38-30 9 15,-38-40 0-15,-55-23 28 16,-68-14-20-16,-84-6-23 16,-37 7-17-16,-137 22-27 15,-86 30 0-15,-87 42-3 0,-68 57-19 16,-35 48 11-16,1 23-53 15,41 68-15-15,47 33-18 16,67 30-34-16,57 14-36 16,52-5-160-16</inkml:trace>
+  <inkml:trace contextRef="#ctx0" brushRef="#br0" timeOffset="-165240.189">0 6240 609 0,'0'0'100'16,"0"0"-38"-16,0 0-29 15,0 0-12-15,365-63 75 16,20-31-27-16,89-20-44 16,84-1 4-16,12 18-6 15,-16 23-20-15,-80 34-1 16,-123 20-2-16,-145 20-11 16,-147 0-112-16,-118 45-164 0,-164 24-37 15</inkml:trace>
+  <inkml:trace contextRef="#ctx0" brushRef="#br0" timeOffset="-165100.189">1121 6509 545 0,'0'0'167'15,"0"0"-90"-15,0 0-65 16,0 0 20-16,444-40 72 16,-97-29-83-16,62-14-15 15,21 6-6-15,-52 14-181 16</inkml:trace>
 </inkml:ink>
 </file>
 
@@ -3259,12 +3259,12 @@
   <inkml:trace contextRef="#ctx0" brushRef="#br0" timeOffset="-30384">618 6293 597 0,'0'0'140'0,"0"0"-51"15,0 0 53-15,-268-29-31 0,202 52-35 16,-2 32-27-16,9 28-28 16,1 19 7-16,6 15-8 15,21 9-14-15,17 12 27 16,14-1-33-16,7 9 0 15,52 11 10-15,16 3-7 16,29-6-3-16,6-20 0 16,10-41 6-16,-3-45-10 15,-4-39 4-15,-3-9 0 16,11-53 13-16,2-29-11 16,25-21 24-16,0-14 22 15,-21-3-19-15,-37-6 14 0,-46-3-18 16,-44-8 1-16,-31-6 0 15,-65 9-18-15,-52 10-5 16,-6 21-3-16,-18 30-1 16,24 18-9-16,14 24 10 15,31 16-9-15,30 10 6 16,36 5-53-16,13 0-42 16,24 8-63-16,0 20-155 15,44-1-17-15</inkml:trace>
   <inkml:trace contextRef="#ctx0" brushRef="#br0" timeOffset="-30032">1945 5029 822 0,'0'0'131'16,"0"0"-9"-16,0 0 44 16,0 0-50-16,0 0-72 15,0 0-44-15,-31 23 21 16,107 57 10-16,20 14 5 16,7 4-36-16,14 5 51 15,10 3-34-15,-10-1-14 16,-10-10 8-16,-18-10 1 0,-10-13-11 15,-20-12-1-15,-15-15 8 16,-13-7-9-16,0-4 1 16,-10-5 0-16,-7-1-4 15,3 3-42-15,-10 4-71 16,0-1-140-16,0-5-269 16</inkml:trace>
   <inkml:trace contextRef="#ctx0" brushRef="#br0" timeOffset="-16134">3300 2273 78 0,'0'0'303'16,"0"0"-163"-16,0 0-25 15,0 0-11-15,0 0 28 16,0 0-72-16,31-120-22 16,-31 111 8-16,-17 1-36 0,3 2 9 15,-14 4-12-15,-3 2-2 16,0 0-9-16,-13 2 4 16,9 21 0-16,-3 14-6 15,-6 6 11-15,20 0-5 16,3 3 0-16,21-9 5 15,0-11-10-15,0-9 5 16,7-9-22-16,38-3 12 16,-1-5 6-16,8 0 4 15,-7 0 2-15,-1-13 9 16,-6-10-10-16,-17 3-1 16,-7 3 0-16,-14 2 10 15,0 1-6-15,0 5 9 16,0 7 9-16,0 2-21 0,0 0 17 15,-7 2-18-15,0 33 0 16,-14 16 18-16,14 0-15 16,7 2 20-16,0-5 3 15,0-8-20-15,0-3 7 16,14-3-13-16,14-2 2 16,-4 2-7-16,-11 1-83 15,-13-3-158-15</inkml:trace>
-  <inkml:trace contextRef="#ctx0" brushRef="#br0" timeOffset="231621">2928 3065 356 0,'0'0'175'15,"0"0"-34"-15,0 0 16 16,0 0-71-16,0 0 29 16,0 0 13-16,18-120-64 15,-18 114 24-15,0 4-19 16,0 2-19-16,0 0 6 16,0 0-41-16,0 0 4 15,0 0-19-15,0 0 0 16,0 34-7-16,-52 23 14 15,-10 23-2-15,-10 9 15 16,14 2-13-16,3 4-2 0,13-1-5 16,-2 3 10-16,-1-2-9 15,14-2-1-15,0-4 0 16,3-9-3-16,11-8 6 16,10-9-3-16,-6-12 0 15,13-8 8-15,-7-11-10 16,7-12 2-16,-7-9 0 15,7-5-7-15,0 0 11 16,0-4-4-16,0-2 0 16,0 3 10-16,0-3-5 15,0 0-5-15,0 0 0 16,0 0 1-16,0 2-1 16,0-2-22-16,0 0-47 15,-7 0-120-15,7 0-254 0</inkml:trace>
-  <inkml:trace contextRef="#ctx0" brushRef="#br0" timeOffset="232212">2248 4626 714 0,'0'0'132'16,"0"0"-21"-16,0 0 11 0,-45-186-29 15,17 137-10-15,-2 10-5 16,-8 7-21-16,0 7 1 16,10 7-22-16,-9 6 18 15,-1 7-31-15,-7 2-23 16,0 3 10-16,1 0-2 15,-1 3-8-15,-14 32 0 16,1 4 5-16,-7 16-14 16,-4 8 9-16,31 5 0 15,11 10-6-15,20 1 12 0,7 4-6 16,0-2 0 0,34-8 7-16,42 0-18 0,6-13 11 15,21-16 0-15,7-12-3 16,0-18 6-16,4-14-3 15,-4 0 0-15,-7-25 5 16,17-27 4-16,-16-7-8 16,-15-16 10-16,-17-2 31 15,-17-6-27-15,-34-2 27 16,-21-4-15-16,0 3-23 16,-52 3 31-16,-44 12-32 15,-14 7-1-15,-17 16 6 16,6 17 0-16,18 14-8 15,7 11 0-15,13 6-3 16,18 0-11-16,0 14 10 16,20 17-49-16,7 9-4 0,14 2-78 15,24-1-14-15,0 0-105 16,17-10-165-16</inkml:trace>
-  <inkml:trace contextRef="#ctx0" brushRef="#br0" timeOffset="236038">2093 4506 419 0,'0'0'190'0,"0"0"-43"16,0 0-25 0,0 0 4-16,0 0-17 0,0 0-5 15,0 0-44-15,0-68 13 16,0 68-5-16,0 0-37 15,0 0 8-15,0 0-36 16,0 0 7-16,-17 14-20 16,-18 17 19-16,-9 12-9 15,-8 0 1-15,14 0 12 16,25-6-13-16,2 3 0 16,11-6 0-16,0 1-12 15,11-10 17-15,9-2-5 16,4-8 0-16,4-7 8 15,10-8-8-15,-8 0 0 16,-2 0 0-16,-4 0 13 0,-10-6-6 16,0-5-6-16,-14 0 24 15,0-4-11-15,0 1 12 16,0 0-23-16,-21 2 0 16,-31 4-6-16,-10 0 1 15,4 8 2-15,13 0-1 16,1 0-20-16,16 0-14 15,11 28-97-15,17 0-134 16,45-5-225-16</inkml:trace>
-  <inkml:trace contextRef="#ctx0" brushRef="#br0" timeOffset="238264">350 6973 353 0,'0'0'89'0,"0"0"-30"0,0 0 7 16,0 0 36-16,0 0-27 15,0 0-28-15,24 0 9 16,3-3-12-16,11-11-9 15,-7-6 20-15,-3 4-35 16,9-8-1-16,8 4-11 16,-14 3-3-16,-4 3 14 15,-9 8-14-15,-11 3 7 16,-7 3 7-16,0 0-17 16,0 0 19-16,0 0-21 0,0 0-16 15,0 15 14-15,0 19-4 16,0 11 6-16,0 1 1 15,0-5 12-15,0-5-13 16,0 1 0-16,6-5 2 16,-6-3-3-16,7-7 1 15,0-4 0-15,0-7 0 16,-7-5 10-16,0-4-13 16,0-2 3-16,0 0 0 15,0 4-8-15,-7-2-13 16,-31 7 21-16,-3-4 10 15,-4-1-1-15,14-1-8 16,25-3-1-16,6 0 4 0,0 0 1 16,0 0-5-16,0 0 0 15,0 0-2-15,0 0-9 16,20 0 11-16,42 0-2 16,34-7 5-16,28-21-6 15,17-7-4-15,0 10-77 16,-38 2-127-16,-13 6-369 15</inkml:trace>
-  <inkml:trace contextRef="#ctx0" brushRef="#br0" timeOffset="238962">3850 6124 362 0,'0'0'198'0,"0"0"-107"15,0 0 58-15,0 0-30 16,0 0-18-16,-261-129 1 16,188 115-51-16,-9 3 14 15,-14 8-2-15,-1 3-32 16,8 0 17-16,0 14-28 15,-1 26-10-15,18 17 4 16,-4 20-7-16,18 21-7 16,6 16 0-16,28 21 10 15,24 11-14-15,0 5 4 16,62 6 0-16,17-5-8 16,28-12 11-16,17-23-3 0,17-20 0 15,13-25-8-15,11-26 6 16,4-23 2-16,-11-23 0 15,-10 0 9-15,0-26-6 16,-21-24-3-16,-3-15 8 16,-4-23-4-16,-3-21 26 15,-14-20-7-15,-14-11 20 16,-37-3-1-16,-28 3-37 16,-24 2 15-16,-89 13-12 15,-52 10 2-15,-45 16-19 16,-44 16 9-16,-14 19 0 15,-7 18-11-15,41 18 11 0,48 17 0 16,66 11 0-16,37 0-63 16,35 37-21-16,18 32-50 15,6 23-55-15,0 5-104 16,37-3-367-16</inkml:trace>
-  <inkml:trace contextRef="#ctx0" brushRef="#br0" timeOffset="239310">3472 6450 593 0,'0'0'146'0,"0"0"-42"15,0 0-22-15,0 0-1 16,0 0-39-16,0 0-35 15,168-54-7-15,-99 68 0 16,-17 11 6-16,-15 10-11 16,-23 11 5-16,-14 5 0 15,0 4 25-15,-65 5-10 16,-11-9 14-16,-6-7 9 16,16-17-25-16,35-7 21 15,24-5-34-15,7-1 0 16,14 4-6-16,62-10 12 0,41-8-6 15,24 0 0 1,10-3-62-16,-34-17-41 0,-35 3-88 16,-37-1-207-16</inkml:trace>
+  <inkml:trace contextRef="#ctx0" brushRef="#br0" timeOffset="-197875.73">2928 3065 356 0,'0'0'175'15,"0"0"-34"-15,0 0 16 16,0 0-71-16,0 0 29 16,0 0 13-16,18-120-64 15,-18 114 24-15,0 4-19 16,0 2-19-16,0 0 6 16,0 0-41-16,0 0 4 15,0 0-19-15,0 0 0 16,0 34-7-16,-52 23 14 15,-10 23-2-15,-10 9 15 16,14 2-13-16,3 4-2 0,13-1-5 16,-2 3 10-16,-1-2-9 15,14-2-1-15,0-4 0 16,3-9-3-16,11-8 6 16,10-9-3-16,-6-12 0 15,13-8 8-15,-7-11-10 16,7-12 2-16,-7-9 0 15,7-5-7-15,0 0 11 16,0-4-4-16,0-2 0 16,0 3 10-16,0-3-5 15,0 0-5-15,0 0 0 16,0 0 1-16,0 2-1 16,0-2-22-16,0 0-47 15,-7 0-120-15,7 0-254 0</inkml:trace>
+  <inkml:trace contextRef="#ctx0" brushRef="#br0" timeOffset="-197284.73">2248 4626 714 0,'0'0'132'16,"0"0"-21"-16,0 0 11 0,-45-186-29 15,17 137-10-15,-2 10-5 16,-8 7-21-16,0 7 1 16,10 7-22-16,-9 6 18 15,-1 7-31-15,-7 2-23 16,0 3 10-16,1 0-2 15,-1 3-8-15,-14 32 0 16,1 4 5-16,-7 16-14 16,-4 8 9-16,31 5 0 15,11 10-6-15,20 1 12 0,7 4-6 16,0-2 0 0,34-8 7-16,42 0-18 0,6-13 11 15,21-16 0-15,7-12-3 16,0-18 6-16,4-14-3 15,-4 0 0-15,-7-25 5 16,17-27 4-16,-16-7-8 16,-15-16 10-16,-17-2 31 15,-17-6-27-15,-34-2 27 16,-21-4-15-16,0 3-23 16,-52 3 31-16,-44 12-32 15,-14 7-1-15,-17 16 6 16,6 17 0-16,18 14-8 15,7 11 0-15,13 6-3 16,18 0-11-16,0 14 10 16,20 17-49-16,7 9-4 0,14 2-78 15,24-1-14-15,0 0-105 16,17-10-165-16</inkml:trace>
+  <inkml:trace contextRef="#ctx0" brushRef="#br0" timeOffset="-193458.73">2093 4506 419 0,'0'0'190'0,"0"0"-43"16,0 0-25 0,0 0 4-16,0 0-17 0,0 0-5 15,0 0-44-15,0-68 13 16,0 68-5-16,0 0-37 15,0 0 8-15,0 0-36 16,0 0 7-16,-17 14-20 16,-18 17 19-16,-9 12-9 15,-8 0 1-15,14 0 12 16,25-6-13-16,2 3 0 16,11-6 0-16,0 1-12 15,11-10 17-15,9-2-5 16,4-8 0-16,4-7 8 15,10-8-8-15,-8 0 0 16,-2 0 0-16,-4 0 13 0,-10-6-6 16,0-5-6-16,-14 0 24 15,0-4-11-15,0 1 12 16,0 0-23-16,-21 2 0 16,-31 4-6-16,-10 0 1 15,4 8 2-15,13 0-1 16,1 0-20-16,16 0-14 15,11 28-97-15,17 0-134 16,45-5-225-16</inkml:trace>
+  <inkml:trace contextRef="#ctx0" brushRef="#br0" timeOffset="-191232.73">350 6973 353 0,'0'0'89'0,"0"0"-30"0,0 0 7 16,0 0 36-16,0 0-27 15,0 0-28-15,24 0 9 16,3-3-12-16,11-11-9 15,-7-6 20-15,-3 4-35 16,9-8-1-16,8 4-11 16,-14 3-3-16,-4 3 14 15,-9 8-14-15,-11 3 7 16,-7 3 7-16,0 0-17 16,0 0 19-16,0 0-21 0,0 0-16 15,0 15 14-15,0 19-4 16,0 11 6-16,0 1 1 15,0-5 12-15,0-5-13 16,0 1 0-16,6-5 2 16,-6-3-3-16,7-7 1 15,0-4 0-15,0-7 0 16,-7-5 10-16,0-4-13 16,0-2 3-16,0 0 0 15,0 4-8-15,-7-2-13 16,-31 7 21-16,-3-4 10 15,-4-1-1-15,14-1-8 16,25-3-1-16,6 0 4 0,0 0 1 16,0 0-5-16,0 0 0 15,0 0-2-15,0 0-9 16,20 0 11-16,42 0-2 16,34-7 5-16,28-21-6 15,17-7-4-15,0 10-77 16,-38 2-127-16,-13 6-369 15</inkml:trace>
+  <inkml:trace contextRef="#ctx0" brushRef="#br0" timeOffset="-190534.73">3850 6124 362 0,'0'0'198'0,"0"0"-107"15,0 0 58-15,0 0-30 16,0 0-18-16,-261-129 1 16,188 115-51-16,-9 3 14 15,-14 8-2-15,-1 3-32 16,8 0 17-16,0 14-28 15,-1 26-10-15,18 17 4 16,-4 20-7-16,18 21-7 16,6 16 0-16,28 21 10 15,24 11-14-15,0 5 4 16,62 6 0-16,17-5-8 16,28-12 11-16,17-23-3 0,17-20 0 15,13-25-8-15,11-26 6 16,4-23 2-16,-11-23 0 15,-10 0 9-15,0-26-6 16,-21-24-3-16,-3-15 8 16,-4-23-4-16,-3-21 26 15,-14-20-7-15,-14-11 20 16,-37-3-1-16,-28 3-37 16,-24 2 15-16,-89 13-12 15,-52 10 2-15,-45 16-19 16,-44 16 9-16,-14 19 0 15,-7 18-11-15,41 18 11 0,48 17 0 16,66 11 0-16,37 0-63 16,35 37-21-16,18 32-50 15,6 23-55-15,0 5-104 16,37-3-367-16</inkml:trace>
+  <inkml:trace contextRef="#ctx0" brushRef="#br0" timeOffset="-190186.73">3472 6450 593 0,'0'0'146'0,"0"0"-42"15,0 0-22-15,0 0-1 16,0 0-39-16,0 0-35 15,168-54-7-15,-99 68 0 16,-17 11 6-16,-15 10-11 16,-23 11 5-16,-14 5 0 15,0 4 25-15,-65 5-10 16,-11-9 14-16,-6-7 9 16,16-17-25-16,35-7 21 15,24-5-34-15,7-1 0 16,14 4-6-16,62-10 12 0,41-8-6 15,24 0 0 1,10-3-62-16,-34-17-41 0,-35 3-88 16,-37-1-207-16</inkml:trace>
 </inkml:ink>
 </file>
 
@@ -4251,7 +4251,7 @@
           <a:p>
             <a:fld id="{BC859255-6DFA-43EF-88B6-2E6996FDF2B1}" type="datetimeFigureOut">
               <a:rPr lang="en-IN" smtClean="0"/>
-              <a:t>08-06-2022</a:t>
+              <a:t>09-06-2022</a:t>
             </a:fld>
             <a:endParaRPr lang="en-IN"/>
           </a:p>
@@ -5134,7 +5134,7 @@
           <a:p>
             <a:fld id="{4C158068-7E1F-4B26-8461-C73B0177DC30}" type="datetimeFigureOut">
               <a:rPr lang="en-IN" smtClean="0"/>
-              <a:t>08-06-2022</a:t>
+              <a:t>09-06-2022</a:t>
             </a:fld>
             <a:endParaRPr lang="en-IN"/>
           </a:p>
@@ -5391,7 +5391,7 @@
           <a:p>
             <a:fld id="{4C158068-7E1F-4B26-8461-C73B0177DC30}" type="datetimeFigureOut">
               <a:rPr lang="en-IN" smtClean="0"/>
-              <a:t>08-06-2022</a:t>
+              <a:t>09-06-2022</a:t>
             </a:fld>
             <a:endParaRPr lang="en-IN"/>
           </a:p>
@@ -6110,7 +6110,7 @@
           <a:p>
             <a:fld id="{4C158068-7E1F-4B26-8461-C73B0177DC30}" type="datetimeFigureOut">
               <a:rPr lang="en-IN" smtClean="0"/>
-              <a:t>08-06-2022</a:t>
+              <a:t>09-06-2022</a:t>
             </a:fld>
             <a:endParaRPr lang="en-IN"/>
           </a:p>
@@ -6284,7 +6284,7 @@
           <a:p>
             <a:fld id="{4C158068-7E1F-4B26-8461-C73B0177DC30}" type="datetimeFigureOut">
               <a:rPr lang="en-IN" smtClean="0"/>
-              <a:t>08-06-2022</a:t>
+              <a:t>09-06-2022</a:t>
             </a:fld>
             <a:endParaRPr lang="en-IN"/>
           </a:p>
@@ -6409,7 +6409,7 @@
           <a:p>
             <a:fld id="{B9760F35-3678-4552-9658-E80C85BE3232}" type="datetimeFigureOut">
               <a:rPr lang="en-IN" smtClean="0"/>
-              <a:t>08-06-2022</a:t>
+              <a:t>09-06-2022</a:t>
             </a:fld>
             <a:endParaRPr lang="en-IN"/>
           </a:p>
@@ -6704,7 +6704,7 @@
           <a:p>
             <a:fld id="{4C158068-7E1F-4B26-8461-C73B0177DC30}" type="datetimeFigureOut">
               <a:rPr lang="en-IN" smtClean="0"/>
-              <a:t>08-06-2022</a:t>
+              <a:t>09-06-2022</a:t>
             </a:fld>
             <a:endParaRPr lang="en-IN"/>
           </a:p>
@@ -7061,7 +7061,7 @@
           <a:p>
             <a:fld id="{4C158068-7E1F-4B26-8461-C73B0177DC30}" type="datetimeFigureOut">
               <a:rPr lang="en-IN" smtClean="0"/>
-              <a:t>08-06-2022</a:t>
+              <a:t>09-06-2022</a:t>
             </a:fld>
             <a:endParaRPr lang="en-IN"/>
           </a:p>
@@ -7460,7 +7460,7 @@
           <a:p>
             <a:fld id="{4C158068-7E1F-4B26-8461-C73B0177DC30}" type="datetimeFigureOut">
               <a:rPr lang="en-IN" smtClean="0"/>
-              <a:t>08-06-2022</a:t>
+              <a:t>09-06-2022</a:t>
             </a:fld>
             <a:endParaRPr lang="en-IN"/>
           </a:p>
@@ -7896,7 +7896,7 @@
           <a:p>
             <a:fld id="{4C158068-7E1F-4B26-8461-C73B0177DC30}" type="datetimeFigureOut">
               <a:rPr lang="en-IN" smtClean="0"/>
-              <a:t>08-06-2022</a:t>
+              <a:t>09-06-2022</a:t>
             </a:fld>
             <a:endParaRPr lang="en-IN"/>
           </a:p>
@@ -7991,7 +7991,7 @@
           <a:p>
             <a:fld id="{4C158068-7E1F-4B26-8461-C73B0177DC30}" type="datetimeFigureOut">
               <a:rPr lang="en-IN" smtClean="0"/>
-              <a:t>08-06-2022</a:t>
+              <a:t>09-06-2022</a:t>
             </a:fld>
             <a:endParaRPr lang="en-IN"/>
           </a:p>
@@ -8103,7 +8103,7 @@
           <a:p>
             <a:fld id="{4C158068-7E1F-4B26-8461-C73B0177DC30}" type="datetimeFigureOut">
               <a:rPr lang="en-IN" smtClean="0"/>
-              <a:t>08-06-2022</a:t>
+              <a:t>09-06-2022</a:t>
             </a:fld>
             <a:endParaRPr lang="en-IN"/>
           </a:p>
@@ -8370,7 +8370,7 @@
           <a:p>
             <a:fld id="{4C158068-7E1F-4B26-8461-C73B0177DC30}" type="datetimeFigureOut">
               <a:rPr lang="en-IN" smtClean="0"/>
-              <a:t>08-06-2022</a:t>
+              <a:t>09-06-2022</a:t>
             </a:fld>
             <a:endParaRPr lang="en-IN"/>
           </a:p>
@@ -8907,7 +8907,7 @@
             <a:fld id="{B61BEF0D-F0BB-DE4B-95CE-6DB70DBA9567}" type="datetimeFigureOut">
               <a:rPr lang="en-US" smtClean="0"/>
               <a:pPr/>
-              <a:t>6/8/2022</a:t>
+              <a:t>6/9/2022</a:t>
             </a:fld>
             <a:endParaRPr lang="en-US" dirty="0"/>
           </a:p>
@@ -9543,8 +9543,8 @@
           </a:prstGeom>
         </p:spPr>
       </p:pic>
-      <mc:AlternateContent xmlns:mc="http://schemas.openxmlformats.org/markup-compatibility/2006">
-        <mc:Choice xmlns:p14="http://schemas.microsoft.com/office/powerpoint/2010/main" Requires="p14">
+      <mc:AlternateContent xmlns:mc="http://schemas.openxmlformats.org/markup-compatibility/2006" xmlns:p14="http://schemas.microsoft.com/office/powerpoint/2010/main">
+        <mc:Choice Requires="p14">
           <p:contentPart p14:bwMode="auto" r:id="rId5">
             <p14:nvContentPartPr>
               <p14:cNvPr id="20" name="Ink 19">
@@ -9563,7 +9563,7 @@
             </p14:xfrm>
           </p:contentPart>
         </mc:Choice>
-        <mc:Fallback>
+        <mc:Fallback xmlns="">
           <p:pic>
             <p:nvPicPr>
               <p:cNvPr id="20" name="Ink 19">
@@ -9594,8 +9594,8 @@
           </p:pic>
         </mc:Fallback>
       </mc:AlternateContent>
-      <mc:AlternateContent xmlns:mc="http://schemas.openxmlformats.org/markup-compatibility/2006">
-        <mc:Choice xmlns:p14="http://schemas.microsoft.com/office/powerpoint/2010/main" Requires="p14">
+      <mc:AlternateContent xmlns:mc="http://schemas.openxmlformats.org/markup-compatibility/2006" xmlns:p14="http://schemas.microsoft.com/office/powerpoint/2010/main">
+        <mc:Choice Requires="p14">
           <p:contentPart p14:bwMode="auto" r:id="rId7">
             <p14:nvContentPartPr>
               <p14:cNvPr id="54" name="Ink 53">
@@ -9614,7 +9614,7 @@
             </p14:xfrm>
           </p:contentPart>
         </mc:Choice>
-        <mc:Fallback>
+        <mc:Fallback xmlns="">
           <p:pic>
             <p:nvPicPr>
               <p:cNvPr id="54" name="Ink 53">
@@ -9645,8 +9645,8 @@
           </p:pic>
         </mc:Fallback>
       </mc:AlternateContent>
-      <mc:AlternateContent xmlns:mc="http://schemas.openxmlformats.org/markup-compatibility/2006">
-        <mc:Choice xmlns:p14="http://schemas.microsoft.com/office/powerpoint/2010/main" Requires="p14">
+      <mc:AlternateContent xmlns:mc="http://schemas.openxmlformats.org/markup-compatibility/2006" xmlns:p14="http://schemas.microsoft.com/office/powerpoint/2010/main">
+        <mc:Choice Requires="p14">
           <p:contentPart p14:bwMode="auto" r:id="rId9">
             <p14:nvContentPartPr>
               <p14:cNvPr id="82" name="Ink 81">
@@ -9665,7 +9665,7 @@
             </p14:xfrm>
           </p:contentPart>
         </mc:Choice>
-        <mc:Fallback>
+        <mc:Fallback xmlns="">
           <p:pic>
             <p:nvPicPr>
               <p:cNvPr id="82" name="Ink 81">
@@ -9696,8 +9696,8 @@
           </p:pic>
         </mc:Fallback>
       </mc:AlternateContent>
-      <mc:AlternateContent xmlns:mc="http://schemas.openxmlformats.org/markup-compatibility/2006">
-        <mc:Choice xmlns:p14="http://schemas.microsoft.com/office/powerpoint/2010/main" Requires="p14">
+      <mc:AlternateContent xmlns:mc="http://schemas.openxmlformats.org/markup-compatibility/2006" xmlns:p14="http://schemas.microsoft.com/office/powerpoint/2010/main">
+        <mc:Choice Requires="p14">
           <p:contentPart p14:bwMode="auto" r:id="rId11">
             <p14:nvContentPartPr>
               <p14:cNvPr id="84" name="Ink 83">
@@ -9716,7 +9716,7 @@
             </p14:xfrm>
           </p:contentPart>
         </mc:Choice>
-        <mc:Fallback>
+        <mc:Fallback xmlns="">
           <p:pic>
             <p:nvPicPr>
               <p:cNvPr id="84" name="Ink 83">
@@ -9747,8 +9747,8 @@
           </p:pic>
         </mc:Fallback>
       </mc:AlternateContent>
-      <mc:AlternateContent xmlns:mc="http://schemas.openxmlformats.org/markup-compatibility/2006">
-        <mc:Choice xmlns:p14="http://schemas.microsoft.com/office/powerpoint/2010/main" Requires="p14">
+      <mc:AlternateContent xmlns:mc="http://schemas.openxmlformats.org/markup-compatibility/2006" xmlns:p14="http://schemas.microsoft.com/office/powerpoint/2010/main">
+        <mc:Choice Requires="p14">
           <p:contentPart p14:bwMode="auto" r:id="rId13">
             <p14:nvContentPartPr>
               <p14:cNvPr id="98" name="Ink 97">
@@ -9767,7 +9767,7 @@
             </p14:xfrm>
           </p:contentPart>
         </mc:Choice>
-        <mc:Fallback>
+        <mc:Fallback xmlns="">
           <p:pic>
             <p:nvPicPr>
               <p:cNvPr id="98" name="Ink 97">
@@ -9798,8 +9798,8 @@
           </p:pic>
         </mc:Fallback>
       </mc:AlternateContent>
-      <mc:AlternateContent xmlns:mc="http://schemas.openxmlformats.org/markup-compatibility/2006">
-        <mc:Choice xmlns:p14="http://schemas.microsoft.com/office/powerpoint/2010/main" Requires="p14">
+      <mc:AlternateContent xmlns:mc="http://schemas.openxmlformats.org/markup-compatibility/2006" xmlns:p14="http://schemas.microsoft.com/office/powerpoint/2010/main">
+        <mc:Choice Requires="p14">
           <p:contentPart p14:bwMode="auto" r:id="rId15">
             <p14:nvContentPartPr>
               <p14:cNvPr id="102" name="Ink 101">
@@ -9818,7 +9818,7 @@
             </p14:xfrm>
           </p:contentPart>
         </mc:Choice>
-        <mc:Fallback>
+        <mc:Fallback xmlns="">
           <p:pic>
             <p:nvPicPr>
               <p:cNvPr id="102" name="Ink 101">
@@ -9849,8 +9849,8 @@
           </p:pic>
         </mc:Fallback>
       </mc:AlternateContent>
-      <mc:AlternateContent xmlns:mc="http://schemas.openxmlformats.org/markup-compatibility/2006">
-        <mc:Choice xmlns:p14="http://schemas.microsoft.com/office/powerpoint/2010/main" Requires="p14">
+      <mc:AlternateContent xmlns:mc="http://schemas.openxmlformats.org/markup-compatibility/2006" xmlns:p14="http://schemas.microsoft.com/office/powerpoint/2010/main">
+        <mc:Choice Requires="p14">
           <p:contentPart p14:bwMode="auto" r:id="rId17">
             <p14:nvContentPartPr>
               <p14:cNvPr id="123" name="Ink 122">
@@ -9869,7 +9869,7 @@
             </p14:xfrm>
           </p:contentPart>
         </mc:Choice>
-        <mc:Fallback>
+        <mc:Fallback xmlns="">
           <p:pic>
             <p:nvPicPr>
               <p:cNvPr id="123" name="Ink 122">
@@ -9900,8 +9900,8 @@
           </p:pic>
         </mc:Fallback>
       </mc:AlternateContent>
-      <mc:AlternateContent xmlns:mc="http://schemas.openxmlformats.org/markup-compatibility/2006">
-        <mc:Choice xmlns:p14="http://schemas.microsoft.com/office/powerpoint/2010/main" Requires="p14">
+      <mc:AlternateContent xmlns:mc="http://schemas.openxmlformats.org/markup-compatibility/2006" xmlns:p14="http://schemas.microsoft.com/office/powerpoint/2010/main">
+        <mc:Choice Requires="p14">
           <p:contentPart p14:bwMode="auto" r:id="rId19">
             <p14:nvContentPartPr>
               <p14:cNvPr id="125" name="Ink 124">
@@ -9920,7 +9920,7 @@
             </p14:xfrm>
           </p:contentPart>
         </mc:Choice>
-        <mc:Fallback>
+        <mc:Fallback xmlns="">
           <p:pic>
             <p:nvPicPr>
               <p:cNvPr id="125" name="Ink 124">
@@ -9951,8 +9951,8 @@
           </p:pic>
         </mc:Fallback>
       </mc:AlternateContent>
-      <mc:AlternateContent xmlns:mc="http://schemas.openxmlformats.org/markup-compatibility/2006">
-        <mc:Choice xmlns:p14="http://schemas.microsoft.com/office/powerpoint/2010/main" Requires="p14">
+      <mc:AlternateContent xmlns:mc="http://schemas.openxmlformats.org/markup-compatibility/2006" xmlns:p14="http://schemas.microsoft.com/office/powerpoint/2010/main">
+        <mc:Choice Requires="p14">
           <p:contentPart p14:bwMode="auto" r:id="rId21">
             <p14:nvContentPartPr>
               <p14:cNvPr id="139" name="Ink 138">
@@ -9971,7 +9971,7 @@
             </p14:xfrm>
           </p:contentPart>
         </mc:Choice>
-        <mc:Fallback>
+        <mc:Fallback xmlns="">
           <p:pic>
             <p:nvPicPr>
               <p:cNvPr id="139" name="Ink 138">
@@ -10002,8 +10002,8 @@
           </p:pic>
         </mc:Fallback>
       </mc:AlternateContent>
-      <mc:AlternateContent xmlns:mc="http://schemas.openxmlformats.org/markup-compatibility/2006">
-        <mc:Choice xmlns:p14="http://schemas.microsoft.com/office/powerpoint/2010/main" Requires="p14">
+      <mc:AlternateContent xmlns:mc="http://schemas.openxmlformats.org/markup-compatibility/2006" xmlns:p14="http://schemas.microsoft.com/office/powerpoint/2010/main">
+        <mc:Choice Requires="p14">
           <p:contentPart p14:bwMode="auto" r:id="rId23">
             <p14:nvContentPartPr>
               <p14:cNvPr id="146" name="Ink 145">
@@ -10022,7 +10022,7 @@
             </p14:xfrm>
           </p:contentPart>
         </mc:Choice>
-        <mc:Fallback>
+        <mc:Fallback xmlns="">
           <p:pic>
             <p:nvPicPr>
               <p:cNvPr id="146" name="Ink 145">
@@ -10113,8 +10113,8 @@
           </a:p>
         </p:txBody>
       </p:sp>
-      <mc:AlternateContent xmlns:mc="http://schemas.openxmlformats.org/markup-compatibility/2006">
-        <mc:Choice xmlns:p14="http://schemas.microsoft.com/office/powerpoint/2010/main" Requires="p14">
+      <mc:AlternateContent xmlns:mc="http://schemas.openxmlformats.org/markup-compatibility/2006" xmlns:p14="http://schemas.microsoft.com/office/powerpoint/2010/main">
+        <mc:Choice Requires="p14">
           <p:contentPart p14:bwMode="auto" r:id="rId2">
             <p14:nvContentPartPr>
               <p14:cNvPr id="46" name="Ink 45">
@@ -10133,7 +10133,7 @@
             </p14:xfrm>
           </p:contentPart>
         </mc:Choice>
-        <mc:Fallback>
+        <mc:Fallback xmlns="">
           <p:pic>
             <p:nvPicPr>
               <p:cNvPr id="46" name="Ink 45">
@@ -10164,8 +10164,8 @@
           </p:pic>
         </mc:Fallback>
       </mc:AlternateContent>
-      <mc:AlternateContent xmlns:mc="http://schemas.openxmlformats.org/markup-compatibility/2006">
-        <mc:Choice xmlns:p14="http://schemas.microsoft.com/office/powerpoint/2010/main" Requires="p14">
+      <mc:AlternateContent xmlns:mc="http://schemas.openxmlformats.org/markup-compatibility/2006" xmlns:p14="http://schemas.microsoft.com/office/powerpoint/2010/main">
+        <mc:Choice Requires="p14">
           <p:contentPart p14:bwMode="auto" r:id="rId4">
             <p14:nvContentPartPr>
               <p14:cNvPr id="57" name="Ink 56">
@@ -10184,7 +10184,7 @@
             </p14:xfrm>
           </p:contentPart>
         </mc:Choice>
-        <mc:Fallback>
+        <mc:Fallback xmlns="">
           <p:pic>
             <p:nvPicPr>
               <p:cNvPr id="57" name="Ink 56">
@@ -10215,8 +10215,8 @@
           </p:pic>
         </mc:Fallback>
       </mc:AlternateContent>
-      <mc:AlternateContent xmlns:mc="http://schemas.openxmlformats.org/markup-compatibility/2006">
-        <mc:Choice xmlns:p14="http://schemas.microsoft.com/office/powerpoint/2010/main" Requires="p14">
+      <mc:AlternateContent xmlns:mc="http://schemas.openxmlformats.org/markup-compatibility/2006" xmlns:p14="http://schemas.microsoft.com/office/powerpoint/2010/main">
+        <mc:Choice Requires="p14">
           <p:contentPart p14:bwMode="auto" r:id="rId6">
             <p14:nvContentPartPr>
               <p14:cNvPr id="86" name="Ink 85">
@@ -10235,7 +10235,7 @@
             </p14:xfrm>
           </p:contentPart>
         </mc:Choice>
-        <mc:Fallback>
+        <mc:Fallback xmlns="">
           <p:pic>
             <p:nvPicPr>
               <p:cNvPr id="86" name="Ink 85">
@@ -10266,8 +10266,8 @@
           </p:pic>
         </mc:Fallback>
       </mc:AlternateContent>
-      <mc:AlternateContent xmlns:mc="http://schemas.openxmlformats.org/markup-compatibility/2006">
-        <mc:Choice xmlns:p14="http://schemas.microsoft.com/office/powerpoint/2010/main" Requires="p14">
+      <mc:AlternateContent xmlns:mc="http://schemas.openxmlformats.org/markup-compatibility/2006" xmlns:p14="http://schemas.microsoft.com/office/powerpoint/2010/main">
+        <mc:Choice Requires="p14">
           <p:contentPart p14:bwMode="auto" r:id="rId8">
             <p14:nvContentPartPr>
               <p14:cNvPr id="89" name="Ink 88">
@@ -10286,7 +10286,7 @@
             </p14:xfrm>
           </p:contentPart>
         </mc:Choice>
-        <mc:Fallback>
+        <mc:Fallback xmlns="">
           <p:pic>
             <p:nvPicPr>
               <p:cNvPr id="89" name="Ink 88">
@@ -10317,8 +10317,8 @@
           </p:pic>
         </mc:Fallback>
       </mc:AlternateContent>
-      <mc:AlternateContent xmlns:mc="http://schemas.openxmlformats.org/markup-compatibility/2006">
-        <mc:Choice xmlns:p14="http://schemas.microsoft.com/office/powerpoint/2010/main" Requires="p14">
+      <mc:AlternateContent xmlns:mc="http://schemas.openxmlformats.org/markup-compatibility/2006" xmlns:p14="http://schemas.microsoft.com/office/powerpoint/2010/main">
+        <mc:Choice Requires="p14">
           <p:contentPart p14:bwMode="auto" r:id="rId10">
             <p14:nvContentPartPr>
               <p14:cNvPr id="90" name="Ink 89">
@@ -10337,7 +10337,7 @@
             </p14:xfrm>
           </p:contentPart>
         </mc:Choice>
-        <mc:Fallback>
+        <mc:Fallback xmlns="">
           <p:pic>
             <p:nvPicPr>
               <p:cNvPr id="90" name="Ink 89">
@@ -10368,8 +10368,8 @@
           </p:pic>
         </mc:Fallback>
       </mc:AlternateContent>
-      <mc:AlternateContent xmlns:mc="http://schemas.openxmlformats.org/markup-compatibility/2006">
-        <mc:Choice xmlns:p14="http://schemas.microsoft.com/office/powerpoint/2010/main" Requires="p14">
+      <mc:AlternateContent xmlns:mc="http://schemas.openxmlformats.org/markup-compatibility/2006" xmlns:p14="http://schemas.microsoft.com/office/powerpoint/2010/main">
+        <mc:Choice Requires="p14">
           <p:contentPart p14:bwMode="auto" r:id="rId12">
             <p14:nvContentPartPr>
               <p14:cNvPr id="125" name="Ink 124">
@@ -10388,7 +10388,7 @@
             </p14:xfrm>
           </p:contentPart>
         </mc:Choice>
-        <mc:Fallback>
+        <mc:Fallback xmlns="">
           <p:pic>
             <p:nvPicPr>
               <p:cNvPr id="125" name="Ink 124">
@@ -10419,8 +10419,8 @@
           </p:pic>
         </mc:Fallback>
       </mc:AlternateContent>
-      <mc:AlternateContent xmlns:mc="http://schemas.openxmlformats.org/markup-compatibility/2006">
-        <mc:Choice xmlns:p14="http://schemas.microsoft.com/office/powerpoint/2010/main" Requires="p14">
+      <mc:AlternateContent xmlns:mc="http://schemas.openxmlformats.org/markup-compatibility/2006" xmlns:p14="http://schemas.microsoft.com/office/powerpoint/2010/main">
+        <mc:Choice Requires="p14">
           <p:contentPart p14:bwMode="auto" r:id="rId14">
             <p14:nvContentPartPr>
               <p14:cNvPr id="163" name="Ink 162">
@@ -10439,7 +10439,7 @@
             </p14:xfrm>
           </p:contentPart>
         </mc:Choice>
-        <mc:Fallback>
+        <mc:Fallback xmlns="">
           <p:pic>
             <p:nvPicPr>
               <p:cNvPr id="163" name="Ink 162">
@@ -10470,8 +10470,8 @@
           </p:pic>
         </mc:Fallback>
       </mc:AlternateContent>
-      <mc:AlternateContent xmlns:mc="http://schemas.openxmlformats.org/markup-compatibility/2006">
-        <mc:Choice xmlns:p14="http://schemas.microsoft.com/office/powerpoint/2010/main" Requires="p14">
+      <mc:AlternateContent xmlns:mc="http://schemas.openxmlformats.org/markup-compatibility/2006" xmlns:p14="http://schemas.microsoft.com/office/powerpoint/2010/main">
+        <mc:Choice Requires="p14">
           <p:contentPart p14:bwMode="auto" r:id="rId16">
             <p14:nvContentPartPr>
               <p14:cNvPr id="164" name="Ink 163">
@@ -10490,7 +10490,7 @@
             </p14:xfrm>
           </p:contentPart>
         </mc:Choice>
-        <mc:Fallback>
+        <mc:Fallback xmlns="">
           <p:pic>
             <p:nvPicPr>
               <p:cNvPr id="164" name="Ink 163">
@@ -10521,8 +10521,8 @@
           </p:pic>
         </mc:Fallback>
       </mc:AlternateContent>
-      <mc:AlternateContent xmlns:mc="http://schemas.openxmlformats.org/markup-compatibility/2006">
-        <mc:Choice xmlns:p14="http://schemas.microsoft.com/office/powerpoint/2010/main" Requires="p14">
+      <mc:AlternateContent xmlns:mc="http://schemas.openxmlformats.org/markup-compatibility/2006" xmlns:p14="http://schemas.microsoft.com/office/powerpoint/2010/main">
+        <mc:Choice Requires="p14">
           <p:contentPart p14:bwMode="auto" r:id="rId18">
             <p14:nvContentPartPr>
               <p14:cNvPr id="165" name="Ink 164">
@@ -10541,7 +10541,7 @@
             </p14:xfrm>
           </p:contentPart>
         </mc:Choice>
-        <mc:Fallback>
+        <mc:Fallback xmlns="">
           <p:pic>
             <p:nvPicPr>
               <p:cNvPr id="165" name="Ink 164">
@@ -10875,8 +10875,8 @@
           </a:p>
         </p:txBody>
       </p:sp>
-      <mc:AlternateContent xmlns:mc="http://schemas.openxmlformats.org/markup-compatibility/2006">
-        <mc:Choice xmlns:p14="http://schemas.microsoft.com/office/powerpoint/2010/main" Requires="p14">
+      <mc:AlternateContent xmlns:mc="http://schemas.openxmlformats.org/markup-compatibility/2006" xmlns:p14="http://schemas.microsoft.com/office/powerpoint/2010/main">
+        <mc:Choice Requires="p14">
           <p:contentPart p14:bwMode="auto" r:id="rId2">
             <p14:nvContentPartPr>
               <p14:cNvPr id="28" name="Ink 27">
@@ -10895,7 +10895,7 @@
             </p14:xfrm>
           </p:contentPart>
         </mc:Choice>
-        <mc:Fallback>
+        <mc:Fallback xmlns="">
           <p:pic>
             <p:nvPicPr>
               <p:cNvPr id="28" name="Ink 27">
@@ -10926,8 +10926,8 @@
           </p:pic>
         </mc:Fallback>
       </mc:AlternateContent>
-      <mc:AlternateContent xmlns:mc="http://schemas.openxmlformats.org/markup-compatibility/2006">
-        <mc:Choice xmlns:p14="http://schemas.microsoft.com/office/powerpoint/2010/main" Requires="p14">
+      <mc:AlternateContent xmlns:mc="http://schemas.openxmlformats.org/markup-compatibility/2006" xmlns:p14="http://schemas.microsoft.com/office/powerpoint/2010/main">
+        <mc:Choice Requires="p14">
           <p:contentPart p14:bwMode="auto" r:id="rId4">
             <p14:nvContentPartPr>
               <p14:cNvPr id="49" name="Ink 48">
@@ -10946,7 +10946,7 @@
             </p14:xfrm>
           </p:contentPart>
         </mc:Choice>
-        <mc:Fallback>
+        <mc:Fallback xmlns="">
           <p:pic>
             <p:nvPicPr>
               <p:cNvPr id="49" name="Ink 48">
@@ -10977,8 +10977,8 @@
           </p:pic>
         </mc:Fallback>
       </mc:AlternateContent>
-      <mc:AlternateContent xmlns:mc="http://schemas.openxmlformats.org/markup-compatibility/2006">
-        <mc:Choice xmlns:p14="http://schemas.microsoft.com/office/powerpoint/2010/main" Requires="p14">
+      <mc:AlternateContent xmlns:mc="http://schemas.openxmlformats.org/markup-compatibility/2006" xmlns:p14="http://schemas.microsoft.com/office/powerpoint/2010/main">
+        <mc:Choice Requires="p14">
           <p:contentPart p14:bwMode="auto" r:id="rId6">
             <p14:nvContentPartPr>
               <p14:cNvPr id="96" name="Ink 95">
@@ -10997,7 +10997,7 @@
             </p14:xfrm>
           </p:contentPart>
         </mc:Choice>
-        <mc:Fallback>
+        <mc:Fallback xmlns="">
           <p:pic>
             <p:nvPicPr>
               <p:cNvPr id="96" name="Ink 95">
@@ -11028,8 +11028,8 @@
           </p:pic>
         </mc:Fallback>
       </mc:AlternateContent>
-      <mc:AlternateContent xmlns:mc="http://schemas.openxmlformats.org/markup-compatibility/2006">
-        <mc:Choice xmlns:p14="http://schemas.microsoft.com/office/powerpoint/2010/main" Requires="p14">
+      <mc:AlternateContent xmlns:mc="http://schemas.openxmlformats.org/markup-compatibility/2006" xmlns:p14="http://schemas.microsoft.com/office/powerpoint/2010/main">
+        <mc:Choice Requires="p14">
           <p:contentPart p14:bwMode="auto" r:id="rId8">
             <p14:nvContentPartPr>
               <p14:cNvPr id="108" name="Ink 107">
@@ -11048,7 +11048,7 @@
             </p14:xfrm>
           </p:contentPart>
         </mc:Choice>
-        <mc:Fallback>
+        <mc:Fallback xmlns="">
           <p:pic>
             <p:nvPicPr>
               <p:cNvPr id="108" name="Ink 107">
@@ -11079,8 +11079,8 @@
           </p:pic>
         </mc:Fallback>
       </mc:AlternateContent>
-      <mc:AlternateContent xmlns:mc="http://schemas.openxmlformats.org/markup-compatibility/2006">
-        <mc:Choice xmlns:p14="http://schemas.microsoft.com/office/powerpoint/2010/main" Requires="p14">
+      <mc:AlternateContent xmlns:mc="http://schemas.openxmlformats.org/markup-compatibility/2006" xmlns:p14="http://schemas.microsoft.com/office/powerpoint/2010/main">
+        <mc:Choice Requires="p14">
           <p:contentPart p14:bwMode="auto" r:id="rId10">
             <p14:nvContentPartPr>
               <p14:cNvPr id="113" name="Ink 112">
@@ -11099,7 +11099,7 @@
             </p14:xfrm>
           </p:contentPart>
         </mc:Choice>
-        <mc:Fallback>
+        <mc:Fallback xmlns="">
           <p:pic>
             <p:nvPicPr>
               <p:cNvPr id="113" name="Ink 112">
@@ -11130,8 +11130,8 @@
           </p:pic>
         </mc:Fallback>
       </mc:AlternateContent>
-      <mc:AlternateContent xmlns:mc="http://schemas.openxmlformats.org/markup-compatibility/2006">
-        <mc:Choice xmlns:p14="http://schemas.microsoft.com/office/powerpoint/2010/main" Requires="p14">
+      <mc:AlternateContent xmlns:mc="http://schemas.openxmlformats.org/markup-compatibility/2006" xmlns:p14="http://schemas.microsoft.com/office/powerpoint/2010/main">
+        <mc:Choice Requires="p14">
           <p:contentPart p14:bwMode="auto" r:id="rId12">
             <p14:nvContentPartPr>
               <p14:cNvPr id="117" name="Ink 116">
@@ -11150,7 +11150,7 @@
             </p14:xfrm>
           </p:contentPart>
         </mc:Choice>
-        <mc:Fallback>
+        <mc:Fallback xmlns="">
           <p:pic>
             <p:nvPicPr>
               <p:cNvPr id="117" name="Ink 116">
@@ -11181,8 +11181,8 @@
           </p:pic>
         </mc:Fallback>
       </mc:AlternateContent>
-      <mc:AlternateContent xmlns:mc="http://schemas.openxmlformats.org/markup-compatibility/2006">
-        <mc:Choice xmlns:p14="http://schemas.microsoft.com/office/powerpoint/2010/main" Requires="p14">
+      <mc:AlternateContent xmlns:mc="http://schemas.openxmlformats.org/markup-compatibility/2006" xmlns:p14="http://schemas.microsoft.com/office/powerpoint/2010/main">
+        <mc:Choice Requires="p14">
           <p:contentPart p14:bwMode="auto" r:id="rId14">
             <p14:nvContentPartPr>
               <p14:cNvPr id="120" name="Ink 119">
@@ -11201,7 +11201,7 @@
             </p14:xfrm>
           </p:contentPart>
         </mc:Choice>
-        <mc:Fallback>
+        <mc:Fallback xmlns="">
           <p:pic>
             <p:nvPicPr>
               <p:cNvPr id="120" name="Ink 119">
@@ -11232,8 +11232,8 @@
           </p:pic>
         </mc:Fallback>
       </mc:AlternateContent>
-      <mc:AlternateContent xmlns:mc="http://schemas.openxmlformats.org/markup-compatibility/2006">
-        <mc:Choice xmlns:p14="http://schemas.microsoft.com/office/powerpoint/2010/main" Requires="p14">
+      <mc:AlternateContent xmlns:mc="http://schemas.openxmlformats.org/markup-compatibility/2006" xmlns:p14="http://schemas.microsoft.com/office/powerpoint/2010/main">
+        <mc:Choice Requires="p14">
           <p:contentPart p14:bwMode="auto" r:id="rId16">
             <p14:nvContentPartPr>
               <p14:cNvPr id="127" name="Ink 126">
@@ -11252,7 +11252,7 @@
             </p14:xfrm>
           </p:contentPart>
         </mc:Choice>
-        <mc:Fallback>
+        <mc:Fallback xmlns="">
           <p:pic>
             <p:nvPicPr>
               <p:cNvPr id="127" name="Ink 126">
@@ -11283,8 +11283,8 @@
           </p:pic>
         </mc:Fallback>
       </mc:AlternateContent>
-      <mc:AlternateContent xmlns:mc="http://schemas.openxmlformats.org/markup-compatibility/2006">
-        <mc:Choice xmlns:p14="http://schemas.microsoft.com/office/powerpoint/2010/main" Requires="p14">
+      <mc:AlternateContent xmlns:mc="http://schemas.openxmlformats.org/markup-compatibility/2006" xmlns:p14="http://schemas.microsoft.com/office/powerpoint/2010/main">
+        <mc:Choice Requires="p14">
           <p:contentPart p14:bwMode="auto" r:id="rId18">
             <p14:nvContentPartPr>
               <p14:cNvPr id="128" name="Ink 127">
@@ -11303,7 +11303,7 @@
             </p14:xfrm>
           </p:contentPart>
         </mc:Choice>
-        <mc:Fallback>
+        <mc:Fallback xmlns="">
           <p:pic>
             <p:nvPicPr>
               <p:cNvPr id="128" name="Ink 127">
@@ -11334,8 +11334,8 @@
           </p:pic>
         </mc:Fallback>
       </mc:AlternateContent>
-      <mc:AlternateContent xmlns:mc="http://schemas.openxmlformats.org/markup-compatibility/2006">
-        <mc:Choice xmlns:p14="http://schemas.microsoft.com/office/powerpoint/2010/main" Requires="p14">
+      <mc:AlternateContent xmlns:mc="http://schemas.openxmlformats.org/markup-compatibility/2006" xmlns:p14="http://schemas.microsoft.com/office/powerpoint/2010/main">
+        <mc:Choice Requires="p14">
           <p:contentPart p14:bwMode="auto" r:id="rId20">
             <p14:nvContentPartPr>
               <p14:cNvPr id="139" name="Ink 138">
@@ -11354,7 +11354,7 @@
             </p14:xfrm>
           </p:contentPart>
         </mc:Choice>
-        <mc:Fallback>
+        <mc:Fallback xmlns="">
           <p:pic>
             <p:nvPicPr>
               <p:cNvPr id="139" name="Ink 138">
@@ -11385,8 +11385,8 @@
           </p:pic>
         </mc:Fallback>
       </mc:AlternateContent>
-      <mc:AlternateContent xmlns:mc="http://schemas.openxmlformats.org/markup-compatibility/2006">
-        <mc:Choice xmlns:p14="http://schemas.microsoft.com/office/powerpoint/2010/main" Requires="p14">
+      <mc:AlternateContent xmlns:mc="http://schemas.openxmlformats.org/markup-compatibility/2006" xmlns:p14="http://schemas.microsoft.com/office/powerpoint/2010/main">
+        <mc:Choice Requires="p14">
           <p:contentPart p14:bwMode="auto" r:id="rId22">
             <p14:nvContentPartPr>
               <p14:cNvPr id="146" name="Ink 145">
@@ -11405,7 +11405,7 @@
             </p14:xfrm>
           </p:contentPart>
         </mc:Choice>
-        <mc:Fallback>
+        <mc:Fallback xmlns="">
           <p:pic>
             <p:nvPicPr>
               <p:cNvPr id="146" name="Ink 145">
@@ -11499,8 +11499,8 @@
           </a:p>
         </p:txBody>
       </p:sp>
-      <mc:AlternateContent xmlns:mc="http://schemas.openxmlformats.org/markup-compatibility/2006">
-        <mc:Choice xmlns:p14="http://schemas.microsoft.com/office/powerpoint/2010/main" Requires="p14">
+      <mc:AlternateContent xmlns:mc="http://schemas.openxmlformats.org/markup-compatibility/2006" xmlns:p14="http://schemas.microsoft.com/office/powerpoint/2010/main">
+        <mc:Choice Requires="p14">
           <p:contentPart p14:bwMode="auto" r:id="rId2">
             <p14:nvContentPartPr>
               <p14:cNvPr id="28" name="Ink 27">
@@ -11519,7 +11519,7 @@
             </p14:xfrm>
           </p:contentPart>
         </mc:Choice>
-        <mc:Fallback>
+        <mc:Fallback xmlns="">
           <p:pic>
             <p:nvPicPr>
               <p:cNvPr id="28" name="Ink 27">
@@ -11550,8 +11550,8 @@
           </p:pic>
         </mc:Fallback>
       </mc:AlternateContent>
-      <mc:AlternateContent xmlns:mc="http://schemas.openxmlformats.org/markup-compatibility/2006">
-        <mc:Choice xmlns:p14="http://schemas.microsoft.com/office/powerpoint/2010/main" Requires="p14">
+      <mc:AlternateContent xmlns:mc="http://schemas.openxmlformats.org/markup-compatibility/2006" xmlns:p14="http://schemas.microsoft.com/office/powerpoint/2010/main">
+        <mc:Choice Requires="p14">
           <p:contentPart p14:bwMode="auto" r:id="rId4">
             <p14:nvContentPartPr>
               <p14:cNvPr id="49" name="Ink 48">
@@ -11570,7 +11570,7 @@
             </p14:xfrm>
           </p:contentPart>
         </mc:Choice>
-        <mc:Fallback>
+        <mc:Fallback xmlns="">
           <p:pic>
             <p:nvPicPr>
               <p:cNvPr id="49" name="Ink 48">
@@ -11601,8 +11601,8 @@
           </p:pic>
         </mc:Fallback>
       </mc:AlternateContent>
-      <mc:AlternateContent xmlns:mc="http://schemas.openxmlformats.org/markup-compatibility/2006">
-        <mc:Choice xmlns:p14="http://schemas.microsoft.com/office/powerpoint/2010/main" Requires="p14">
+      <mc:AlternateContent xmlns:mc="http://schemas.openxmlformats.org/markup-compatibility/2006" xmlns:p14="http://schemas.microsoft.com/office/powerpoint/2010/main">
+        <mc:Choice Requires="p14">
           <p:contentPart p14:bwMode="auto" r:id="rId6">
             <p14:nvContentPartPr>
               <p14:cNvPr id="229" name="Ink 228">
@@ -11621,7 +11621,7 @@
             </p14:xfrm>
           </p:contentPart>
         </mc:Choice>
-        <mc:Fallback>
+        <mc:Fallback xmlns="">
           <p:pic>
             <p:nvPicPr>
               <p:cNvPr id="229" name="Ink 228">
@@ -11652,8 +11652,8 @@
           </p:pic>
         </mc:Fallback>
       </mc:AlternateContent>
-      <mc:AlternateContent xmlns:mc="http://schemas.openxmlformats.org/markup-compatibility/2006">
-        <mc:Choice xmlns:p14="http://schemas.microsoft.com/office/powerpoint/2010/main" Requires="p14">
+      <mc:AlternateContent xmlns:mc="http://schemas.openxmlformats.org/markup-compatibility/2006" xmlns:p14="http://schemas.microsoft.com/office/powerpoint/2010/main">
+        <mc:Choice Requires="p14">
           <p:contentPart p14:bwMode="auto" r:id="rId8">
             <p14:nvContentPartPr>
               <p14:cNvPr id="239" name="Ink 238">
@@ -11672,7 +11672,7 @@
             </p14:xfrm>
           </p:contentPart>
         </mc:Choice>
-        <mc:Fallback>
+        <mc:Fallback xmlns="">
           <p:pic>
             <p:nvPicPr>
               <p:cNvPr id="239" name="Ink 238">
@@ -11703,8 +11703,8 @@
           </p:pic>
         </mc:Fallback>
       </mc:AlternateContent>
-      <mc:AlternateContent xmlns:mc="http://schemas.openxmlformats.org/markup-compatibility/2006">
-        <mc:Choice xmlns:p14="http://schemas.microsoft.com/office/powerpoint/2010/main" Requires="p14">
+      <mc:AlternateContent xmlns:mc="http://schemas.openxmlformats.org/markup-compatibility/2006" xmlns:p14="http://schemas.microsoft.com/office/powerpoint/2010/main">
+        <mc:Choice Requires="p14">
           <p:contentPart p14:bwMode="auto" r:id="rId10">
             <p14:nvContentPartPr>
               <p14:cNvPr id="286" name="Ink 285">
@@ -11723,7 +11723,7 @@
             </p14:xfrm>
           </p:contentPart>
         </mc:Choice>
-        <mc:Fallback>
+        <mc:Fallback xmlns="">
           <p:pic>
             <p:nvPicPr>
               <p:cNvPr id="286" name="Ink 285">
@@ -11754,8 +11754,8 @@
           </p:pic>
         </mc:Fallback>
       </mc:AlternateContent>
-      <mc:AlternateContent xmlns:mc="http://schemas.openxmlformats.org/markup-compatibility/2006">
-        <mc:Choice xmlns:p14="http://schemas.microsoft.com/office/powerpoint/2010/main" Requires="p14">
+      <mc:AlternateContent xmlns:mc="http://schemas.openxmlformats.org/markup-compatibility/2006" xmlns:p14="http://schemas.microsoft.com/office/powerpoint/2010/main">
+        <mc:Choice Requires="p14">
           <p:contentPart p14:bwMode="auto" r:id="rId12">
             <p14:nvContentPartPr>
               <p14:cNvPr id="317" name="Ink 316">
@@ -11774,7 +11774,7 @@
             </p14:xfrm>
           </p:contentPart>
         </mc:Choice>
-        <mc:Fallback>
+        <mc:Fallback xmlns="">
           <p:pic>
             <p:nvPicPr>
               <p:cNvPr id="317" name="Ink 316">
@@ -11805,8 +11805,8 @@
           </p:pic>
         </mc:Fallback>
       </mc:AlternateContent>
-      <mc:AlternateContent xmlns:mc="http://schemas.openxmlformats.org/markup-compatibility/2006">
-        <mc:Choice xmlns:p14="http://schemas.microsoft.com/office/powerpoint/2010/main" Requires="p14">
+      <mc:AlternateContent xmlns:mc="http://schemas.openxmlformats.org/markup-compatibility/2006" xmlns:p14="http://schemas.microsoft.com/office/powerpoint/2010/main">
+        <mc:Choice Requires="p14">
           <p:contentPart p14:bwMode="auto" r:id="rId14">
             <p14:nvContentPartPr>
               <p14:cNvPr id="318" name="Ink 317">
@@ -11825,7 +11825,7 @@
             </p14:xfrm>
           </p:contentPart>
         </mc:Choice>
-        <mc:Fallback>
+        <mc:Fallback xmlns="">
           <p:pic>
             <p:nvPicPr>
               <p:cNvPr id="318" name="Ink 317">
@@ -11959,8 +11959,8 @@
           </a:p>
         </p:txBody>
       </p:sp>
-      <mc:AlternateContent xmlns:mc="http://schemas.openxmlformats.org/markup-compatibility/2006">
-        <mc:Choice xmlns:p14="http://schemas.microsoft.com/office/powerpoint/2010/main" Requires="p14">
+      <mc:AlternateContent xmlns:mc="http://schemas.openxmlformats.org/markup-compatibility/2006" xmlns:p14="http://schemas.microsoft.com/office/powerpoint/2010/main">
+        <mc:Choice Requires="p14">
           <p:contentPart p14:bwMode="auto" r:id="rId2">
             <p14:nvContentPartPr>
               <p14:cNvPr id="94" name="Ink 93">
@@ -11979,7 +11979,7 @@
             </p14:xfrm>
           </p:contentPart>
         </mc:Choice>
-        <mc:Fallback>
+        <mc:Fallback xmlns="">
           <p:pic>
             <p:nvPicPr>
               <p:cNvPr id="94" name="Ink 93">
@@ -12010,8 +12010,8 @@
           </p:pic>
         </mc:Fallback>
       </mc:AlternateContent>
-      <mc:AlternateContent xmlns:mc="http://schemas.openxmlformats.org/markup-compatibility/2006">
-        <mc:Choice xmlns:p14="http://schemas.microsoft.com/office/powerpoint/2010/main" Requires="p14">
+      <mc:AlternateContent xmlns:mc="http://schemas.openxmlformats.org/markup-compatibility/2006" xmlns:p14="http://schemas.microsoft.com/office/powerpoint/2010/main">
+        <mc:Choice Requires="p14">
           <p:contentPart p14:bwMode="auto" r:id="rId4">
             <p14:nvContentPartPr>
               <p14:cNvPr id="115" name="Ink 114">
@@ -12030,7 +12030,7 @@
             </p14:xfrm>
           </p:contentPart>
         </mc:Choice>
-        <mc:Fallback>
+        <mc:Fallback xmlns="">
           <p:pic>
             <p:nvPicPr>
               <p:cNvPr id="115" name="Ink 114">
@@ -12124,8 +12124,8 @@
           </a:p>
         </p:txBody>
       </p:sp>
-      <mc:AlternateContent xmlns:mc="http://schemas.openxmlformats.org/markup-compatibility/2006">
-        <mc:Choice xmlns:p14="http://schemas.microsoft.com/office/powerpoint/2010/main" Requires="p14">
+      <mc:AlternateContent xmlns:mc="http://schemas.openxmlformats.org/markup-compatibility/2006" xmlns:p14="http://schemas.microsoft.com/office/powerpoint/2010/main">
+        <mc:Choice Requires="p14">
           <p:contentPart p14:bwMode="auto" r:id="rId2">
             <p14:nvContentPartPr>
               <p14:cNvPr id="172" name="Ink 171">
@@ -12144,7 +12144,7 @@
             </p14:xfrm>
           </p:contentPart>
         </mc:Choice>
-        <mc:Fallback>
+        <mc:Fallback xmlns="">
           <p:pic>
             <p:nvPicPr>
               <p:cNvPr id="172" name="Ink 171">
@@ -12175,8 +12175,8 @@
           </p:pic>
         </mc:Fallback>
       </mc:AlternateContent>
-      <mc:AlternateContent xmlns:mc="http://schemas.openxmlformats.org/markup-compatibility/2006">
-        <mc:Choice xmlns:p14="http://schemas.microsoft.com/office/powerpoint/2010/main" Requires="p14">
+      <mc:AlternateContent xmlns:mc="http://schemas.openxmlformats.org/markup-compatibility/2006" xmlns:p14="http://schemas.microsoft.com/office/powerpoint/2010/main">
+        <mc:Choice Requires="p14">
           <p:contentPart p14:bwMode="auto" r:id="rId4">
             <p14:nvContentPartPr>
               <p14:cNvPr id="180" name="Ink 179">
@@ -12195,7 +12195,7 @@
             </p14:xfrm>
           </p:contentPart>
         </mc:Choice>
-        <mc:Fallback>
+        <mc:Fallback xmlns="">
           <p:pic>
             <p:nvPicPr>
               <p:cNvPr id="180" name="Ink 179">
@@ -12226,8 +12226,8 @@
           </p:pic>
         </mc:Fallback>
       </mc:AlternateContent>
-      <mc:AlternateContent xmlns:mc="http://schemas.openxmlformats.org/markup-compatibility/2006">
-        <mc:Choice xmlns:p14="http://schemas.microsoft.com/office/powerpoint/2010/main" Requires="p14">
+      <mc:AlternateContent xmlns:mc="http://schemas.openxmlformats.org/markup-compatibility/2006" xmlns:p14="http://schemas.microsoft.com/office/powerpoint/2010/main">
+        <mc:Choice Requires="p14">
           <p:contentPart p14:bwMode="auto" r:id="rId6">
             <p14:nvContentPartPr>
               <p14:cNvPr id="205" name="Ink 204">
@@ -12246,7 +12246,7 @@
             </p14:xfrm>
           </p:contentPart>
         </mc:Choice>
-        <mc:Fallback>
+        <mc:Fallback xmlns="">
           <p:pic>
             <p:nvPicPr>
               <p:cNvPr id="205" name="Ink 204">
@@ -12277,8 +12277,8 @@
           </p:pic>
         </mc:Fallback>
       </mc:AlternateContent>
-      <mc:AlternateContent xmlns:mc="http://schemas.openxmlformats.org/markup-compatibility/2006">
-        <mc:Choice xmlns:p14="http://schemas.microsoft.com/office/powerpoint/2010/main" Requires="p14">
+      <mc:AlternateContent xmlns:mc="http://schemas.openxmlformats.org/markup-compatibility/2006" xmlns:p14="http://schemas.microsoft.com/office/powerpoint/2010/main">
+        <mc:Choice Requires="p14">
           <p:contentPart p14:bwMode="auto" r:id="rId8">
             <p14:nvContentPartPr>
               <p14:cNvPr id="249" name="Ink 248">
@@ -12297,7 +12297,7 @@
             </p14:xfrm>
           </p:contentPart>
         </mc:Choice>
-        <mc:Fallback>
+        <mc:Fallback xmlns="">
           <p:pic>
             <p:nvPicPr>
               <p:cNvPr id="249" name="Ink 248">
@@ -12328,8 +12328,8 @@
           </p:pic>
         </mc:Fallback>
       </mc:AlternateContent>
-      <mc:AlternateContent xmlns:mc="http://schemas.openxmlformats.org/markup-compatibility/2006">
-        <mc:Choice xmlns:p14="http://schemas.microsoft.com/office/powerpoint/2010/main" Requires="p14">
+      <mc:AlternateContent xmlns:mc="http://schemas.openxmlformats.org/markup-compatibility/2006" xmlns:p14="http://schemas.microsoft.com/office/powerpoint/2010/main">
+        <mc:Choice Requires="p14">
           <p:contentPart p14:bwMode="auto" r:id="rId10">
             <p14:nvContentPartPr>
               <p14:cNvPr id="256" name="Ink 255">
@@ -12348,7 +12348,7 @@
             </p14:xfrm>
           </p:contentPart>
         </mc:Choice>
-        <mc:Fallback>
+        <mc:Fallback xmlns="">
           <p:pic>
             <p:nvPicPr>
               <p:cNvPr id="256" name="Ink 255">
@@ -12442,8 +12442,8 @@
           </a:p>
         </p:txBody>
       </p:sp>
-      <mc:AlternateContent xmlns:mc="http://schemas.openxmlformats.org/markup-compatibility/2006">
-        <mc:Choice xmlns:p14="http://schemas.microsoft.com/office/powerpoint/2010/main" Requires="p14">
+      <mc:AlternateContent xmlns:mc="http://schemas.openxmlformats.org/markup-compatibility/2006" xmlns:p14="http://schemas.microsoft.com/office/powerpoint/2010/main">
+        <mc:Choice Requires="p14">
           <p:contentPart p14:bwMode="auto" r:id="rId2">
             <p14:nvContentPartPr>
               <p14:cNvPr id="153" name="Ink 152">
@@ -12462,7 +12462,7 @@
             </p14:xfrm>
           </p:contentPart>
         </mc:Choice>
-        <mc:Fallback>
+        <mc:Fallback xmlns="">
           <p:pic>
             <p:nvPicPr>
               <p:cNvPr id="153" name="Ink 152">
@@ -12493,8 +12493,8 @@
           </p:pic>
         </mc:Fallback>
       </mc:AlternateContent>
-      <mc:AlternateContent xmlns:mc="http://schemas.openxmlformats.org/markup-compatibility/2006">
-        <mc:Choice xmlns:p14="http://schemas.microsoft.com/office/powerpoint/2010/main" Requires="p14">
+      <mc:AlternateContent xmlns:mc="http://schemas.openxmlformats.org/markup-compatibility/2006" xmlns:p14="http://schemas.microsoft.com/office/powerpoint/2010/main">
+        <mc:Choice Requires="p14">
           <p:contentPart p14:bwMode="auto" r:id="rId4">
             <p14:nvContentPartPr>
               <p14:cNvPr id="154" name="Ink 153">
@@ -12513,7 +12513,7 @@
             </p14:xfrm>
           </p:contentPart>
         </mc:Choice>
-        <mc:Fallback>
+        <mc:Fallback xmlns="">
           <p:pic>
             <p:nvPicPr>
               <p:cNvPr id="154" name="Ink 153">
@@ -12544,8 +12544,8 @@
           </p:pic>
         </mc:Fallback>
       </mc:AlternateContent>
-      <mc:AlternateContent xmlns:mc="http://schemas.openxmlformats.org/markup-compatibility/2006">
-        <mc:Choice xmlns:p14="http://schemas.microsoft.com/office/powerpoint/2010/main" Requires="p14">
+      <mc:AlternateContent xmlns:mc="http://schemas.openxmlformats.org/markup-compatibility/2006" xmlns:p14="http://schemas.microsoft.com/office/powerpoint/2010/main">
+        <mc:Choice Requires="p14">
           <p:contentPart p14:bwMode="auto" r:id="rId6">
             <p14:nvContentPartPr>
               <p14:cNvPr id="155" name="Ink 154">
@@ -12564,7 +12564,7 @@
             </p14:xfrm>
           </p:contentPart>
         </mc:Choice>
-        <mc:Fallback>
+        <mc:Fallback xmlns="">
           <p:pic>
             <p:nvPicPr>
               <p:cNvPr id="155" name="Ink 154">
@@ -12595,8 +12595,8 @@
           </p:pic>
         </mc:Fallback>
       </mc:AlternateContent>
-      <mc:AlternateContent xmlns:mc="http://schemas.openxmlformats.org/markup-compatibility/2006">
-        <mc:Choice xmlns:p14="http://schemas.microsoft.com/office/powerpoint/2010/main" Requires="p14">
+      <mc:AlternateContent xmlns:mc="http://schemas.openxmlformats.org/markup-compatibility/2006" xmlns:p14="http://schemas.microsoft.com/office/powerpoint/2010/main">
+        <mc:Choice Requires="p14">
           <p:contentPart p14:bwMode="auto" r:id="rId8">
             <p14:nvContentPartPr>
               <p14:cNvPr id="156" name="Ink 155">
@@ -12615,7 +12615,7 @@
             </p14:xfrm>
           </p:contentPart>
         </mc:Choice>
-        <mc:Fallback>
+        <mc:Fallback xmlns="">
           <p:pic>
             <p:nvPicPr>
               <p:cNvPr id="156" name="Ink 155">
@@ -12646,8 +12646,8 @@
           </p:pic>
         </mc:Fallback>
       </mc:AlternateContent>
-      <mc:AlternateContent xmlns:mc="http://schemas.openxmlformats.org/markup-compatibility/2006">
-        <mc:Choice xmlns:p14="http://schemas.microsoft.com/office/powerpoint/2010/main" Requires="p14">
+      <mc:AlternateContent xmlns:mc="http://schemas.openxmlformats.org/markup-compatibility/2006" xmlns:p14="http://schemas.microsoft.com/office/powerpoint/2010/main">
+        <mc:Choice Requires="p14">
           <p:contentPart p14:bwMode="auto" r:id="rId10">
             <p14:nvContentPartPr>
               <p14:cNvPr id="157" name="Ink 156">
@@ -12666,7 +12666,7 @@
             </p14:xfrm>
           </p:contentPart>
         </mc:Choice>
-        <mc:Fallback>
+        <mc:Fallback xmlns="">
           <p:pic>
             <p:nvPicPr>
               <p:cNvPr id="157" name="Ink 156">
@@ -12697,8 +12697,8 @@
           </p:pic>
         </mc:Fallback>
       </mc:AlternateContent>
-      <mc:AlternateContent xmlns:mc="http://schemas.openxmlformats.org/markup-compatibility/2006">
-        <mc:Choice xmlns:p14="http://schemas.microsoft.com/office/powerpoint/2010/main" Requires="p14">
+      <mc:AlternateContent xmlns:mc="http://schemas.openxmlformats.org/markup-compatibility/2006" xmlns:p14="http://schemas.microsoft.com/office/powerpoint/2010/main">
+        <mc:Choice Requires="p14">
           <p:contentPart p14:bwMode="auto" r:id="rId12">
             <p14:nvContentPartPr>
               <p14:cNvPr id="158" name="Ink 157">
@@ -12717,7 +12717,7 @@
             </p14:xfrm>
           </p:contentPart>
         </mc:Choice>
-        <mc:Fallback>
+        <mc:Fallback xmlns="">
           <p:pic>
             <p:nvPicPr>
               <p:cNvPr id="158" name="Ink 157">
@@ -12819,53 +12819,9 @@
           </a:p>
         </p:txBody>
       </p:sp>
-      <p:sp>
-        <p:nvSpPr>
-          <p:cNvPr id="4" name="Rectangle 3">
-            <a:extLst>
-              <a:ext uri="{FF2B5EF4-FFF2-40B4-BE49-F238E27FC236}">
-                <a16:creationId xmlns:a16="http://schemas.microsoft.com/office/drawing/2014/main" id="{5B5DFD55-A1A7-48CA-B158-D2BCD1C04F22}"/>
-              </a:ext>
-            </a:extLst>
-          </p:cNvPr>
-          <p:cNvSpPr/>
-          <p:nvPr/>
-        </p:nvSpPr>
-        <p:spPr>
-          <a:xfrm>
-            <a:off x="0" y="830956"/>
-            <a:ext cx="11307651" cy="369332"/>
-          </a:xfrm>
-          <a:prstGeom prst="rect">
-            <a:avLst/>
-          </a:prstGeom>
-        </p:spPr>
-        <p:txBody>
-          <a:bodyPr wrap="square">
-            <a:spAutoFit/>
-          </a:bodyPr>
-          <a:lstStyle/>
-          <a:p>
-            <a:r>
-              <a:rPr lang="en-IN" dirty="0"/>
-              <a:t>Link: </a:t>
-            </a:r>
-            <a:r>
-              <a:rPr lang="en-IN" dirty="0">
-                <a:hlinkClick r:id="rId2"/>
-              </a:rPr>
-              <a:t>https://practice.geeksforgeeks.org/problems/kth-largest-element-in-a-stream2220/1</a:t>
-            </a:r>
-            <a:r>
-              <a:rPr lang="en-IN" dirty="0"/>
-              <a:t> </a:t>
-            </a:r>
-          </a:p>
-        </p:txBody>
-      </p:sp>
-      <mc:AlternateContent xmlns:mc="http://schemas.openxmlformats.org/markup-compatibility/2006">
-        <mc:Choice xmlns:p14="http://schemas.microsoft.com/office/powerpoint/2010/main" Requires="p14">
-          <p:contentPart p14:bwMode="auto" r:id="rId3">
+      <mc:AlternateContent xmlns:mc="http://schemas.openxmlformats.org/markup-compatibility/2006" xmlns:p14="http://schemas.microsoft.com/office/powerpoint/2010/main">
+        <mc:Choice Requires="p14">
+          <p:contentPart p14:bwMode="auto" r:id="rId2">
             <p14:nvContentPartPr>
               <p14:cNvPr id="15" name="Ink 14">
                 <a:extLst>
@@ -12883,7 +12839,7 @@
             </p14:xfrm>
           </p:contentPart>
         </mc:Choice>
-        <mc:Fallback>
+        <mc:Fallback xmlns="">
           <p:pic>
             <p:nvPicPr>
               <p:cNvPr id="15" name="Ink 14">
@@ -12914,8 +12870,8 @@
           </p:pic>
         </mc:Fallback>
       </mc:AlternateContent>
-      <mc:AlternateContent xmlns:mc="http://schemas.openxmlformats.org/markup-compatibility/2006">
-        <mc:Choice xmlns:p14="http://schemas.microsoft.com/office/powerpoint/2010/main" Requires="p14">
+      <mc:AlternateContent xmlns:mc="http://schemas.openxmlformats.org/markup-compatibility/2006" xmlns:p14="http://schemas.microsoft.com/office/powerpoint/2010/main">
+        <mc:Choice Requires="p14">
           <p:contentPart p14:bwMode="auto" r:id="rId5">
             <p14:nvContentPartPr>
               <p14:cNvPr id="16" name="Ink 15">
@@ -12934,7 +12890,7 @@
             </p14:xfrm>
           </p:contentPart>
         </mc:Choice>
-        <mc:Fallback>
+        <mc:Fallback xmlns="">
           <p:pic>
             <p:nvPicPr>
               <p:cNvPr id="16" name="Ink 15">
@@ -12965,8 +12921,8 @@
           </p:pic>
         </mc:Fallback>
       </mc:AlternateContent>
-      <mc:AlternateContent xmlns:mc="http://schemas.openxmlformats.org/markup-compatibility/2006">
-        <mc:Choice xmlns:p14="http://schemas.microsoft.com/office/powerpoint/2010/main" Requires="p14">
+      <mc:AlternateContent xmlns:mc="http://schemas.openxmlformats.org/markup-compatibility/2006" xmlns:p14="http://schemas.microsoft.com/office/powerpoint/2010/main">
+        <mc:Choice Requires="p14">
           <p:contentPart p14:bwMode="auto" r:id="rId7">
             <p14:nvContentPartPr>
               <p14:cNvPr id="20" name="Ink 19">
@@ -12985,7 +12941,7 @@
             </p14:xfrm>
           </p:contentPart>
         </mc:Choice>
-        <mc:Fallback>
+        <mc:Fallback xmlns="">
           <p:pic>
             <p:nvPicPr>
               <p:cNvPr id="20" name="Ink 19">
@@ -13016,8 +12972,8 @@
           </p:pic>
         </mc:Fallback>
       </mc:AlternateContent>
-      <mc:AlternateContent xmlns:mc="http://schemas.openxmlformats.org/markup-compatibility/2006">
-        <mc:Choice xmlns:p14="http://schemas.microsoft.com/office/powerpoint/2010/main" Requires="p14">
+      <mc:AlternateContent xmlns:mc="http://schemas.openxmlformats.org/markup-compatibility/2006" xmlns:p14="http://schemas.microsoft.com/office/powerpoint/2010/main">
+        <mc:Choice Requires="p14">
           <p:contentPart p14:bwMode="auto" r:id="rId9">
             <p14:nvContentPartPr>
               <p14:cNvPr id="21" name="Ink 20">
@@ -13036,7 +12992,7 @@
             </p14:xfrm>
           </p:contentPart>
         </mc:Choice>
-        <mc:Fallback>
+        <mc:Fallback xmlns="">
           <p:pic>
             <p:nvPicPr>
               <p:cNvPr id="21" name="Ink 20">
@@ -13067,8 +13023,8 @@
           </p:pic>
         </mc:Fallback>
       </mc:AlternateContent>
-      <mc:AlternateContent xmlns:mc="http://schemas.openxmlformats.org/markup-compatibility/2006">
-        <mc:Choice xmlns:p14="http://schemas.microsoft.com/office/powerpoint/2010/main" Requires="p14">
+      <mc:AlternateContent xmlns:mc="http://schemas.openxmlformats.org/markup-compatibility/2006" xmlns:p14="http://schemas.microsoft.com/office/powerpoint/2010/main">
+        <mc:Choice Requires="p14">
           <p:contentPart p14:bwMode="auto" r:id="rId11">
             <p14:nvContentPartPr>
               <p14:cNvPr id="28" name="Ink 27">
@@ -13087,7 +13043,7 @@
             </p14:xfrm>
           </p:contentPart>
         </mc:Choice>
-        <mc:Fallback>
+        <mc:Fallback xmlns="">
           <p:pic>
             <p:nvPicPr>
               <p:cNvPr id="28" name="Ink 27">
@@ -13118,8 +13074,8 @@
           </p:pic>
         </mc:Fallback>
       </mc:AlternateContent>
-      <mc:AlternateContent xmlns:mc="http://schemas.openxmlformats.org/markup-compatibility/2006">
-        <mc:Choice xmlns:p14="http://schemas.microsoft.com/office/powerpoint/2010/main" Requires="p14">
+      <mc:AlternateContent xmlns:mc="http://schemas.openxmlformats.org/markup-compatibility/2006" xmlns:p14="http://schemas.microsoft.com/office/powerpoint/2010/main">
+        <mc:Choice Requires="p14">
           <p:contentPart p14:bwMode="auto" r:id="rId13">
             <p14:nvContentPartPr>
               <p14:cNvPr id="29" name="Ink 28">
@@ -13138,7 +13094,7 @@
             </p14:xfrm>
           </p:contentPart>
         </mc:Choice>
-        <mc:Fallback>
+        <mc:Fallback xmlns="">
           <p:pic>
             <p:nvPicPr>
               <p:cNvPr id="29" name="Ink 28">
@@ -13169,8 +13125,8 @@
           </p:pic>
         </mc:Fallback>
       </mc:AlternateContent>
-      <mc:AlternateContent xmlns:mc="http://schemas.openxmlformats.org/markup-compatibility/2006">
-        <mc:Choice xmlns:p14="http://schemas.microsoft.com/office/powerpoint/2010/main" Requires="p14">
+      <mc:AlternateContent xmlns:mc="http://schemas.openxmlformats.org/markup-compatibility/2006" xmlns:p14="http://schemas.microsoft.com/office/powerpoint/2010/main">
+        <mc:Choice Requires="p14">
           <p:contentPart p14:bwMode="auto" r:id="rId15">
             <p14:nvContentPartPr>
               <p14:cNvPr id="32" name="Ink 31">
@@ -13189,7 +13145,7 @@
             </p14:xfrm>
           </p:contentPart>
         </mc:Choice>
-        <mc:Fallback>
+        <mc:Fallback xmlns="">
           <p:pic>
             <p:nvPicPr>
               <p:cNvPr id="32" name="Ink 31">
@@ -13220,8 +13176,8 @@
           </p:pic>
         </mc:Fallback>
       </mc:AlternateContent>
-      <mc:AlternateContent xmlns:mc="http://schemas.openxmlformats.org/markup-compatibility/2006">
-        <mc:Choice xmlns:p14="http://schemas.microsoft.com/office/powerpoint/2010/main" Requires="p14">
+      <mc:AlternateContent xmlns:mc="http://schemas.openxmlformats.org/markup-compatibility/2006" xmlns:p14="http://schemas.microsoft.com/office/powerpoint/2010/main">
+        <mc:Choice Requires="p14">
           <p:contentPart p14:bwMode="auto" r:id="rId17">
             <p14:nvContentPartPr>
               <p14:cNvPr id="35" name="Ink 34">
@@ -13240,7 +13196,7 @@
             </p14:xfrm>
           </p:contentPart>
         </mc:Choice>
-        <mc:Fallback>
+        <mc:Fallback xmlns="">
           <p:pic>
             <p:nvPicPr>
               <p:cNvPr id="35" name="Ink 34">
@@ -13271,8 +13227,8 @@
           </p:pic>
         </mc:Fallback>
       </mc:AlternateContent>
-      <mc:AlternateContent xmlns:mc="http://schemas.openxmlformats.org/markup-compatibility/2006">
-        <mc:Choice xmlns:p14="http://schemas.microsoft.com/office/powerpoint/2010/main" Requires="p14">
+      <mc:AlternateContent xmlns:mc="http://schemas.openxmlformats.org/markup-compatibility/2006" xmlns:p14="http://schemas.microsoft.com/office/powerpoint/2010/main">
+        <mc:Choice Requires="p14">
           <p:contentPart p14:bwMode="auto" r:id="rId19">
             <p14:nvContentPartPr>
               <p14:cNvPr id="36" name="Ink 35">
@@ -13291,7 +13247,7 @@
             </p14:xfrm>
           </p:contentPart>
         </mc:Choice>
-        <mc:Fallback>
+        <mc:Fallback xmlns="">
           <p:pic>
             <p:nvPicPr>
               <p:cNvPr id="36" name="Ink 35">
@@ -13322,8 +13278,8 @@
           </p:pic>
         </mc:Fallback>
       </mc:AlternateContent>
-      <mc:AlternateContent xmlns:mc="http://schemas.openxmlformats.org/markup-compatibility/2006">
-        <mc:Choice xmlns:p14="http://schemas.microsoft.com/office/powerpoint/2010/main" Requires="p14">
+      <mc:AlternateContent xmlns:mc="http://schemas.openxmlformats.org/markup-compatibility/2006" xmlns:p14="http://schemas.microsoft.com/office/powerpoint/2010/main">
+        <mc:Choice Requires="p14">
           <p:contentPart p14:bwMode="auto" r:id="rId21">
             <p14:nvContentPartPr>
               <p14:cNvPr id="43" name="Ink 42">
@@ -13342,7 +13298,7 @@
             </p14:xfrm>
           </p:contentPart>
         </mc:Choice>
-        <mc:Fallback>
+        <mc:Fallback xmlns="">
           <p:pic>
             <p:nvPicPr>
               <p:cNvPr id="43" name="Ink 42">
@@ -13373,8 +13329,8 @@
           </p:pic>
         </mc:Fallback>
       </mc:AlternateContent>
-      <mc:AlternateContent xmlns:mc="http://schemas.openxmlformats.org/markup-compatibility/2006">
-        <mc:Choice xmlns:p14="http://schemas.microsoft.com/office/powerpoint/2010/main" Requires="p14">
+      <mc:AlternateContent xmlns:mc="http://schemas.openxmlformats.org/markup-compatibility/2006" xmlns:p14="http://schemas.microsoft.com/office/powerpoint/2010/main">
+        <mc:Choice Requires="p14">
           <p:contentPart p14:bwMode="auto" r:id="rId23">
             <p14:nvContentPartPr>
               <p14:cNvPr id="55" name="Ink 54">
@@ -13393,7 +13349,7 @@
             </p14:xfrm>
           </p:contentPart>
         </mc:Choice>
-        <mc:Fallback>
+        <mc:Fallback xmlns="">
           <p:pic>
             <p:nvPicPr>
               <p:cNvPr id="55" name="Ink 54">
@@ -13424,8 +13380,8 @@
           </p:pic>
         </mc:Fallback>
       </mc:AlternateContent>
-      <mc:AlternateContent xmlns:mc="http://schemas.openxmlformats.org/markup-compatibility/2006">
-        <mc:Choice xmlns:p14="http://schemas.microsoft.com/office/powerpoint/2010/main" Requires="p14">
+      <mc:AlternateContent xmlns:mc="http://schemas.openxmlformats.org/markup-compatibility/2006" xmlns:p14="http://schemas.microsoft.com/office/powerpoint/2010/main">
+        <mc:Choice Requires="p14">
           <p:contentPart p14:bwMode="auto" r:id="rId25">
             <p14:nvContentPartPr>
               <p14:cNvPr id="56" name="Ink 55">
@@ -13444,7 +13400,7 @@
             </p14:xfrm>
           </p:contentPart>
         </mc:Choice>
-        <mc:Fallback>
+        <mc:Fallback xmlns="">
           <p:pic>
             <p:nvPicPr>
               <p:cNvPr id="56" name="Ink 55">
@@ -13475,6 +13431,50 @@
           </p:pic>
         </mc:Fallback>
       </mc:AlternateContent>
+      <p:sp>
+        <p:nvSpPr>
+          <p:cNvPr id="17" name="Rectangle 16">
+            <a:extLst>
+              <a:ext uri="{FF2B5EF4-FFF2-40B4-BE49-F238E27FC236}">
+                <a16:creationId xmlns:a16="http://schemas.microsoft.com/office/drawing/2014/main" id="{C37CF56E-2A35-4555-AB85-BB794EDE4053}"/>
+              </a:ext>
+            </a:extLst>
+          </p:cNvPr>
+          <p:cNvSpPr/>
+          <p:nvPr/>
+        </p:nvSpPr>
+        <p:spPr>
+          <a:xfrm>
+            <a:off x="0" y="830956"/>
+            <a:ext cx="11307651" cy="369332"/>
+          </a:xfrm>
+          <a:prstGeom prst="rect">
+            <a:avLst/>
+          </a:prstGeom>
+        </p:spPr>
+        <p:txBody>
+          <a:bodyPr wrap="square">
+            <a:spAutoFit/>
+          </a:bodyPr>
+          <a:lstStyle/>
+          <a:p>
+            <a:r>
+              <a:rPr lang="en-IN" dirty="0"/>
+              <a:t>Link: </a:t>
+            </a:r>
+            <a:r>
+              <a:rPr lang="en-IN" dirty="0">
+                <a:hlinkClick r:id="rId27"/>
+              </a:rPr>
+              <a:t>https://practice.geeksforgeeks.org/problems/k-largest-elements3736/1</a:t>
+            </a:r>
+            <a:r>
+              <a:rPr lang="en-IN" dirty="0"/>
+              <a:t> </a:t>
+            </a:r>
+          </a:p>
+        </p:txBody>
+      </p:sp>
     </p:spTree>
     <p:extLst>
       <p:ext uri="{BB962C8B-B14F-4D97-AF65-F5344CB8AC3E}">
@@ -13812,8 +13812,8 @@
           </a:p>
         </p:txBody>
       </p:sp>
-      <mc:AlternateContent xmlns:mc="http://schemas.openxmlformats.org/markup-compatibility/2006">
-        <mc:Choice xmlns:p14="http://schemas.microsoft.com/office/powerpoint/2010/main" Requires="p14">
+      <mc:AlternateContent xmlns:mc="http://schemas.openxmlformats.org/markup-compatibility/2006" xmlns:p14="http://schemas.microsoft.com/office/powerpoint/2010/main">
+        <mc:Choice Requires="p14">
           <p:contentPart p14:bwMode="auto" r:id="rId3">
             <p14:nvContentPartPr>
               <p14:cNvPr id="11" name="Ink 10">
@@ -13832,7 +13832,7 @@
             </p14:xfrm>
           </p:contentPart>
         </mc:Choice>
-        <mc:Fallback>
+        <mc:Fallback xmlns="">
           <p:pic>
             <p:nvPicPr>
               <p:cNvPr id="11" name="Ink 10">
@@ -13863,8 +13863,8 @@
           </p:pic>
         </mc:Fallback>
       </mc:AlternateContent>
-      <mc:AlternateContent xmlns:mc="http://schemas.openxmlformats.org/markup-compatibility/2006">
-        <mc:Choice xmlns:p14="http://schemas.microsoft.com/office/powerpoint/2010/main" Requires="p14">
+      <mc:AlternateContent xmlns:mc="http://schemas.openxmlformats.org/markup-compatibility/2006" xmlns:p14="http://schemas.microsoft.com/office/powerpoint/2010/main">
+        <mc:Choice Requires="p14">
           <p:contentPart p14:bwMode="auto" r:id="rId5">
             <p14:nvContentPartPr>
               <p14:cNvPr id="13" name="Ink 12">
@@ -13883,7 +13883,7 @@
             </p14:xfrm>
           </p:contentPart>
         </mc:Choice>
-        <mc:Fallback>
+        <mc:Fallback xmlns="">
           <p:pic>
             <p:nvPicPr>
               <p:cNvPr id="13" name="Ink 12">
@@ -13914,8 +13914,8 @@
           </p:pic>
         </mc:Fallback>
       </mc:AlternateContent>
-      <mc:AlternateContent xmlns:mc="http://schemas.openxmlformats.org/markup-compatibility/2006">
-        <mc:Choice xmlns:p14="http://schemas.microsoft.com/office/powerpoint/2010/main" Requires="p14">
+      <mc:AlternateContent xmlns:mc="http://schemas.openxmlformats.org/markup-compatibility/2006" xmlns:p14="http://schemas.microsoft.com/office/powerpoint/2010/main">
+        <mc:Choice Requires="p14">
           <p:contentPart p14:bwMode="auto" r:id="rId7">
             <p14:nvContentPartPr>
               <p14:cNvPr id="14" name="Ink 13">
@@ -13934,7 +13934,7 @@
             </p14:xfrm>
           </p:contentPart>
         </mc:Choice>
-        <mc:Fallback>
+        <mc:Fallback xmlns="">
           <p:pic>
             <p:nvPicPr>
               <p:cNvPr id="14" name="Ink 13">
@@ -13965,8 +13965,8 @@
           </p:pic>
         </mc:Fallback>
       </mc:AlternateContent>
-      <mc:AlternateContent xmlns:mc="http://schemas.openxmlformats.org/markup-compatibility/2006">
-        <mc:Choice xmlns:p14="http://schemas.microsoft.com/office/powerpoint/2010/main" Requires="p14">
+      <mc:AlternateContent xmlns:mc="http://schemas.openxmlformats.org/markup-compatibility/2006" xmlns:p14="http://schemas.microsoft.com/office/powerpoint/2010/main">
+        <mc:Choice Requires="p14">
           <p:contentPart p14:bwMode="auto" r:id="rId9">
             <p14:nvContentPartPr>
               <p14:cNvPr id="74" name="Ink 73">
@@ -13985,7 +13985,7 @@
             </p14:xfrm>
           </p:contentPart>
         </mc:Choice>
-        <mc:Fallback>
+        <mc:Fallback xmlns="">
           <p:pic>
             <p:nvPicPr>
               <p:cNvPr id="74" name="Ink 73">
@@ -14016,8 +14016,8 @@
           </p:pic>
         </mc:Fallback>
       </mc:AlternateContent>
-      <mc:AlternateContent xmlns:mc="http://schemas.openxmlformats.org/markup-compatibility/2006">
-        <mc:Choice xmlns:p14="http://schemas.microsoft.com/office/powerpoint/2010/main" Requires="p14">
+      <mc:AlternateContent xmlns:mc="http://schemas.openxmlformats.org/markup-compatibility/2006" xmlns:p14="http://schemas.microsoft.com/office/powerpoint/2010/main">
+        <mc:Choice Requires="p14">
           <p:contentPart p14:bwMode="auto" r:id="rId11">
             <p14:nvContentPartPr>
               <p14:cNvPr id="79" name="Ink 78">
@@ -14036,7 +14036,7 @@
             </p14:xfrm>
           </p:contentPart>
         </mc:Choice>
-        <mc:Fallback>
+        <mc:Fallback xmlns="">
           <p:pic>
             <p:nvPicPr>
               <p:cNvPr id="79" name="Ink 78">
@@ -14067,8 +14067,8 @@
           </p:pic>
         </mc:Fallback>
       </mc:AlternateContent>
-      <mc:AlternateContent xmlns:mc="http://schemas.openxmlformats.org/markup-compatibility/2006">
-        <mc:Choice xmlns:p14="http://schemas.microsoft.com/office/powerpoint/2010/main" Requires="p14">
+      <mc:AlternateContent xmlns:mc="http://schemas.openxmlformats.org/markup-compatibility/2006" xmlns:p14="http://schemas.microsoft.com/office/powerpoint/2010/main">
+        <mc:Choice Requires="p14">
           <p:contentPart p14:bwMode="auto" r:id="rId13">
             <p14:nvContentPartPr>
               <p14:cNvPr id="119" name="Ink 118">
@@ -14087,7 +14087,7 @@
             </p14:xfrm>
           </p:contentPart>
         </mc:Choice>
-        <mc:Fallback>
+        <mc:Fallback xmlns="">
           <p:pic>
             <p:nvPicPr>
               <p:cNvPr id="119" name="Ink 118">

</xml_diff>